<commit_message>
Define charts and pages
</commit_message>
<xml_diff>
--- a/sketches.pptx
+++ b/sketches.pptx
@@ -5,10 +5,12 @@
     <p:sldMasterId id="2147483648" r:id="rId1"/>
   </p:sldMasterIdLst>
   <p:sldIdLst>
-    <p:sldId id="258" r:id="rId2"/>
-    <p:sldId id="259" r:id="rId3"/>
-    <p:sldId id="256" r:id="rId4"/>
-    <p:sldId id="257" r:id="rId5"/>
+    <p:sldId id="260" r:id="rId2"/>
+    <p:sldId id="261" r:id="rId3"/>
+    <p:sldId id="258" r:id="rId4"/>
+    <p:sldId id="259" r:id="rId5"/>
+    <p:sldId id="256" r:id="rId6"/>
+    <p:sldId id="257" r:id="rId7"/>
   </p:sldIdLst>
   <p:sldSz cx="12192000" cy="6858000"/>
   <p:notesSz cx="6858000" cy="9144000"/>
@@ -107,6 +109,11 @@
       </a:defRPr>
     </a:lvl9pPr>
   </p:defaultTextStyle>
+  <p:extLst>
+    <p:ext uri="{EFAFB233-063F-42B5-8137-9DF3F51BA10A}">
+      <p15:sldGuideLst xmlns:p15="http://schemas.microsoft.com/office/powerpoint/2012/main"/>
+    </p:ext>
+  </p:extLst>
 </p:presentation>
 </file>
 
@@ -257,7 +264,7 @@
           <a:p>
             <a:fld id="{25E08D22-8ABF-4F25-8268-5655165803FF}" type="datetimeFigureOut">
               <a:rPr lang="en-US" smtClean="0"/>
-              <a:t>5/21/2020</a:t>
+              <a:t>5/23/2020</a:t>
             </a:fld>
             <a:endParaRPr lang="en-US"/>
           </a:p>
@@ -455,7 +462,7 @@
           <a:p>
             <a:fld id="{25E08D22-8ABF-4F25-8268-5655165803FF}" type="datetimeFigureOut">
               <a:rPr lang="en-US" smtClean="0"/>
-              <a:t>5/21/2020</a:t>
+              <a:t>5/23/2020</a:t>
             </a:fld>
             <a:endParaRPr lang="en-US"/>
           </a:p>
@@ -663,7 +670,7 @@
           <a:p>
             <a:fld id="{25E08D22-8ABF-4F25-8268-5655165803FF}" type="datetimeFigureOut">
               <a:rPr lang="en-US" smtClean="0"/>
-              <a:t>5/21/2020</a:t>
+              <a:t>5/23/2020</a:t>
             </a:fld>
             <a:endParaRPr lang="en-US"/>
           </a:p>
@@ -861,7 +868,7 @@
           <a:p>
             <a:fld id="{25E08D22-8ABF-4F25-8268-5655165803FF}" type="datetimeFigureOut">
               <a:rPr lang="en-US" smtClean="0"/>
-              <a:t>5/21/2020</a:t>
+              <a:t>5/23/2020</a:t>
             </a:fld>
             <a:endParaRPr lang="en-US"/>
           </a:p>
@@ -1136,7 +1143,7 @@
           <a:p>
             <a:fld id="{25E08D22-8ABF-4F25-8268-5655165803FF}" type="datetimeFigureOut">
               <a:rPr lang="en-US" smtClean="0"/>
-              <a:t>5/21/2020</a:t>
+              <a:t>5/23/2020</a:t>
             </a:fld>
             <a:endParaRPr lang="en-US"/>
           </a:p>
@@ -1401,7 +1408,7 @@
           <a:p>
             <a:fld id="{25E08D22-8ABF-4F25-8268-5655165803FF}" type="datetimeFigureOut">
               <a:rPr lang="en-US" smtClean="0"/>
-              <a:t>5/21/2020</a:t>
+              <a:t>5/23/2020</a:t>
             </a:fld>
             <a:endParaRPr lang="en-US"/>
           </a:p>
@@ -1813,7 +1820,7 @@
           <a:p>
             <a:fld id="{25E08D22-8ABF-4F25-8268-5655165803FF}" type="datetimeFigureOut">
               <a:rPr lang="en-US" smtClean="0"/>
-              <a:t>5/21/2020</a:t>
+              <a:t>5/23/2020</a:t>
             </a:fld>
             <a:endParaRPr lang="en-US"/>
           </a:p>
@@ -1954,7 +1961,7 @@
           <a:p>
             <a:fld id="{25E08D22-8ABF-4F25-8268-5655165803FF}" type="datetimeFigureOut">
               <a:rPr lang="en-US" smtClean="0"/>
-              <a:t>5/21/2020</a:t>
+              <a:t>5/23/2020</a:t>
             </a:fld>
             <a:endParaRPr lang="en-US"/>
           </a:p>
@@ -2067,7 +2074,7 @@
           <a:p>
             <a:fld id="{25E08D22-8ABF-4F25-8268-5655165803FF}" type="datetimeFigureOut">
               <a:rPr lang="en-US" smtClean="0"/>
-              <a:t>5/21/2020</a:t>
+              <a:t>5/23/2020</a:t>
             </a:fld>
             <a:endParaRPr lang="en-US"/>
           </a:p>
@@ -2378,7 +2385,7 @@
           <a:p>
             <a:fld id="{25E08D22-8ABF-4F25-8268-5655165803FF}" type="datetimeFigureOut">
               <a:rPr lang="en-US" smtClean="0"/>
-              <a:t>5/21/2020</a:t>
+              <a:t>5/23/2020</a:t>
             </a:fld>
             <a:endParaRPr lang="en-US"/>
           </a:p>
@@ -2666,7 +2673,7 @@
           <a:p>
             <a:fld id="{25E08D22-8ABF-4F25-8268-5655165803FF}" type="datetimeFigureOut">
               <a:rPr lang="en-US" smtClean="0"/>
-              <a:t>5/21/2020</a:t>
+              <a:t>5/23/2020</a:t>
             </a:fld>
             <a:endParaRPr lang="en-US"/>
           </a:p>
@@ -2907,7 +2914,7 @@
           <a:p>
             <a:fld id="{25E08D22-8ABF-4F25-8268-5655165803FF}" type="datetimeFigureOut">
               <a:rPr lang="en-US" smtClean="0"/>
-              <a:t>5/21/2020</a:t>
+              <a:t>5/23/2020</a:t>
             </a:fld>
             <a:endParaRPr lang="en-US"/>
           </a:p>
@@ -3324,6 +3331,3740 @@
           <a:chExt cx="0" cy="0"/>
         </a:xfrm>
       </p:grpSpPr>
+      <p:sp>
+        <p:nvSpPr>
+          <p:cNvPr id="2" name="Title 1">
+            <a:extLst>
+              <a:ext uri="{FF2B5EF4-FFF2-40B4-BE49-F238E27FC236}">
+                <a16:creationId xmlns:a16="http://schemas.microsoft.com/office/drawing/2014/main" id="{2D16427A-47C6-441D-BD42-361307F2FE4E}"/>
+              </a:ext>
+            </a:extLst>
+          </p:cNvPr>
+          <p:cNvSpPr>
+            <a:spLocks noGrp="1"/>
+          </p:cNvSpPr>
+          <p:nvPr>
+            <p:ph type="title"/>
+          </p:nvPr>
+        </p:nvSpPr>
+        <p:spPr/>
+        <p:txBody>
+          <a:bodyPr/>
+          <a:lstStyle/>
+          <a:p>
+            <a:r>
+              <a:rPr lang="en-US" dirty="0"/>
+              <a:t>Pages</a:t>
+            </a:r>
+          </a:p>
+        </p:txBody>
+      </p:sp>
+      <p:sp>
+        <p:nvSpPr>
+          <p:cNvPr id="3" name="Content Placeholder 2">
+            <a:extLst>
+              <a:ext uri="{FF2B5EF4-FFF2-40B4-BE49-F238E27FC236}">
+                <a16:creationId xmlns:a16="http://schemas.microsoft.com/office/drawing/2014/main" id="{392835C1-2B56-4771-A704-2A14BB4297FC}"/>
+              </a:ext>
+            </a:extLst>
+          </p:cNvPr>
+          <p:cNvSpPr>
+            <a:spLocks noGrp="1"/>
+          </p:cNvSpPr>
+          <p:nvPr>
+            <p:ph idx="1"/>
+          </p:nvPr>
+        </p:nvSpPr>
+        <p:spPr/>
+        <p:txBody>
+          <a:bodyPr/>
+          <a:lstStyle/>
+          <a:p>
+            <a:r>
+              <a:rPr lang="en-US" dirty="0"/>
+              <a:t>Lading Page: Dashboard</a:t>
+            </a:r>
+          </a:p>
+          <a:p>
+            <a:pPr lvl="1"/>
+            <a:r>
+              <a:rPr lang="en-US" dirty="0"/>
+              <a:t>Demographics</a:t>
+            </a:r>
+          </a:p>
+          <a:p>
+            <a:pPr lvl="1"/>
+            <a:r>
+              <a:rPr lang="en-US" dirty="0"/>
+              <a:t>Offense Category</a:t>
+            </a:r>
+          </a:p>
+          <a:p>
+            <a:pPr lvl="1"/>
+            <a:r>
+              <a:rPr lang="en-US" dirty="0"/>
+              <a:t>Length of case</a:t>
+            </a:r>
+          </a:p>
+          <a:p>
+            <a:pPr lvl="1"/>
+            <a:r>
+              <a:rPr lang="en-US" dirty="0"/>
+              <a:t>Courts</a:t>
+            </a:r>
+          </a:p>
+          <a:p>
+            <a:r>
+              <a:rPr lang="en-US" dirty="0"/>
+              <a:t>About: description of the project and us</a:t>
+            </a:r>
+          </a:p>
+          <a:p>
+            <a:r>
+              <a:rPr lang="en-US" dirty="0"/>
+              <a:t>Data: Table mini description of data</a:t>
+            </a:r>
+          </a:p>
+          <a:p>
+            <a:r>
+              <a:rPr lang="en-US" dirty="0"/>
+              <a:t>Map: Map of the county (total cases, percentage of offense category [80%/20%])</a:t>
+            </a:r>
+          </a:p>
+        </p:txBody>
+      </p:sp>
+    </p:spTree>
+    <p:extLst>
+      <p:ext uri="{BB962C8B-B14F-4D97-AF65-F5344CB8AC3E}">
+        <p14:creationId xmlns:p14="http://schemas.microsoft.com/office/powerpoint/2010/main" val="2257904442"/>
+      </p:ext>
+    </p:extLst>
+  </p:cSld>
+  <p:clrMapOvr>
+    <a:masterClrMapping/>
+  </p:clrMapOvr>
+</p:sld>
+</file>
+
+<file path=ppt/slides/slide2.xml><?xml version="1.0" encoding="utf-8"?>
+<p:sld xmlns:a="http://schemas.openxmlformats.org/drawingml/2006/main" xmlns:r="http://schemas.openxmlformats.org/officeDocument/2006/relationships" xmlns:p="http://schemas.openxmlformats.org/presentationml/2006/main">
+  <p:cSld>
+    <p:spTree>
+      <p:nvGrpSpPr>
+        <p:cNvPr id="1" name=""/>
+        <p:cNvGrpSpPr/>
+        <p:nvPr/>
+      </p:nvGrpSpPr>
+      <p:grpSpPr>
+        <a:xfrm>
+          <a:off x="0" y="0"/>
+          <a:ext cx="0" cy="0"/>
+          <a:chOff x="0" y="0"/>
+          <a:chExt cx="0" cy="0"/>
+        </a:xfrm>
+      </p:grpSpPr>
+      <p:sp>
+        <p:nvSpPr>
+          <p:cNvPr id="2" name="Title 1">
+            <a:extLst>
+              <a:ext uri="{FF2B5EF4-FFF2-40B4-BE49-F238E27FC236}">
+                <a16:creationId xmlns:a16="http://schemas.microsoft.com/office/drawing/2014/main" id="{15FA1F91-4BD3-45D8-B1A1-07E889728899}"/>
+              </a:ext>
+            </a:extLst>
+          </p:cNvPr>
+          <p:cNvSpPr>
+            <a:spLocks noGrp="1"/>
+          </p:cNvSpPr>
+          <p:nvPr>
+            <p:ph type="title"/>
+          </p:nvPr>
+        </p:nvSpPr>
+        <p:spPr/>
+        <p:txBody>
+          <a:bodyPr/>
+          <a:lstStyle/>
+          <a:p>
+            <a:r>
+              <a:rPr lang="en-US" dirty="0"/>
+              <a:t>Charts</a:t>
+            </a:r>
+          </a:p>
+        </p:txBody>
+      </p:sp>
+      <p:graphicFrame>
+        <p:nvGraphicFramePr>
+          <p:cNvPr id="4" name="Content Placeholder 3">
+            <a:extLst>
+              <a:ext uri="{FF2B5EF4-FFF2-40B4-BE49-F238E27FC236}">
+                <a16:creationId xmlns:a16="http://schemas.microsoft.com/office/drawing/2014/main" id="{7F3328D4-DD29-405C-8F7E-E94645B8ACC9}"/>
+              </a:ext>
+            </a:extLst>
+          </p:cNvPr>
+          <p:cNvGraphicFramePr>
+            <a:graphicFrameLocks noGrp="1"/>
+          </p:cNvGraphicFramePr>
+          <p:nvPr>
+            <p:ph idx="1"/>
+          </p:nvPr>
+        </p:nvGraphicFramePr>
+        <p:xfrm>
+          <a:off x="889000" y="2876391"/>
+          <a:ext cx="10414000" cy="2249805"/>
+        </p:xfrm>
+        <a:graphic>
+          <a:graphicData uri="http://schemas.openxmlformats.org/drawingml/2006/table">
+            <a:tbl>
+              <a:tblPr/>
+              <a:tblGrid>
+                <a:gridCol w="1665859">
+                  <a:extLst>
+                    <a:ext uri="{9D8B030D-6E8A-4147-A177-3AD203B41FA5}">
+                      <a16:colId xmlns:a16="http://schemas.microsoft.com/office/drawing/2014/main" val="690787118"/>
+                    </a:ext>
+                  </a:extLst>
+                </a:gridCol>
+                <a:gridCol w="1484995">
+                  <a:extLst>
+                    <a:ext uri="{9D8B030D-6E8A-4147-A177-3AD203B41FA5}">
+                      <a16:colId xmlns:a16="http://schemas.microsoft.com/office/drawing/2014/main" val="750064233"/>
+                    </a:ext>
+                  </a:extLst>
+                </a:gridCol>
+                <a:gridCol w="1916531">
+                  <a:extLst>
+                    <a:ext uri="{9D8B030D-6E8A-4147-A177-3AD203B41FA5}">
+                      <a16:colId xmlns:a16="http://schemas.microsoft.com/office/drawing/2014/main" val="2105501645"/>
+                    </a:ext>
+                  </a:extLst>
+                </a:gridCol>
+                <a:gridCol w="1662686">
+                  <a:extLst>
+                    <a:ext uri="{9D8B030D-6E8A-4147-A177-3AD203B41FA5}">
+                      <a16:colId xmlns:a16="http://schemas.microsoft.com/office/drawing/2014/main" val="1977887359"/>
+                    </a:ext>
+                  </a:extLst>
+                </a:gridCol>
+                <a:gridCol w="596536">
+                  <a:extLst>
+                    <a:ext uri="{9D8B030D-6E8A-4147-A177-3AD203B41FA5}">
+                      <a16:colId xmlns:a16="http://schemas.microsoft.com/office/drawing/2014/main" val="906656688"/>
+                    </a:ext>
+                  </a:extLst>
+                </a:gridCol>
+                <a:gridCol w="1307303">
+                  <a:extLst>
+                    <a:ext uri="{9D8B030D-6E8A-4147-A177-3AD203B41FA5}">
+                      <a16:colId xmlns:a16="http://schemas.microsoft.com/office/drawing/2014/main" val="2019976033"/>
+                    </a:ext>
+                  </a:extLst>
+                </a:gridCol>
+                <a:gridCol w="675863">
+                  <a:extLst>
+                    <a:ext uri="{9D8B030D-6E8A-4147-A177-3AD203B41FA5}">
+                      <a16:colId xmlns:a16="http://schemas.microsoft.com/office/drawing/2014/main" val="4067438892"/>
+                    </a:ext>
+                  </a:extLst>
+                </a:gridCol>
+                <a:gridCol w="1104227">
+                  <a:extLst>
+                    <a:ext uri="{9D8B030D-6E8A-4147-A177-3AD203B41FA5}">
+                      <a16:colId xmlns:a16="http://schemas.microsoft.com/office/drawing/2014/main" val="2981415886"/>
+                    </a:ext>
+                  </a:extLst>
+                </a:gridCol>
+              </a:tblGrid>
+              <a:tr h="190500">
+                <a:tc>
+                  <a:txBody>
+                    <a:bodyPr/>
+                    <a:lstStyle/>
+                    <a:p>
+                      <a:pPr algn="ctr" fontAlgn="ctr"/>
+                      <a:r>
+                        <a:rPr lang="en-US" sz="1100" b="1" i="0" u="none" strike="noStrike">
+                          <a:solidFill>
+                            <a:srgbClr val="FFFFFF"/>
+                          </a:solidFill>
+                          <a:effectLst/>
+                          <a:latin typeface="Calibri" panose="020F0502020204030204" pitchFamily="34" charset="0"/>
+                        </a:rPr>
+                        <a:t>Data 1</a:t>
+                      </a:r>
+                    </a:p>
+                  </a:txBody>
+                  <a:tcPr marL="9525" marR="9525" marT="9525" marB="0" anchor="ctr">
+                    <a:lnL w="6350" cap="flat" cmpd="sng" algn="ctr">
+                      <a:solidFill>
+                        <a:srgbClr val="000000"/>
+                      </a:solidFill>
+                      <a:prstDash val="solid"/>
+                      <a:round/>
+                      <a:headEnd type="none" w="med" len="med"/>
+                      <a:tailEnd type="none" w="med" len="med"/>
+                    </a:lnL>
+                    <a:lnR>
+                      <a:noFill/>
+                    </a:lnR>
+                    <a:lnT w="6350" cap="flat" cmpd="sng" algn="ctr">
+                      <a:solidFill>
+                        <a:srgbClr val="000000"/>
+                      </a:solidFill>
+                      <a:prstDash val="solid"/>
+                      <a:round/>
+                      <a:headEnd type="none" w="med" len="med"/>
+                      <a:tailEnd type="none" w="med" len="med"/>
+                    </a:lnT>
+                    <a:lnB w="12700" cap="flat" cmpd="sng" algn="ctr">
+                      <a:solidFill>
+                        <a:srgbClr val="000000"/>
+                      </a:solidFill>
+                      <a:prstDash val="solid"/>
+                      <a:round/>
+                      <a:headEnd type="none" w="med" len="med"/>
+                      <a:tailEnd type="none" w="med" len="med"/>
+                    </a:lnB>
+                    <a:solidFill>
+                      <a:srgbClr val="4472C4"/>
+                    </a:solidFill>
+                  </a:tcPr>
+                </a:tc>
+                <a:tc>
+                  <a:txBody>
+                    <a:bodyPr/>
+                    <a:lstStyle/>
+                    <a:p>
+                      <a:pPr algn="ctr" fontAlgn="ctr"/>
+                      <a:r>
+                        <a:rPr lang="en-US" sz="1100" b="1" i="0" u="none" strike="noStrike">
+                          <a:solidFill>
+                            <a:srgbClr val="FFFFFF"/>
+                          </a:solidFill>
+                          <a:effectLst/>
+                          <a:latin typeface="Calibri" panose="020F0502020204030204" pitchFamily="34" charset="0"/>
+                        </a:rPr>
+                        <a:t>Data 2</a:t>
+                      </a:r>
+                    </a:p>
+                  </a:txBody>
+                  <a:tcPr marL="9525" marR="9525" marT="9525" marB="0" anchor="ctr">
+                    <a:lnL>
+                      <a:noFill/>
+                    </a:lnL>
+                    <a:lnR>
+                      <a:noFill/>
+                    </a:lnR>
+                    <a:lnT w="6350" cap="flat" cmpd="sng" algn="ctr">
+                      <a:solidFill>
+                        <a:srgbClr val="000000"/>
+                      </a:solidFill>
+                      <a:prstDash val="solid"/>
+                      <a:round/>
+                      <a:headEnd type="none" w="med" len="med"/>
+                      <a:tailEnd type="none" w="med" len="med"/>
+                    </a:lnT>
+                    <a:lnB w="12700" cap="flat" cmpd="sng" algn="ctr">
+                      <a:solidFill>
+                        <a:srgbClr val="000000"/>
+                      </a:solidFill>
+                      <a:prstDash val="solid"/>
+                      <a:round/>
+                      <a:headEnd type="none" w="med" len="med"/>
+                      <a:tailEnd type="none" w="med" len="med"/>
+                    </a:lnB>
+                    <a:solidFill>
+                      <a:srgbClr val="4472C4"/>
+                    </a:solidFill>
+                  </a:tcPr>
+                </a:tc>
+                <a:tc>
+                  <a:txBody>
+                    <a:bodyPr/>
+                    <a:lstStyle/>
+                    <a:p>
+                      <a:pPr algn="ctr" fontAlgn="ctr"/>
+                      <a:r>
+                        <a:rPr lang="en-US" sz="1100" b="1" i="0" u="none" strike="noStrike">
+                          <a:solidFill>
+                            <a:srgbClr val="FFFFFF"/>
+                          </a:solidFill>
+                          <a:effectLst/>
+                          <a:latin typeface="Calibri" panose="020F0502020204030204" pitchFamily="34" charset="0"/>
+                        </a:rPr>
+                        <a:t>Data 3</a:t>
+                      </a:r>
+                    </a:p>
+                  </a:txBody>
+                  <a:tcPr marL="9525" marR="9525" marT="9525" marB="0" anchor="ctr">
+                    <a:lnL>
+                      <a:noFill/>
+                    </a:lnL>
+                    <a:lnR>
+                      <a:noFill/>
+                    </a:lnR>
+                    <a:lnT w="6350" cap="flat" cmpd="sng" algn="ctr">
+                      <a:solidFill>
+                        <a:srgbClr val="000000"/>
+                      </a:solidFill>
+                      <a:prstDash val="solid"/>
+                      <a:round/>
+                      <a:headEnd type="none" w="med" len="med"/>
+                      <a:tailEnd type="none" w="med" len="med"/>
+                    </a:lnT>
+                    <a:lnB w="12700" cap="flat" cmpd="sng" algn="ctr">
+                      <a:solidFill>
+                        <a:srgbClr val="000000"/>
+                      </a:solidFill>
+                      <a:prstDash val="solid"/>
+                      <a:round/>
+                      <a:headEnd type="none" w="med" len="med"/>
+                      <a:tailEnd type="none" w="med" len="med"/>
+                    </a:lnB>
+                    <a:solidFill>
+                      <a:srgbClr val="4472C4"/>
+                    </a:solidFill>
+                  </a:tcPr>
+                </a:tc>
+                <a:tc>
+                  <a:txBody>
+                    <a:bodyPr/>
+                    <a:lstStyle/>
+                    <a:p>
+                      <a:pPr algn="ctr" fontAlgn="ctr"/>
+                      <a:r>
+                        <a:rPr lang="en-US" sz="1100" b="1" i="0" u="none" strike="noStrike">
+                          <a:solidFill>
+                            <a:srgbClr val="FFFFFF"/>
+                          </a:solidFill>
+                          <a:effectLst/>
+                          <a:latin typeface="Calibri" panose="020F0502020204030204" pitchFamily="34" charset="0"/>
+                        </a:rPr>
+                        <a:t>Data 4</a:t>
+                      </a:r>
+                    </a:p>
+                  </a:txBody>
+                  <a:tcPr marL="9525" marR="9525" marT="9525" marB="0" anchor="ctr">
+                    <a:lnL>
+                      <a:noFill/>
+                    </a:lnL>
+                    <a:lnR>
+                      <a:noFill/>
+                    </a:lnR>
+                    <a:lnT w="6350" cap="flat" cmpd="sng" algn="ctr">
+                      <a:solidFill>
+                        <a:srgbClr val="000000"/>
+                      </a:solidFill>
+                      <a:prstDash val="solid"/>
+                      <a:round/>
+                      <a:headEnd type="none" w="med" len="med"/>
+                      <a:tailEnd type="none" w="med" len="med"/>
+                    </a:lnT>
+                    <a:lnB w="12700" cap="flat" cmpd="sng" algn="ctr">
+                      <a:solidFill>
+                        <a:srgbClr val="000000"/>
+                      </a:solidFill>
+                      <a:prstDash val="solid"/>
+                      <a:round/>
+                      <a:headEnd type="none" w="med" len="med"/>
+                      <a:tailEnd type="none" w="med" len="med"/>
+                    </a:lnB>
+                    <a:solidFill>
+                      <a:srgbClr val="4472C4"/>
+                    </a:solidFill>
+                  </a:tcPr>
+                </a:tc>
+                <a:tc>
+                  <a:txBody>
+                    <a:bodyPr/>
+                    <a:lstStyle/>
+                    <a:p>
+                      <a:pPr algn="ctr" fontAlgn="ctr"/>
+                      <a:r>
+                        <a:rPr lang="en-US" sz="1100" b="1" i="0" u="none" strike="noStrike">
+                          <a:solidFill>
+                            <a:srgbClr val="FFFFFF"/>
+                          </a:solidFill>
+                          <a:effectLst/>
+                          <a:latin typeface="Calibri" panose="020F0502020204030204" pitchFamily="34" charset="0"/>
+                        </a:rPr>
+                        <a:t>Data 5</a:t>
+                      </a:r>
+                    </a:p>
+                  </a:txBody>
+                  <a:tcPr marL="9525" marR="9525" marT="9525" marB="0" anchor="ctr">
+                    <a:lnL>
+                      <a:noFill/>
+                    </a:lnL>
+                    <a:lnR>
+                      <a:noFill/>
+                    </a:lnR>
+                    <a:lnT w="6350" cap="flat" cmpd="sng" algn="ctr">
+                      <a:solidFill>
+                        <a:srgbClr val="000000"/>
+                      </a:solidFill>
+                      <a:prstDash val="solid"/>
+                      <a:round/>
+                      <a:headEnd type="none" w="med" len="med"/>
+                      <a:tailEnd type="none" w="med" len="med"/>
+                    </a:lnT>
+                    <a:lnB w="12700" cap="flat" cmpd="sng" algn="ctr">
+                      <a:solidFill>
+                        <a:srgbClr val="000000"/>
+                      </a:solidFill>
+                      <a:prstDash val="solid"/>
+                      <a:round/>
+                      <a:headEnd type="none" w="med" len="med"/>
+                      <a:tailEnd type="none" w="med" len="med"/>
+                    </a:lnB>
+                    <a:solidFill>
+                      <a:srgbClr val="4472C4"/>
+                    </a:solidFill>
+                  </a:tcPr>
+                </a:tc>
+                <a:tc>
+                  <a:txBody>
+                    <a:bodyPr/>
+                    <a:lstStyle/>
+                    <a:p>
+                      <a:pPr algn="ctr" fontAlgn="ctr"/>
+                      <a:r>
+                        <a:rPr lang="en-US" sz="1100" b="1" i="0" u="none" strike="noStrike">
+                          <a:solidFill>
+                            <a:srgbClr val="FFFFFF"/>
+                          </a:solidFill>
+                          <a:effectLst/>
+                          <a:latin typeface="Calibri" panose="020F0502020204030204" pitchFamily="34" charset="0"/>
+                        </a:rPr>
+                        <a:t>Type of chart</a:t>
+                      </a:r>
+                    </a:p>
+                  </a:txBody>
+                  <a:tcPr marL="9525" marR="9525" marT="9525" marB="0" anchor="ctr">
+                    <a:lnL>
+                      <a:noFill/>
+                    </a:lnL>
+                    <a:lnR w="6350" cap="flat" cmpd="sng" algn="ctr">
+                      <a:solidFill>
+                        <a:srgbClr val="000000"/>
+                      </a:solidFill>
+                      <a:prstDash val="solid"/>
+                      <a:round/>
+                      <a:headEnd type="none" w="med" len="med"/>
+                      <a:tailEnd type="none" w="med" len="med"/>
+                    </a:lnR>
+                    <a:lnT w="6350" cap="flat" cmpd="sng" algn="ctr">
+                      <a:solidFill>
+                        <a:srgbClr val="000000"/>
+                      </a:solidFill>
+                      <a:prstDash val="solid"/>
+                      <a:round/>
+                      <a:headEnd type="none" w="med" len="med"/>
+                      <a:tailEnd type="none" w="med" len="med"/>
+                    </a:lnT>
+                    <a:lnB w="12700" cap="flat" cmpd="sng" algn="ctr">
+                      <a:solidFill>
+                        <a:srgbClr val="000000"/>
+                      </a:solidFill>
+                      <a:prstDash val="solid"/>
+                      <a:round/>
+                      <a:headEnd type="none" w="med" len="med"/>
+                      <a:tailEnd type="none" w="med" len="med"/>
+                    </a:lnB>
+                    <a:solidFill>
+                      <a:srgbClr val="4472C4"/>
+                    </a:solidFill>
+                  </a:tcPr>
+                </a:tc>
+                <a:tc>
+                  <a:txBody>
+                    <a:bodyPr/>
+                    <a:lstStyle/>
+                    <a:p>
+                      <a:pPr algn="ctr" fontAlgn="ctr"/>
+                      <a:r>
+                        <a:rPr lang="en-US" sz="1100" b="1" i="0" u="none" strike="noStrike">
+                          <a:solidFill>
+                            <a:srgbClr val="FFFFFF"/>
+                          </a:solidFill>
+                          <a:effectLst/>
+                          <a:latin typeface="Calibri" panose="020F0502020204030204" pitchFamily="34" charset="0"/>
+                        </a:rPr>
+                        <a:t>Landing</a:t>
+                      </a:r>
+                    </a:p>
+                  </a:txBody>
+                  <a:tcPr marL="9525" marR="9525" marT="9525" marB="0" anchor="ctr">
+                    <a:lnL w="6350" cap="flat" cmpd="sng" algn="ctr">
+                      <a:solidFill>
+                        <a:srgbClr val="000000"/>
+                      </a:solidFill>
+                      <a:prstDash val="solid"/>
+                      <a:round/>
+                      <a:headEnd type="none" w="med" len="med"/>
+                      <a:tailEnd type="none" w="med" len="med"/>
+                    </a:lnL>
+                    <a:lnR w="6350" cap="flat" cmpd="sng" algn="ctr">
+                      <a:solidFill>
+                        <a:srgbClr val="000000"/>
+                      </a:solidFill>
+                      <a:prstDash val="solid"/>
+                      <a:round/>
+                      <a:headEnd type="none" w="med" len="med"/>
+                      <a:tailEnd type="none" w="med" len="med"/>
+                    </a:lnR>
+                    <a:lnT w="6350" cap="flat" cmpd="sng" algn="ctr">
+                      <a:solidFill>
+                        <a:srgbClr val="000000"/>
+                      </a:solidFill>
+                      <a:prstDash val="solid"/>
+                      <a:round/>
+                      <a:headEnd type="none" w="med" len="med"/>
+                      <a:tailEnd type="none" w="med" len="med"/>
+                    </a:lnT>
+                    <a:lnB w="6350" cap="flat" cmpd="sng" algn="ctr">
+                      <a:solidFill>
+                        <a:srgbClr val="000000"/>
+                      </a:solidFill>
+                      <a:prstDash val="solid"/>
+                      <a:round/>
+                      <a:headEnd type="none" w="med" len="med"/>
+                      <a:tailEnd type="none" w="med" len="med"/>
+                    </a:lnB>
+                    <a:solidFill>
+                      <a:srgbClr val="4472C4"/>
+                    </a:solidFill>
+                  </a:tcPr>
+                </a:tc>
+                <a:tc>
+                  <a:txBody>
+                    <a:bodyPr/>
+                    <a:lstStyle/>
+                    <a:p>
+                      <a:pPr algn="ctr" fontAlgn="ctr"/>
+                      <a:r>
+                        <a:rPr lang="en-US" sz="1100" b="1" i="0" u="none" strike="noStrike">
+                          <a:solidFill>
+                            <a:srgbClr val="FFFFFF"/>
+                          </a:solidFill>
+                          <a:effectLst/>
+                          <a:latin typeface="Calibri" panose="020F0502020204030204" pitchFamily="34" charset="0"/>
+                        </a:rPr>
+                        <a:t>Speciffic page</a:t>
+                      </a:r>
+                    </a:p>
+                  </a:txBody>
+                  <a:tcPr marL="9525" marR="9525" marT="9525" marB="0" anchor="ctr">
+                    <a:lnL w="6350" cap="flat" cmpd="sng" algn="ctr">
+                      <a:solidFill>
+                        <a:srgbClr val="000000"/>
+                      </a:solidFill>
+                      <a:prstDash val="solid"/>
+                      <a:round/>
+                      <a:headEnd type="none" w="med" len="med"/>
+                      <a:tailEnd type="none" w="med" len="med"/>
+                    </a:lnL>
+                    <a:lnR w="6350" cap="flat" cmpd="sng" algn="ctr">
+                      <a:solidFill>
+                        <a:srgbClr val="000000"/>
+                      </a:solidFill>
+                      <a:prstDash val="solid"/>
+                      <a:round/>
+                      <a:headEnd type="none" w="med" len="med"/>
+                      <a:tailEnd type="none" w="med" len="med"/>
+                    </a:lnR>
+                    <a:lnT w="6350" cap="flat" cmpd="sng" algn="ctr">
+                      <a:solidFill>
+                        <a:srgbClr val="000000"/>
+                      </a:solidFill>
+                      <a:prstDash val="solid"/>
+                      <a:round/>
+                      <a:headEnd type="none" w="med" len="med"/>
+                      <a:tailEnd type="none" w="med" len="med"/>
+                    </a:lnT>
+                    <a:lnB w="6350" cap="flat" cmpd="sng" algn="ctr">
+                      <a:solidFill>
+                        <a:srgbClr val="000000"/>
+                      </a:solidFill>
+                      <a:prstDash val="solid"/>
+                      <a:round/>
+                      <a:headEnd type="none" w="med" len="med"/>
+                      <a:tailEnd type="none" w="med" len="med"/>
+                    </a:lnB>
+                    <a:solidFill>
+                      <a:srgbClr val="4472C4"/>
+                    </a:solidFill>
+                  </a:tcPr>
+                </a:tc>
+                <a:extLst>
+                  <a:ext uri="{0D108BD9-81ED-4DB2-BD59-A6C34878D82A}">
+                    <a16:rowId xmlns:a16="http://schemas.microsoft.com/office/drawing/2014/main" val="4280455846"/>
+                  </a:ext>
+                </a:extLst>
+              </a:tr>
+              <a:tr h="190500">
+                <a:tc>
+                  <a:txBody>
+                    <a:bodyPr/>
+                    <a:lstStyle/>
+                    <a:p>
+                      <a:pPr algn="ctr" fontAlgn="ctr"/>
+                      <a:r>
+                        <a:rPr lang="en-US" sz="1100" b="0" i="0" u="none" strike="noStrike">
+                          <a:solidFill>
+                            <a:srgbClr val="000000"/>
+                          </a:solidFill>
+                          <a:effectLst/>
+                          <a:latin typeface="Calibri" panose="020F0502020204030204" pitchFamily="34" charset="0"/>
+                        </a:rPr>
+                        <a:t>AGE_AT_INCIDENT</a:t>
+                      </a:r>
+                    </a:p>
+                  </a:txBody>
+                  <a:tcPr marL="9525" marR="9525" marT="9525" marB="0" anchor="ctr">
+                    <a:lnL w="6350" cap="flat" cmpd="sng" algn="ctr">
+                      <a:solidFill>
+                        <a:srgbClr val="000000"/>
+                      </a:solidFill>
+                      <a:prstDash val="solid"/>
+                      <a:round/>
+                      <a:headEnd type="none" w="med" len="med"/>
+                      <a:tailEnd type="none" w="med" len="med"/>
+                    </a:lnL>
+                    <a:lnR>
+                      <a:noFill/>
+                    </a:lnR>
+                    <a:lnT w="12700" cap="flat" cmpd="sng" algn="ctr">
+                      <a:solidFill>
+                        <a:srgbClr val="000000"/>
+                      </a:solidFill>
+                      <a:prstDash val="solid"/>
+                      <a:round/>
+                      <a:headEnd type="none" w="med" len="med"/>
+                      <a:tailEnd type="none" w="med" len="med"/>
+                    </a:lnT>
+                    <a:lnB>
+                      <a:noFill/>
+                    </a:lnB>
+                    <a:solidFill>
+                      <a:srgbClr val="D9D9D9"/>
+                    </a:solidFill>
+                  </a:tcPr>
+                </a:tc>
+                <a:tc>
+                  <a:txBody>
+                    <a:bodyPr/>
+                    <a:lstStyle/>
+                    <a:p>
+                      <a:pPr algn="ctr" fontAlgn="ctr"/>
+                      <a:r>
+                        <a:rPr lang="en-US" sz="1100" b="0" i="0" u="none" strike="noStrike">
+                          <a:solidFill>
+                            <a:srgbClr val="000000"/>
+                          </a:solidFill>
+                          <a:effectLst/>
+                          <a:latin typeface="Calibri" panose="020F0502020204030204" pitchFamily="34" charset="0"/>
+                        </a:rPr>
+                        <a:t>Court (filter)</a:t>
+                      </a:r>
+                    </a:p>
+                  </a:txBody>
+                  <a:tcPr marL="9525" marR="9525" marT="9525" marB="0" anchor="ctr">
+                    <a:lnL>
+                      <a:noFill/>
+                    </a:lnL>
+                    <a:lnR>
+                      <a:noFill/>
+                    </a:lnR>
+                    <a:lnT w="12700" cap="flat" cmpd="sng" algn="ctr">
+                      <a:solidFill>
+                        <a:srgbClr val="000000"/>
+                      </a:solidFill>
+                      <a:prstDash val="solid"/>
+                      <a:round/>
+                      <a:headEnd type="none" w="med" len="med"/>
+                      <a:tailEnd type="none" w="med" len="med"/>
+                    </a:lnT>
+                    <a:lnB>
+                      <a:noFill/>
+                    </a:lnB>
+                    <a:solidFill>
+                      <a:srgbClr val="D9D9D9"/>
+                    </a:solidFill>
+                  </a:tcPr>
+                </a:tc>
+                <a:tc>
+                  <a:txBody>
+                    <a:bodyPr/>
+                    <a:lstStyle/>
+                    <a:p>
+                      <a:pPr algn="ctr" fontAlgn="ctr"/>
+                      <a:r>
+                        <a:rPr lang="en-US" sz="1100" b="0" i="0" u="none" strike="noStrike">
+                          <a:solidFill>
+                            <a:srgbClr val="000000"/>
+                          </a:solidFill>
+                          <a:effectLst/>
+                          <a:latin typeface="Calibri" panose="020F0502020204030204" pitchFamily="34" charset="0"/>
+                        </a:rPr>
+                        <a:t>Offense (filter)</a:t>
+                      </a:r>
+                    </a:p>
+                  </a:txBody>
+                  <a:tcPr marL="9525" marR="9525" marT="9525" marB="0" anchor="ctr">
+                    <a:lnL>
+                      <a:noFill/>
+                    </a:lnL>
+                    <a:lnR>
+                      <a:noFill/>
+                    </a:lnR>
+                    <a:lnT w="12700" cap="flat" cmpd="sng" algn="ctr">
+                      <a:solidFill>
+                        <a:srgbClr val="000000"/>
+                      </a:solidFill>
+                      <a:prstDash val="solid"/>
+                      <a:round/>
+                      <a:headEnd type="none" w="med" len="med"/>
+                      <a:tailEnd type="none" w="med" len="med"/>
+                    </a:lnT>
+                    <a:lnB>
+                      <a:noFill/>
+                    </a:lnB>
+                    <a:solidFill>
+                      <a:srgbClr val="D9D9D9"/>
+                    </a:solidFill>
+                  </a:tcPr>
+                </a:tc>
+                <a:tc>
+                  <a:txBody>
+                    <a:bodyPr/>
+                    <a:lstStyle/>
+                    <a:p>
+                      <a:pPr algn="ctr" fontAlgn="ctr"/>
+                      <a:r>
+                        <a:rPr lang="en-US" sz="1100" b="0" i="0" u="none" strike="noStrike">
+                          <a:solidFill>
+                            <a:srgbClr val="000000"/>
+                          </a:solidFill>
+                          <a:effectLst/>
+                          <a:latin typeface="Calibri" panose="020F0502020204030204" pitchFamily="34" charset="0"/>
+                        </a:rPr>
+                        <a:t>Sentence (filter)</a:t>
+                      </a:r>
+                    </a:p>
+                  </a:txBody>
+                  <a:tcPr marL="9525" marR="9525" marT="9525" marB="0" anchor="ctr">
+                    <a:lnL>
+                      <a:noFill/>
+                    </a:lnL>
+                    <a:lnR>
+                      <a:noFill/>
+                    </a:lnR>
+                    <a:lnT w="12700" cap="flat" cmpd="sng" algn="ctr">
+                      <a:solidFill>
+                        <a:srgbClr val="000000"/>
+                      </a:solidFill>
+                      <a:prstDash val="solid"/>
+                      <a:round/>
+                      <a:headEnd type="none" w="med" len="med"/>
+                      <a:tailEnd type="none" w="med" len="med"/>
+                    </a:lnT>
+                    <a:lnB>
+                      <a:noFill/>
+                    </a:lnB>
+                    <a:solidFill>
+                      <a:srgbClr val="D9D9D9"/>
+                    </a:solidFill>
+                  </a:tcPr>
+                </a:tc>
+                <a:tc>
+                  <a:txBody>
+                    <a:bodyPr/>
+                    <a:lstStyle/>
+                    <a:p>
+                      <a:pPr algn="ctr" fontAlgn="ctr"/>
+                      <a:r>
+                        <a:rPr lang="en-US" sz="1100" b="0" i="0" u="none" strike="noStrike">
+                          <a:solidFill>
+                            <a:srgbClr val="000000"/>
+                          </a:solidFill>
+                          <a:effectLst/>
+                          <a:latin typeface="Calibri" panose="020F0502020204030204" pitchFamily="34" charset="0"/>
+                        </a:rPr>
+                        <a:t>ID</a:t>
+                      </a:r>
+                    </a:p>
+                  </a:txBody>
+                  <a:tcPr marL="9525" marR="9525" marT="9525" marB="0" anchor="ctr">
+                    <a:lnL>
+                      <a:noFill/>
+                    </a:lnL>
+                    <a:lnR>
+                      <a:noFill/>
+                    </a:lnR>
+                    <a:lnT w="12700" cap="flat" cmpd="sng" algn="ctr">
+                      <a:solidFill>
+                        <a:srgbClr val="000000"/>
+                      </a:solidFill>
+                      <a:prstDash val="solid"/>
+                      <a:round/>
+                      <a:headEnd type="none" w="med" len="med"/>
+                      <a:tailEnd type="none" w="med" len="med"/>
+                    </a:lnT>
+                    <a:lnB>
+                      <a:noFill/>
+                    </a:lnB>
+                    <a:solidFill>
+                      <a:srgbClr val="D9D9D9"/>
+                    </a:solidFill>
+                  </a:tcPr>
+                </a:tc>
+                <a:tc>
+                  <a:txBody>
+                    <a:bodyPr/>
+                    <a:lstStyle/>
+                    <a:p>
+                      <a:pPr algn="ctr" fontAlgn="ctr"/>
+                      <a:r>
+                        <a:rPr lang="en-US" sz="1100" b="0" i="0" u="none" strike="noStrike">
+                          <a:solidFill>
+                            <a:srgbClr val="000000"/>
+                          </a:solidFill>
+                          <a:effectLst/>
+                          <a:latin typeface="Calibri" panose="020F0502020204030204" pitchFamily="34" charset="0"/>
+                        </a:rPr>
+                        <a:t>Pie chart</a:t>
+                      </a:r>
+                    </a:p>
+                  </a:txBody>
+                  <a:tcPr marL="9525" marR="9525" marT="9525" marB="0" anchor="ctr">
+                    <a:lnL>
+                      <a:noFill/>
+                    </a:lnL>
+                    <a:lnR>
+                      <a:noFill/>
+                    </a:lnR>
+                    <a:lnT w="12700" cap="flat" cmpd="sng" algn="ctr">
+                      <a:solidFill>
+                        <a:srgbClr val="000000"/>
+                      </a:solidFill>
+                      <a:prstDash val="solid"/>
+                      <a:round/>
+                      <a:headEnd type="none" w="med" len="med"/>
+                      <a:tailEnd type="none" w="med" len="med"/>
+                    </a:lnT>
+                    <a:lnB>
+                      <a:noFill/>
+                    </a:lnB>
+                    <a:solidFill>
+                      <a:srgbClr val="D9D9D9"/>
+                    </a:solidFill>
+                  </a:tcPr>
+                </a:tc>
+                <a:tc>
+                  <a:txBody>
+                    <a:bodyPr/>
+                    <a:lstStyle/>
+                    <a:p>
+                      <a:pPr algn="ctr" fontAlgn="ctr"/>
+                      <a:r>
+                        <a:rPr lang="en-US" sz="1100" b="0" i="0" u="none" strike="noStrike">
+                          <a:solidFill>
+                            <a:srgbClr val="000000"/>
+                          </a:solidFill>
+                          <a:effectLst/>
+                          <a:latin typeface="Calibri" panose="020F0502020204030204" pitchFamily="34" charset="0"/>
+                        </a:rPr>
+                        <a:t>No</a:t>
+                      </a:r>
+                    </a:p>
+                  </a:txBody>
+                  <a:tcPr marL="9525" marR="9525" marT="9525" marB="0" anchor="ctr">
+                    <a:lnL>
+                      <a:noFill/>
+                    </a:lnL>
+                    <a:lnR>
+                      <a:noFill/>
+                    </a:lnR>
+                    <a:lnT w="6350" cap="flat" cmpd="sng" algn="ctr">
+                      <a:solidFill>
+                        <a:srgbClr val="000000"/>
+                      </a:solidFill>
+                      <a:prstDash val="solid"/>
+                      <a:round/>
+                      <a:headEnd type="none" w="med" len="med"/>
+                      <a:tailEnd type="none" w="med" len="med"/>
+                    </a:lnT>
+                    <a:lnB>
+                      <a:noFill/>
+                    </a:lnB>
+                    <a:solidFill>
+                      <a:srgbClr val="D9D9D9"/>
+                    </a:solidFill>
+                  </a:tcPr>
+                </a:tc>
+                <a:tc>
+                  <a:txBody>
+                    <a:bodyPr/>
+                    <a:lstStyle/>
+                    <a:p>
+                      <a:pPr algn="ctr" fontAlgn="ctr"/>
+                      <a:r>
+                        <a:rPr lang="en-US" sz="1100" b="0" i="0" u="none" strike="noStrike">
+                          <a:solidFill>
+                            <a:srgbClr val="000000"/>
+                          </a:solidFill>
+                          <a:effectLst/>
+                          <a:latin typeface="Calibri" panose="020F0502020204030204" pitchFamily="34" charset="0"/>
+                        </a:rPr>
+                        <a:t>Demographic</a:t>
+                      </a:r>
+                    </a:p>
+                  </a:txBody>
+                  <a:tcPr marL="9525" marR="9525" marT="9525" marB="0" anchor="ctr">
+                    <a:lnL>
+                      <a:noFill/>
+                    </a:lnL>
+                    <a:lnR w="6350" cap="flat" cmpd="sng" algn="ctr">
+                      <a:solidFill>
+                        <a:srgbClr val="000000"/>
+                      </a:solidFill>
+                      <a:prstDash val="solid"/>
+                      <a:round/>
+                      <a:headEnd type="none" w="med" len="med"/>
+                      <a:tailEnd type="none" w="med" len="med"/>
+                    </a:lnR>
+                    <a:lnT w="6350" cap="flat" cmpd="sng" algn="ctr">
+                      <a:solidFill>
+                        <a:srgbClr val="000000"/>
+                      </a:solidFill>
+                      <a:prstDash val="solid"/>
+                      <a:round/>
+                      <a:headEnd type="none" w="med" len="med"/>
+                      <a:tailEnd type="none" w="med" len="med"/>
+                    </a:lnT>
+                    <a:lnB>
+                      <a:noFill/>
+                    </a:lnB>
+                    <a:solidFill>
+                      <a:srgbClr val="D9D9D9"/>
+                    </a:solidFill>
+                  </a:tcPr>
+                </a:tc>
+                <a:extLst>
+                  <a:ext uri="{0D108BD9-81ED-4DB2-BD59-A6C34878D82A}">
+                    <a16:rowId xmlns:a16="http://schemas.microsoft.com/office/drawing/2014/main" val="3611411439"/>
+                  </a:ext>
+                </a:extLst>
+              </a:tr>
+              <a:tr h="190500">
+                <a:tc>
+                  <a:txBody>
+                    <a:bodyPr/>
+                    <a:lstStyle/>
+                    <a:p>
+                      <a:pPr algn="ctr" fontAlgn="ctr"/>
+                      <a:r>
+                        <a:rPr lang="en-US" sz="1100" b="0" i="0" u="none" strike="noStrike">
+                          <a:solidFill>
+                            <a:srgbClr val="000000"/>
+                          </a:solidFill>
+                          <a:effectLst/>
+                          <a:latin typeface="Calibri" panose="020F0502020204030204" pitchFamily="34" charset="0"/>
+                        </a:rPr>
+                        <a:t>GENDER</a:t>
+                      </a:r>
+                    </a:p>
+                  </a:txBody>
+                  <a:tcPr marL="9525" marR="9525" marT="9525" marB="0" anchor="ctr">
+                    <a:lnL w="6350" cap="flat" cmpd="sng" algn="ctr">
+                      <a:solidFill>
+                        <a:srgbClr val="000000"/>
+                      </a:solidFill>
+                      <a:prstDash val="solid"/>
+                      <a:round/>
+                      <a:headEnd type="none" w="med" len="med"/>
+                      <a:tailEnd type="none" w="med" len="med"/>
+                    </a:lnL>
+                    <a:lnR>
+                      <a:noFill/>
+                    </a:lnR>
+                    <a:lnT>
+                      <a:noFill/>
+                    </a:lnT>
+                    <a:lnB>
+                      <a:noFill/>
+                    </a:lnB>
+                  </a:tcPr>
+                </a:tc>
+                <a:tc>
+                  <a:txBody>
+                    <a:bodyPr/>
+                    <a:lstStyle/>
+                    <a:p>
+                      <a:pPr algn="ctr" fontAlgn="ctr"/>
+                      <a:r>
+                        <a:rPr lang="en-US" sz="1100" b="0" i="0" u="none" strike="noStrike">
+                          <a:solidFill>
+                            <a:srgbClr val="000000"/>
+                          </a:solidFill>
+                          <a:effectLst/>
+                          <a:latin typeface="Calibri" panose="020F0502020204030204" pitchFamily="34" charset="0"/>
+                        </a:rPr>
+                        <a:t>Court (filter)</a:t>
+                      </a:r>
+                    </a:p>
+                  </a:txBody>
+                  <a:tcPr marL="9525" marR="9525" marT="9525" marB="0" anchor="ctr">
+                    <a:lnL>
+                      <a:noFill/>
+                    </a:lnL>
+                    <a:lnR>
+                      <a:noFill/>
+                    </a:lnR>
+                    <a:lnT>
+                      <a:noFill/>
+                    </a:lnT>
+                    <a:lnB>
+                      <a:noFill/>
+                    </a:lnB>
+                  </a:tcPr>
+                </a:tc>
+                <a:tc>
+                  <a:txBody>
+                    <a:bodyPr/>
+                    <a:lstStyle/>
+                    <a:p>
+                      <a:pPr algn="ctr" fontAlgn="ctr"/>
+                      <a:r>
+                        <a:rPr lang="en-US" sz="1100" b="0" i="0" u="none" strike="noStrike">
+                          <a:solidFill>
+                            <a:srgbClr val="000000"/>
+                          </a:solidFill>
+                          <a:effectLst/>
+                          <a:latin typeface="Calibri" panose="020F0502020204030204" pitchFamily="34" charset="0"/>
+                        </a:rPr>
+                        <a:t>Offense (filter)</a:t>
+                      </a:r>
+                    </a:p>
+                  </a:txBody>
+                  <a:tcPr marL="9525" marR="9525" marT="9525" marB="0" anchor="ctr">
+                    <a:lnL>
+                      <a:noFill/>
+                    </a:lnL>
+                    <a:lnR>
+                      <a:noFill/>
+                    </a:lnR>
+                    <a:lnT>
+                      <a:noFill/>
+                    </a:lnT>
+                    <a:lnB>
+                      <a:noFill/>
+                    </a:lnB>
+                  </a:tcPr>
+                </a:tc>
+                <a:tc>
+                  <a:txBody>
+                    <a:bodyPr/>
+                    <a:lstStyle/>
+                    <a:p>
+                      <a:pPr algn="ctr" fontAlgn="ctr"/>
+                      <a:r>
+                        <a:rPr lang="en-US" sz="1100" b="0" i="0" u="none" strike="noStrike">
+                          <a:solidFill>
+                            <a:srgbClr val="000000"/>
+                          </a:solidFill>
+                          <a:effectLst/>
+                          <a:latin typeface="Calibri" panose="020F0502020204030204" pitchFamily="34" charset="0"/>
+                        </a:rPr>
+                        <a:t>Sentence (filter)</a:t>
+                      </a:r>
+                    </a:p>
+                  </a:txBody>
+                  <a:tcPr marL="9525" marR="9525" marT="9525" marB="0" anchor="ctr">
+                    <a:lnL>
+                      <a:noFill/>
+                    </a:lnL>
+                    <a:lnR>
+                      <a:noFill/>
+                    </a:lnR>
+                    <a:lnT>
+                      <a:noFill/>
+                    </a:lnT>
+                    <a:lnB>
+                      <a:noFill/>
+                    </a:lnB>
+                  </a:tcPr>
+                </a:tc>
+                <a:tc>
+                  <a:txBody>
+                    <a:bodyPr/>
+                    <a:lstStyle/>
+                    <a:p>
+                      <a:pPr algn="ctr" fontAlgn="ctr"/>
+                      <a:r>
+                        <a:rPr lang="en-US" sz="1100" b="0" i="0" u="none" strike="noStrike">
+                          <a:solidFill>
+                            <a:srgbClr val="000000"/>
+                          </a:solidFill>
+                          <a:effectLst/>
+                          <a:latin typeface="Calibri" panose="020F0502020204030204" pitchFamily="34" charset="0"/>
+                        </a:rPr>
+                        <a:t>ID</a:t>
+                      </a:r>
+                    </a:p>
+                  </a:txBody>
+                  <a:tcPr marL="9525" marR="9525" marT="9525" marB="0" anchor="ctr">
+                    <a:lnL>
+                      <a:noFill/>
+                    </a:lnL>
+                    <a:lnR>
+                      <a:noFill/>
+                    </a:lnR>
+                    <a:lnT>
+                      <a:noFill/>
+                    </a:lnT>
+                    <a:lnB>
+                      <a:noFill/>
+                    </a:lnB>
+                  </a:tcPr>
+                </a:tc>
+                <a:tc>
+                  <a:txBody>
+                    <a:bodyPr/>
+                    <a:lstStyle/>
+                    <a:p>
+                      <a:pPr algn="ctr" fontAlgn="ctr"/>
+                      <a:r>
+                        <a:rPr lang="en-US" sz="1100" b="0" i="0" u="none" strike="noStrike">
+                          <a:solidFill>
+                            <a:srgbClr val="000000"/>
+                          </a:solidFill>
+                          <a:effectLst/>
+                          <a:latin typeface="Calibri" panose="020F0502020204030204" pitchFamily="34" charset="0"/>
+                        </a:rPr>
+                        <a:t>Pie chart </a:t>
+                      </a:r>
+                    </a:p>
+                  </a:txBody>
+                  <a:tcPr marL="9525" marR="9525" marT="9525" marB="0" anchor="ctr">
+                    <a:lnL>
+                      <a:noFill/>
+                    </a:lnL>
+                    <a:lnR>
+                      <a:noFill/>
+                    </a:lnR>
+                    <a:lnT>
+                      <a:noFill/>
+                    </a:lnT>
+                    <a:lnB>
+                      <a:noFill/>
+                    </a:lnB>
+                  </a:tcPr>
+                </a:tc>
+                <a:tc>
+                  <a:txBody>
+                    <a:bodyPr/>
+                    <a:lstStyle/>
+                    <a:p>
+                      <a:pPr algn="ctr" fontAlgn="ctr"/>
+                      <a:r>
+                        <a:rPr lang="en-US" sz="1100" b="0" i="0" u="none" strike="noStrike">
+                          <a:solidFill>
+                            <a:srgbClr val="000000"/>
+                          </a:solidFill>
+                          <a:effectLst/>
+                          <a:latin typeface="Calibri" panose="020F0502020204030204" pitchFamily="34" charset="0"/>
+                        </a:rPr>
+                        <a:t>No</a:t>
+                      </a:r>
+                    </a:p>
+                  </a:txBody>
+                  <a:tcPr marL="9525" marR="9525" marT="9525" marB="0" anchor="ctr">
+                    <a:lnL>
+                      <a:noFill/>
+                    </a:lnL>
+                    <a:lnR>
+                      <a:noFill/>
+                    </a:lnR>
+                    <a:lnT>
+                      <a:noFill/>
+                    </a:lnT>
+                    <a:lnB>
+                      <a:noFill/>
+                    </a:lnB>
+                  </a:tcPr>
+                </a:tc>
+                <a:tc>
+                  <a:txBody>
+                    <a:bodyPr/>
+                    <a:lstStyle/>
+                    <a:p>
+                      <a:pPr algn="ctr" fontAlgn="ctr"/>
+                      <a:r>
+                        <a:rPr lang="en-US" sz="1100" b="0" i="0" u="none" strike="noStrike">
+                          <a:solidFill>
+                            <a:srgbClr val="000000"/>
+                          </a:solidFill>
+                          <a:effectLst/>
+                          <a:latin typeface="Calibri" panose="020F0502020204030204" pitchFamily="34" charset="0"/>
+                        </a:rPr>
+                        <a:t>Demographic</a:t>
+                      </a:r>
+                    </a:p>
+                  </a:txBody>
+                  <a:tcPr marL="9525" marR="9525" marT="9525" marB="0" anchor="ctr">
+                    <a:lnL>
+                      <a:noFill/>
+                    </a:lnL>
+                    <a:lnR w="6350" cap="flat" cmpd="sng" algn="ctr">
+                      <a:solidFill>
+                        <a:srgbClr val="000000"/>
+                      </a:solidFill>
+                      <a:prstDash val="solid"/>
+                      <a:round/>
+                      <a:headEnd type="none" w="med" len="med"/>
+                      <a:tailEnd type="none" w="med" len="med"/>
+                    </a:lnR>
+                    <a:lnT>
+                      <a:noFill/>
+                    </a:lnT>
+                    <a:lnB>
+                      <a:noFill/>
+                    </a:lnB>
+                  </a:tcPr>
+                </a:tc>
+                <a:extLst>
+                  <a:ext uri="{0D108BD9-81ED-4DB2-BD59-A6C34878D82A}">
+                    <a16:rowId xmlns:a16="http://schemas.microsoft.com/office/drawing/2014/main" val="1861627"/>
+                  </a:ext>
+                </a:extLst>
+              </a:tr>
+              <a:tr h="190500">
+                <a:tc>
+                  <a:txBody>
+                    <a:bodyPr/>
+                    <a:lstStyle/>
+                    <a:p>
+                      <a:pPr algn="ctr" fontAlgn="ctr"/>
+                      <a:r>
+                        <a:rPr lang="en-US" sz="1100" b="0" i="0" u="none" strike="noStrike">
+                          <a:solidFill>
+                            <a:srgbClr val="000000"/>
+                          </a:solidFill>
+                          <a:effectLst/>
+                          <a:latin typeface="Calibri" panose="020F0502020204030204" pitchFamily="34" charset="0"/>
+                        </a:rPr>
+                        <a:t>RACE</a:t>
+                      </a:r>
+                    </a:p>
+                  </a:txBody>
+                  <a:tcPr marL="9525" marR="9525" marT="9525" marB="0" anchor="ctr">
+                    <a:lnL w="6350" cap="flat" cmpd="sng" algn="ctr">
+                      <a:solidFill>
+                        <a:srgbClr val="000000"/>
+                      </a:solidFill>
+                      <a:prstDash val="solid"/>
+                      <a:round/>
+                      <a:headEnd type="none" w="med" len="med"/>
+                      <a:tailEnd type="none" w="med" len="med"/>
+                    </a:lnL>
+                    <a:lnR>
+                      <a:noFill/>
+                    </a:lnR>
+                    <a:lnT>
+                      <a:noFill/>
+                    </a:lnT>
+                    <a:lnB>
+                      <a:noFill/>
+                    </a:lnB>
+                    <a:solidFill>
+                      <a:srgbClr val="D9D9D9"/>
+                    </a:solidFill>
+                  </a:tcPr>
+                </a:tc>
+                <a:tc>
+                  <a:txBody>
+                    <a:bodyPr/>
+                    <a:lstStyle/>
+                    <a:p>
+                      <a:pPr algn="ctr" fontAlgn="ctr"/>
+                      <a:r>
+                        <a:rPr lang="en-US" sz="1100" b="0" i="0" u="none" strike="noStrike">
+                          <a:solidFill>
+                            <a:srgbClr val="000000"/>
+                          </a:solidFill>
+                          <a:effectLst/>
+                          <a:latin typeface="Calibri" panose="020F0502020204030204" pitchFamily="34" charset="0"/>
+                        </a:rPr>
+                        <a:t>Court (filter)</a:t>
+                      </a:r>
+                    </a:p>
+                  </a:txBody>
+                  <a:tcPr marL="9525" marR="9525" marT="9525" marB="0" anchor="ctr">
+                    <a:lnL>
+                      <a:noFill/>
+                    </a:lnL>
+                    <a:lnR>
+                      <a:noFill/>
+                    </a:lnR>
+                    <a:lnT>
+                      <a:noFill/>
+                    </a:lnT>
+                    <a:lnB>
+                      <a:noFill/>
+                    </a:lnB>
+                    <a:solidFill>
+                      <a:srgbClr val="D9D9D9"/>
+                    </a:solidFill>
+                  </a:tcPr>
+                </a:tc>
+                <a:tc>
+                  <a:txBody>
+                    <a:bodyPr/>
+                    <a:lstStyle/>
+                    <a:p>
+                      <a:pPr algn="ctr" fontAlgn="ctr"/>
+                      <a:r>
+                        <a:rPr lang="en-US" sz="1100" b="0" i="0" u="none" strike="noStrike">
+                          <a:solidFill>
+                            <a:srgbClr val="000000"/>
+                          </a:solidFill>
+                          <a:effectLst/>
+                          <a:latin typeface="Calibri" panose="020F0502020204030204" pitchFamily="34" charset="0"/>
+                        </a:rPr>
+                        <a:t>Offense (filter)</a:t>
+                      </a:r>
+                    </a:p>
+                  </a:txBody>
+                  <a:tcPr marL="9525" marR="9525" marT="9525" marB="0" anchor="ctr">
+                    <a:lnL>
+                      <a:noFill/>
+                    </a:lnL>
+                    <a:lnR>
+                      <a:noFill/>
+                    </a:lnR>
+                    <a:lnT>
+                      <a:noFill/>
+                    </a:lnT>
+                    <a:lnB>
+                      <a:noFill/>
+                    </a:lnB>
+                    <a:solidFill>
+                      <a:srgbClr val="D9D9D9"/>
+                    </a:solidFill>
+                  </a:tcPr>
+                </a:tc>
+                <a:tc>
+                  <a:txBody>
+                    <a:bodyPr/>
+                    <a:lstStyle/>
+                    <a:p>
+                      <a:pPr algn="ctr" fontAlgn="ctr"/>
+                      <a:r>
+                        <a:rPr lang="en-US" sz="1100" b="0" i="0" u="none" strike="noStrike">
+                          <a:solidFill>
+                            <a:srgbClr val="000000"/>
+                          </a:solidFill>
+                          <a:effectLst/>
+                          <a:latin typeface="Calibri" panose="020F0502020204030204" pitchFamily="34" charset="0"/>
+                        </a:rPr>
+                        <a:t>Sentence (filter)</a:t>
+                      </a:r>
+                    </a:p>
+                  </a:txBody>
+                  <a:tcPr marL="9525" marR="9525" marT="9525" marB="0" anchor="ctr">
+                    <a:lnL>
+                      <a:noFill/>
+                    </a:lnL>
+                    <a:lnR>
+                      <a:noFill/>
+                    </a:lnR>
+                    <a:lnT>
+                      <a:noFill/>
+                    </a:lnT>
+                    <a:lnB>
+                      <a:noFill/>
+                    </a:lnB>
+                    <a:solidFill>
+                      <a:srgbClr val="D9D9D9"/>
+                    </a:solidFill>
+                  </a:tcPr>
+                </a:tc>
+                <a:tc>
+                  <a:txBody>
+                    <a:bodyPr/>
+                    <a:lstStyle/>
+                    <a:p>
+                      <a:pPr algn="ctr" fontAlgn="ctr"/>
+                      <a:r>
+                        <a:rPr lang="en-US" sz="1100" b="0" i="0" u="none" strike="noStrike">
+                          <a:solidFill>
+                            <a:srgbClr val="000000"/>
+                          </a:solidFill>
+                          <a:effectLst/>
+                          <a:latin typeface="Calibri" panose="020F0502020204030204" pitchFamily="34" charset="0"/>
+                        </a:rPr>
+                        <a:t>ID</a:t>
+                      </a:r>
+                    </a:p>
+                  </a:txBody>
+                  <a:tcPr marL="9525" marR="9525" marT="9525" marB="0" anchor="ctr">
+                    <a:lnL>
+                      <a:noFill/>
+                    </a:lnL>
+                    <a:lnR>
+                      <a:noFill/>
+                    </a:lnR>
+                    <a:lnT>
+                      <a:noFill/>
+                    </a:lnT>
+                    <a:lnB>
+                      <a:noFill/>
+                    </a:lnB>
+                    <a:solidFill>
+                      <a:srgbClr val="D9D9D9"/>
+                    </a:solidFill>
+                  </a:tcPr>
+                </a:tc>
+                <a:tc>
+                  <a:txBody>
+                    <a:bodyPr/>
+                    <a:lstStyle/>
+                    <a:p>
+                      <a:pPr algn="ctr" fontAlgn="ctr"/>
+                      <a:r>
+                        <a:rPr lang="en-US" sz="1100" b="0" i="0" u="none" strike="noStrike">
+                          <a:solidFill>
+                            <a:srgbClr val="000000"/>
+                          </a:solidFill>
+                          <a:effectLst/>
+                          <a:latin typeface="Calibri" panose="020F0502020204030204" pitchFamily="34" charset="0"/>
+                        </a:rPr>
+                        <a:t>Pie chart</a:t>
+                      </a:r>
+                    </a:p>
+                  </a:txBody>
+                  <a:tcPr marL="9525" marR="9525" marT="9525" marB="0" anchor="ctr">
+                    <a:lnL>
+                      <a:noFill/>
+                    </a:lnL>
+                    <a:lnR>
+                      <a:noFill/>
+                    </a:lnR>
+                    <a:lnT>
+                      <a:noFill/>
+                    </a:lnT>
+                    <a:lnB>
+                      <a:noFill/>
+                    </a:lnB>
+                    <a:solidFill>
+                      <a:srgbClr val="D9D9D9"/>
+                    </a:solidFill>
+                  </a:tcPr>
+                </a:tc>
+                <a:tc>
+                  <a:txBody>
+                    <a:bodyPr/>
+                    <a:lstStyle/>
+                    <a:p>
+                      <a:pPr algn="ctr" fontAlgn="ctr"/>
+                      <a:r>
+                        <a:rPr lang="en-US" sz="1100" b="0" i="0" u="none" strike="noStrike">
+                          <a:solidFill>
+                            <a:srgbClr val="000000"/>
+                          </a:solidFill>
+                          <a:effectLst/>
+                          <a:latin typeface="Calibri" panose="020F0502020204030204" pitchFamily="34" charset="0"/>
+                        </a:rPr>
+                        <a:t>No</a:t>
+                      </a:r>
+                    </a:p>
+                  </a:txBody>
+                  <a:tcPr marL="9525" marR="9525" marT="9525" marB="0" anchor="ctr">
+                    <a:lnL>
+                      <a:noFill/>
+                    </a:lnL>
+                    <a:lnR>
+                      <a:noFill/>
+                    </a:lnR>
+                    <a:lnT>
+                      <a:noFill/>
+                    </a:lnT>
+                    <a:lnB>
+                      <a:noFill/>
+                    </a:lnB>
+                    <a:solidFill>
+                      <a:srgbClr val="D9D9D9"/>
+                    </a:solidFill>
+                  </a:tcPr>
+                </a:tc>
+                <a:tc>
+                  <a:txBody>
+                    <a:bodyPr/>
+                    <a:lstStyle/>
+                    <a:p>
+                      <a:pPr algn="ctr" fontAlgn="ctr"/>
+                      <a:r>
+                        <a:rPr lang="en-US" sz="1100" b="0" i="0" u="none" strike="noStrike">
+                          <a:solidFill>
+                            <a:srgbClr val="000000"/>
+                          </a:solidFill>
+                          <a:effectLst/>
+                          <a:latin typeface="Calibri" panose="020F0502020204030204" pitchFamily="34" charset="0"/>
+                        </a:rPr>
+                        <a:t>Demographic</a:t>
+                      </a:r>
+                    </a:p>
+                  </a:txBody>
+                  <a:tcPr marL="9525" marR="9525" marT="9525" marB="0" anchor="ctr">
+                    <a:lnL>
+                      <a:noFill/>
+                    </a:lnL>
+                    <a:lnR w="6350" cap="flat" cmpd="sng" algn="ctr">
+                      <a:solidFill>
+                        <a:srgbClr val="000000"/>
+                      </a:solidFill>
+                      <a:prstDash val="solid"/>
+                      <a:round/>
+                      <a:headEnd type="none" w="med" len="med"/>
+                      <a:tailEnd type="none" w="med" len="med"/>
+                    </a:lnR>
+                    <a:lnT>
+                      <a:noFill/>
+                    </a:lnT>
+                    <a:lnB>
+                      <a:noFill/>
+                    </a:lnB>
+                    <a:solidFill>
+                      <a:srgbClr val="D9D9D9"/>
+                    </a:solidFill>
+                  </a:tcPr>
+                </a:tc>
+                <a:extLst>
+                  <a:ext uri="{0D108BD9-81ED-4DB2-BD59-A6C34878D82A}">
+                    <a16:rowId xmlns:a16="http://schemas.microsoft.com/office/drawing/2014/main" val="952423537"/>
+                  </a:ext>
+                </a:extLst>
+              </a:tr>
+              <a:tr h="190500">
+                <a:tc>
+                  <a:txBody>
+                    <a:bodyPr/>
+                    <a:lstStyle/>
+                    <a:p>
+                      <a:pPr algn="ctr" fontAlgn="ctr"/>
+                      <a:r>
+                        <a:rPr lang="en-US" sz="1100" b="0" i="0" u="none" strike="noStrike">
+                          <a:solidFill>
+                            <a:srgbClr val="000000"/>
+                          </a:solidFill>
+                          <a:effectLst/>
+                          <a:latin typeface="Calibri" panose="020F0502020204030204" pitchFamily="34" charset="0"/>
+                        </a:rPr>
+                        <a:t>Commitment term/unit</a:t>
+                      </a:r>
+                    </a:p>
+                  </a:txBody>
+                  <a:tcPr marL="9525" marR="9525" marT="9525" marB="0" anchor="ctr">
+                    <a:lnL w="6350" cap="flat" cmpd="sng" algn="ctr">
+                      <a:solidFill>
+                        <a:srgbClr val="000000"/>
+                      </a:solidFill>
+                      <a:prstDash val="solid"/>
+                      <a:round/>
+                      <a:headEnd type="none" w="med" len="med"/>
+                      <a:tailEnd type="none" w="med" len="med"/>
+                    </a:lnL>
+                    <a:lnR>
+                      <a:noFill/>
+                    </a:lnR>
+                    <a:lnT>
+                      <a:noFill/>
+                    </a:lnT>
+                    <a:lnB>
+                      <a:noFill/>
+                    </a:lnB>
+                  </a:tcPr>
+                </a:tc>
+                <a:tc>
+                  <a:txBody>
+                    <a:bodyPr/>
+                    <a:lstStyle/>
+                    <a:p>
+                      <a:pPr algn="ctr" fontAlgn="ctr"/>
+                      <a:r>
+                        <a:rPr lang="en-US" sz="1100" b="0" i="0" u="none" strike="noStrike">
+                          <a:solidFill>
+                            <a:srgbClr val="000000"/>
+                          </a:solidFill>
+                          <a:effectLst/>
+                          <a:latin typeface="Calibri" panose="020F0502020204030204" pitchFamily="34" charset="0"/>
+                        </a:rPr>
+                        <a:t>OFFENSE_CATEGORY</a:t>
+                      </a:r>
+                    </a:p>
+                  </a:txBody>
+                  <a:tcPr marL="9525" marR="9525" marT="9525" marB="0" anchor="ctr">
+                    <a:lnL>
+                      <a:noFill/>
+                    </a:lnL>
+                    <a:lnR>
+                      <a:noFill/>
+                    </a:lnR>
+                    <a:lnT>
+                      <a:noFill/>
+                    </a:lnT>
+                    <a:lnB>
+                      <a:noFill/>
+                    </a:lnB>
+                  </a:tcPr>
+                </a:tc>
+                <a:tc>
+                  <a:txBody>
+                    <a:bodyPr/>
+                    <a:lstStyle/>
+                    <a:p>
+                      <a:pPr algn="ctr" fontAlgn="ctr"/>
+                      <a:r>
+                        <a:rPr lang="en-US" sz="1100" b="0" i="0" u="none" strike="noStrike">
+                          <a:solidFill>
+                            <a:srgbClr val="000000"/>
+                          </a:solidFill>
+                          <a:effectLst/>
+                          <a:latin typeface="Calibri" panose="020F0502020204030204" pitchFamily="34" charset="0"/>
+                        </a:rPr>
+                        <a:t>commitment type (filter)</a:t>
+                      </a:r>
+                    </a:p>
+                  </a:txBody>
+                  <a:tcPr marL="9525" marR="9525" marT="9525" marB="0" anchor="ctr">
+                    <a:lnL>
+                      <a:noFill/>
+                    </a:lnL>
+                    <a:lnR>
+                      <a:noFill/>
+                    </a:lnR>
+                    <a:lnT>
+                      <a:noFill/>
+                    </a:lnT>
+                    <a:lnB>
+                      <a:noFill/>
+                    </a:lnB>
+                  </a:tcPr>
+                </a:tc>
+                <a:tc>
+                  <a:txBody>
+                    <a:bodyPr/>
+                    <a:lstStyle/>
+                    <a:p>
+                      <a:pPr algn="ctr" fontAlgn="ctr"/>
+                      <a:r>
+                        <a:rPr lang="en-US" sz="1100" b="0" i="0" u="none" strike="noStrike">
+                          <a:solidFill>
+                            <a:srgbClr val="000000"/>
+                          </a:solidFill>
+                          <a:effectLst/>
+                          <a:latin typeface="Calibri" panose="020F0502020204030204" pitchFamily="34" charset="0"/>
+                        </a:rPr>
+                        <a:t>Court (filter)????</a:t>
+                      </a:r>
+                    </a:p>
+                  </a:txBody>
+                  <a:tcPr marL="9525" marR="9525" marT="9525" marB="0" anchor="ctr">
+                    <a:lnL>
+                      <a:noFill/>
+                    </a:lnL>
+                    <a:lnR>
+                      <a:noFill/>
+                    </a:lnR>
+                    <a:lnT>
+                      <a:noFill/>
+                    </a:lnT>
+                    <a:lnB>
+                      <a:noFill/>
+                    </a:lnB>
+                  </a:tcPr>
+                </a:tc>
+                <a:tc>
+                  <a:txBody>
+                    <a:bodyPr/>
+                    <a:lstStyle/>
+                    <a:p>
+                      <a:pPr algn="ctr" fontAlgn="ctr"/>
+                      <a:endParaRPr lang="en-US" sz="1100" b="0" i="0" u="none" strike="noStrike">
+                        <a:solidFill>
+                          <a:srgbClr val="000000"/>
+                        </a:solidFill>
+                        <a:effectLst/>
+                        <a:latin typeface="Calibri" panose="020F0502020204030204" pitchFamily="34" charset="0"/>
+                      </a:endParaRPr>
+                    </a:p>
+                  </a:txBody>
+                  <a:tcPr marL="9525" marR="9525" marT="9525" marB="0" anchor="ctr">
+                    <a:lnL>
+                      <a:noFill/>
+                    </a:lnL>
+                    <a:lnR>
+                      <a:noFill/>
+                    </a:lnR>
+                    <a:lnT>
+                      <a:noFill/>
+                    </a:lnT>
+                    <a:lnB>
+                      <a:noFill/>
+                    </a:lnB>
+                  </a:tcPr>
+                </a:tc>
+                <a:tc>
+                  <a:txBody>
+                    <a:bodyPr/>
+                    <a:lstStyle/>
+                    <a:p>
+                      <a:pPr algn="ctr" fontAlgn="ctr"/>
+                      <a:r>
+                        <a:rPr lang="en-US" sz="1100" b="0" i="0" u="none" strike="noStrike">
+                          <a:solidFill>
+                            <a:srgbClr val="000000"/>
+                          </a:solidFill>
+                          <a:effectLst/>
+                          <a:latin typeface="Calibri" panose="020F0502020204030204" pitchFamily="34" charset="0"/>
+                        </a:rPr>
+                        <a:t>Bar chart</a:t>
+                      </a:r>
+                    </a:p>
+                  </a:txBody>
+                  <a:tcPr marL="9525" marR="9525" marT="9525" marB="0" anchor="ctr">
+                    <a:lnL>
+                      <a:noFill/>
+                    </a:lnL>
+                    <a:lnR>
+                      <a:noFill/>
+                    </a:lnR>
+                    <a:lnT>
+                      <a:noFill/>
+                    </a:lnT>
+                    <a:lnB>
+                      <a:noFill/>
+                    </a:lnB>
+                  </a:tcPr>
+                </a:tc>
+                <a:tc>
+                  <a:txBody>
+                    <a:bodyPr/>
+                    <a:lstStyle/>
+                    <a:p>
+                      <a:pPr algn="ctr" fontAlgn="ctr"/>
+                      <a:r>
+                        <a:rPr lang="en-US" sz="1100" b="0" i="0" u="none" strike="noStrike">
+                          <a:solidFill>
+                            <a:srgbClr val="000000"/>
+                          </a:solidFill>
+                          <a:effectLst/>
+                          <a:latin typeface="Calibri" panose="020F0502020204030204" pitchFamily="34" charset="0"/>
+                        </a:rPr>
+                        <a:t>Yes</a:t>
+                      </a:r>
+                    </a:p>
+                  </a:txBody>
+                  <a:tcPr marL="9525" marR="9525" marT="9525" marB="0" anchor="ctr">
+                    <a:lnL>
+                      <a:noFill/>
+                    </a:lnL>
+                    <a:lnR>
+                      <a:noFill/>
+                    </a:lnR>
+                    <a:lnT>
+                      <a:noFill/>
+                    </a:lnT>
+                    <a:lnB>
+                      <a:noFill/>
+                    </a:lnB>
+                  </a:tcPr>
+                </a:tc>
+                <a:tc>
+                  <a:txBody>
+                    <a:bodyPr/>
+                    <a:lstStyle/>
+                    <a:p>
+                      <a:pPr algn="ctr" fontAlgn="ctr"/>
+                      <a:r>
+                        <a:rPr lang="en-US" sz="1100" b="0" i="0" u="none" strike="noStrike">
+                          <a:solidFill>
+                            <a:srgbClr val="000000"/>
+                          </a:solidFill>
+                          <a:effectLst/>
+                          <a:latin typeface="Calibri" panose="020F0502020204030204" pitchFamily="34" charset="0"/>
+                        </a:rPr>
+                        <a:t>Offense Category</a:t>
+                      </a:r>
+                    </a:p>
+                  </a:txBody>
+                  <a:tcPr marL="9525" marR="9525" marT="9525" marB="0" anchor="ctr">
+                    <a:lnL>
+                      <a:noFill/>
+                    </a:lnL>
+                    <a:lnR w="6350" cap="flat" cmpd="sng" algn="ctr">
+                      <a:solidFill>
+                        <a:srgbClr val="000000"/>
+                      </a:solidFill>
+                      <a:prstDash val="solid"/>
+                      <a:round/>
+                      <a:headEnd type="none" w="med" len="med"/>
+                      <a:tailEnd type="none" w="med" len="med"/>
+                    </a:lnR>
+                    <a:lnT>
+                      <a:noFill/>
+                    </a:lnT>
+                    <a:lnB>
+                      <a:noFill/>
+                    </a:lnB>
+                  </a:tcPr>
+                </a:tc>
+                <a:extLst>
+                  <a:ext uri="{0D108BD9-81ED-4DB2-BD59-A6C34878D82A}">
+                    <a16:rowId xmlns:a16="http://schemas.microsoft.com/office/drawing/2014/main" val="801547016"/>
+                  </a:ext>
+                </a:extLst>
+              </a:tr>
+              <a:tr h="190500">
+                <a:tc>
+                  <a:txBody>
+                    <a:bodyPr/>
+                    <a:lstStyle/>
+                    <a:p>
+                      <a:pPr algn="ctr" fontAlgn="ctr"/>
+                      <a:r>
+                        <a:rPr lang="en-US" sz="1100" b="0" i="0" u="none" strike="noStrike">
+                          <a:solidFill>
+                            <a:srgbClr val="000000"/>
+                          </a:solidFill>
+                          <a:effectLst/>
+                          <a:latin typeface="Calibri" panose="020F0502020204030204" pitchFamily="34" charset="0"/>
+                        </a:rPr>
+                        <a:t>LENGTH_OF_CASE_in_Days</a:t>
+                      </a:r>
+                    </a:p>
+                  </a:txBody>
+                  <a:tcPr marL="9525" marR="9525" marT="9525" marB="0" anchor="ctr">
+                    <a:lnL w="6350" cap="flat" cmpd="sng" algn="ctr">
+                      <a:solidFill>
+                        <a:srgbClr val="000000"/>
+                      </a:solidFill>
+                      <a:prstDash val="solid"/>
+                      <a:round/>
+                      <a:headEnd type="none" w="med" len="med"/>
+                      <a:tailEnd type="none" w="med" len="med"/>
+                    </a:lnL>
+                    <a:lnR>
+                      <a:noFill/>
+                    </a:lnR>
+                    <a:lnT>
+                      <a:noFill/>
+                    </a:lnT>
+                    <a:lnB>
+                      <a:noFill/>
+                    </a:lnB>
+                    <a:solidFill>
+                      <a:srgbClr val="D9D9D9"/>
+                    </a:solidFill>
+                  </a:tcPr>
+                </a:tc>
+                <a:tc>
+                  <a:txBody>
+                    <a:bodyPr/>
+                    <a:lstStyle/>
+                    <a:p>
+                      <a:pPr algn="ctr" fontAlgn="ctr"/>
+                      <a:r>
+                        <a:rPr lang="en-US" sz="1100" b="0" i="0" u="none" strike="noStrike">
+                          <a:solidFill>
+                            <a:srgbClr val="000000"/>
+                          </a:solidFill>
+                          <a:effectLst/>
+                          <a:latin typeface="Calibri" panose="020F0502020204030204" pitchFamily="34" charset="0"/>
+                        </a:rPr>
+                        <a:t>Commitment term/unit</a:t>
+                      </a:r>
+                    </a:p>
+                  </a:txBody>
+                  <a:tcPr marL="9525" marR="9525" marT="9525" marB="0" anchor="ctr">
+                    <a:lnL>
+                      <a:noFill/>
+                    </a:lnL>
+                    <a:lnR>
+                      <a:noFill/>
+                    </a:lnR>
+                    <a:lnT>
+                      <a:noFill/>
+                    </a:lnT>
+                    <a:lnB>
+                      <a:noFill/>
+                    </a:lnB>
+                    <a:solidFill>
+                      <a:srgbClr val="D9D9D9"/>
+                    </a:solidFill>
+                  </a:tcPr>
+                </a:tc>
+                <a:tc>
+                  <a:txBody>
+                    <a:bodyPr/>
+                    <a:lstStyle/>
+                    <a:p>
+                      <a:pPr algn="ctr" fontAlgn="ctr"/>
+                      <a:r>
+                        <a:rPr lang="en-US" sz="1100" b="0" i="0" u="none" strike="noStrike">
+                          <a:solidFill>
+                            <a:srgbClr val="000000"/>
+                          </a:solidFill>
+                          <a:effectLst/>
+                          <a:latin typeface="Calibri" panose="020F0502020204030204" pitchFamily="34" charset="0"/>
+                        </a:rPr>
+                        <a:t>Offense (filter)</a:t>
+                      </a:r>
+                    </a:p>
+                  </a:txBody>
+                  <a:tcPr marL="9525" marR="9525" marT="9525" marB="0" anchor="ctr">
+                    <a:lnL>
+                      <a:noFill/>
+                    </a:lnL>
+                    <a:lnR>
+                      <a:noFill/>
+                    </a:lnR>
+                    <a:lnT>
+                      <a:noFill/>
+                    </a:lnT>
+                    <a:lnB>
+                      <a:noFill/>
+                    </a:lnB>
+                    <a:solidFill>
+                      <a:srgbClr val="D9D9D9"/>
+                    </a:solidFill>
+                  </a:tcPr>
+                </a:tc>
+                <a:tc>
+                  <a:txBody>
+                    <a:bodyPr/>
+                    <a:lstStyle/>
+                    <a:p>
+                      <a:pPr algn="ctr" fontAlgn="ctr"/>
+                      <a:r>
+                        <a:rPr lang="en-US" sz="1100" b="0" i="0" u="none" strike="noStrike">
+                          <a:solidFill>
+                            <a:srgbClr val="000000"/>
+                          </a:solidFill>
+                          <a:effectLst/>
+                          <a:latin typeface="Calibri" panose="020F0502020204030204" pitchFamily="34" charset="0"/>
+                        </a:rPr>
+                        <a:t>COMMITMENT_TYPE (filter)</a:t>
+                      </a:r>
+                    </a:p>
+                  </a:txBody>
+                  <a:tcPr marL="9525" marR="9525" marT="9525" marB="0" anchor="ctr">
+                    <a:lnL>
+                      <a:noFill/>
+                    </a:lnL>
+                    <a:lnR>
+                      <a:noFill/>
+                    </a:lnR>
+                    <a:lnT>
+                      <a:noFill/>
+                    </a:lnT>
+                    <a:lnB>
+                      <a:noFill/>
+                    </a:lnB>
+                    <a:solidFill>
+                      <a:srgbClr val="D9D9D9"/>
+                    </a:solidFill>
+                  </a:tcPr>
+                </a:tc>
+                <a:tc>
+                  <a:txBody>
+                    <a:bodyPr/>
+                    <a:lstStyle/>
+                    <a:p>
+                      <a:pPr algn="ctr" fontAlgn="ctr"/>
+                      <a:r>
+                        <a:rPr lang="en-US" sz="1100" b="0" i="0" u="none" strike="noStrike">
+                          <a:solidFill>
+                            <a:srgbClr val="000000"/>
+                          </a:solidFill>
+                          <a:effectLst/>
+                          <a:latin typeface="Calibri" panose="020F0502020204030204" pitchFamily="34" charset="0"/>
+                        </a:rPr>
+                        <a:t>AGE_AT_INCIDENT</a:t>
+                      </a:r>
+                    </a:p>
+                  </a:txBody>
+                  <a:tcPr marL="9525" marR="9525" marT="9525" marB="0" anchor="ctr">
+                    <a:lnL>
+                      <a:noFill/>
+                    </a:lnL>
+                    <a:lnR>
+                      <a:noFill/>
+                    </a:lnR>
+                    <a:lnT>
+                      <a:noFill/>
+                    </a:lnT>
+                    <a:lnB>
+                      <a:noFill/>
+                    </a:lnB>
+                    <a:solidFill>
+                      <a:srgbClr val="D9D9D9"/>
+                    </a:solidFill>
+                  </a:tcPr>
+                </a:tc>
+                <a:tc>
+                  <a:txBody>
+                    <a:bodyPr/>
+                    <a:lstStyle/>
+                    <a:p>
+                      <a:pPr algn="ctr" fontAlgn="ctr"/>
+                      <a:r>
+                        <a:rPr lang="en-US" sz="1100" b="0" i="0" u="none" strike="noStrike">
+                          <a:solidFill>
+                            <a:srgbClr val="000000"/>
+                          </a:solidFill>
+                          <a:effectLst/>
+                          <a:latin typeface="Calibri" panose="020F0502020204030204" pitchFamily="34" charset="0"/>
+                        </a:rPr>
+                        <a:t>Line/scatter graph</a:t>
+                      </a:r>
+                    </a:p>
+                  </a:txBody>
+                  <a:tcPr marL="9525" marR="9525" marT="9525" marB="0" anchor="ctr">
+                    <a:lnL>
+                      <a:noFill/>
+                    </a:lnL>
+                    <a:lnR>
+                      <a:noFill/>
+                    </a:lnR>
+                    <a:lnT>
+                      <a:noFill/>
+                    </a:lnT>
+                    <a:lnB>
+                      <a:noFill/>
+                    </a:lnB>
+                    <a:solidFill>
+                      <a:srgbClr val="D9D9D9"/>
+                    </a:solidFill>
+                  </a:tcPr>
+                </a:tc>
+                <a:tc>
+                  <a:txBody>
+                    <a:bodyPr/>
+                    <a:lstStyle/>
+                    <a:p>
+                      <a:pPr algn="ctr" fontAlgn="ctr"/>
+                      <a:r>
+                        <a:rPr lang="en-US" sz="1100" b="0" i="0" u="none" strike="noStrike">
+                          <a:solidFill>
+                            <a:srgbClr val="000000"/>
+                          </a:solidFill>
+                          <a:effectLst/>
+                          <a:latin typeface="Calibri" panose="020F0502020204030204" pitchFamily="34" charset="0"/>
+                        </a:rPr>
+                        <a:t>Yes</a:t>
+                      </a:r>
+                    </a:p>
+                  </a:txBody>
+                  <a:tcPr marL="9525" marR="9525" marT="9525" marB="0" anchor="ctr">
+                    <a:lnL>
+                      <a:noFill/>
+                    </a:lnL>
+                    <a:lnR>
+                      <a:noFill/>
+                    </a:lnR>
+                    <a:lnT>
+                      <a:noFill/>
+                    </a:lnT>
+                    <a:lnB>
+                      <a:noFill/>
+                    </a:lnB>
+                    <a:solidFill>
+                      <a:srgbClr val="D9D9D9"/>
+                    </a:solidFill>
+                  </a:tcPr>
+                </a:tc>
+                <a:tc>
+                  <a:txBody>
+                    <a:bodyPr/>
+                    <a:lstStyle/>
+                    <a:p>
+                      <a:pPr algn="ctr" fontAlgn="ctr"/>
+                      <a:r>
+                        <a:rPr lang="en-US" sz="1100" b="0" i="0" u="none" strike="noStrike">
+                          <a:solidFill>
+                            <a:srgbClr val="000000"/>
+                          </a:solidFill>
+                          <a:effectLst/>
+                          <a:latin typeface="Calibri" panose="020F0502020204030204" pitchFamily="34" charset="0"/>
+                        </a:rPr>
+                        <a:t>Length of case</a:t>
+                      </a:r>
+                    </a:p>
+                  </a:txBody>
+                  <a:tcPr marL="9525" marR="9525" marT="9525" marB="0" anchor="ctr">
+                    <a:lnL>
+                      <a:noFill/>
+                    </a:lnL>
+                    <a:lnR w="6350" cap="flat" cmpd="sng" algn="ctr">
+                      <a:solidFill>
+                        <a:srgbClr val="000000"/>
+                      </a:solidFill>
+                      <a:prstDash val="solid"/>
+                      <a:round/>
+                      <a:headEnd type="none" w="med" len="med"/>
+                      <a:tailEnd type="none" w="med" len="med"/>
+                    </a:lnR>
+                    <a:lnT>
+                      <a:noFill/>
+                    </a:lnT>
+                    <a:lnB>
+                      <a:noFill/>
+                    </a:lnB>
+                    <a:solidFill>
+                      <a:srgbClr val="D9D9D9"/>
+                    </a:solidFill>
+                  </a:tcPr>
+                </a:tc>
+                <a:extLst>
+                  <a:ext uri="{0D108BD9-81ED-4DB2-BD59-A6C34878D82A}">
+                    <a16:rowId xmlns:a16="http://schemas.microsoft.com/office/drawing/2014/main" val="3023096550"/>
+                  </a:ext>
+                </a:extLst>
+              </a:tr>
+              <a:tr h="190500">
+                <a:tc>
+                  <a:txBody>
+                    <a:bodyPr/>
+                    <a:lstStyle/>
+                    <a:p>
+                      <a:pPr algn="ctr" fontAlgn="ctr"/>
+                      <a:r>
+                        <a:rPr lang="en-US" sz="1100" b="0" i="0" u="none" strike="noStrike">
+                          <a:solidFill>
+                            <a:srgbClr val="000000"/>
+                          </a:solidFill>
+                          <a:effectLst/>
+                          <a:latin typeface="Calibri" panose="020F0502020204030204" pitchFamily="34" charset="0"/>
+                        </a:rPr>
+                        <a:t>LENGTH_OF_CASE_in_Days</a:t>
+                      </a:r>
+                    </a:p>
+                  </a:txBody>
+                  <a:tcPr marL="9525" marR="9525" marT="9525" marB="0" anchor="ctr">
+                    <a:lnL w="6350" cap="flat" cmpd="sng" algn="ctr">
+                      <a:solidFill>
+                        <a:srgbClr val="000000"/>
+                      </a:solidFill>
+                      <a:prstDash val="solid"/>
+                      <a:round/>
+                      <a:headEnd type="none" w="med" len="med"/>
+                      <a:tailEnd type="none" w="med" len="med"/>
+                    </a:lnL>
+                    <a:lnR>
+                      <a:noFill/>
+                    </a:lnR>
+                    <a:lnT>
+                      <a:noFill/>
+                    </a:lnT>
+                    <a:lnB>
+                      <a:noFill/>
+                    </a:lnB>
+                  </a:tcPr>
+                </a:tc>
+                <a:tc>
+                  <a:txBody>
+                    <a:bodyPr/>
+                    <a:lstStyle/>
+                    <a:p>
+                      <a:pPr algn="ctr" fontAlgn="ctr"/>
+                      <a:r>
+                        <a:rPr lang="en-US" sz="1100" b="0" i="0" u="none" strike="noStrike">
+                          <a:solidFill>
+                            <a:srgbClr val="000000"/>
+                          </a:solidFill>
+                          <a:effectLst/>
+                          <a:latin typeface="Calibri" panose="020F0502020204030204" pitchFamily="34" charset="0"/>
+                        </a:rPr>
+                        <a:t>Commitment term/unit</a:t>
+                      </a:r>
+                    </a:p>
+                  </a:txBody>
+                  <a:tcPr marL="9525" marR="9525" marT="9525" marB="0" anchor="ctr">
+                    <a:lnL>
+                      <a:noFill/>
+                    </a:lnL>
+                    <a:lnR>
+                      <a:noFill/>
+                    </a:lnR>
+                    <a:lnT>
+                      <a:noFill/>
+                    </a:lnT>
+                    <a:lnB>
+                      <a:noFill/>
+                    </a:lnB>
+                  </a:tcPr>
+                </a:tc>
+                <a:tc>
+                  <a:txBody>
+                    <a:bodyPr/>
+                    <a:lstStyle/>
+                    <a:p>
+                      <a:pPr algn="ctr" fontAlgn="ctr"/>
+                      <a:r>
+                        <a:rPr lang="en-US" sz="1100" b="0" i="0" u="none" strike="noStrike">
+                          <a:solidFill>
+                            <a:srgbClr val="000000"/>
+                          </a:solidFill>
+                          <a:effectLst/>
+                          <a:latin typeface="Calibri" panose="020F0502020204030204" pitchFamily="34" charset="0"/>
+                        </a:rPr>
+                        <a:t>Offense (filter)</a:t>
+                      </a:r>
+                    </a:p>
+                  </a:txBody>
+                  <a:tcPr marL="9525" marR="9525" marT="9525" marB="0" anchor="ctr">
+                    <a:lnL>
+                      <a:noFill/>
+                    </a:lnL>
+                    <a:lnR>
+                      <a:noFill/>
+                    </a:lnR>
+                    <a:lnT>
+                      <a:noFill/>
+                    </a:lnT>
+                    <a:lnB>
+                      <a:noFill/>
+                    </a:lnB>
+                  </a:tcPr>
+                </a:tc>
+                <a:tc>
+                  <a:txBody>
+                    <a:bodyPr/>
+                    <a:lstStyle/>
+                    <a:p>
+                      <a:pPr algn="ctr" fontAlgn="ctr"/>
+                      <a:r>
+                        <a:rPr lang="en-US" sz="1100" b="0" i="0" u="none" strike="noStrike">
+                          <a:solidFill>
+                            <a:srgbClr val="000000"/>
+                          </a:solidFill>
+                          <a:effectLst/>
+                          <a:latin typeface="Calibri" panose="020F0502020204030204" pitchFamily="34" charset="0"/>
+                        </a:rPr>
+                        <a:t>COMMITMENT_TYPE (filter)</a:t>
+                      </a:r>
+                    </a:p>
+                  </a:txBody>
+                  <a:tcPr marL="9525" marR="9525" marT="9525" marB="0" anchor="ctr">
+                    <a:lnL>
+                      <a:noFill/>
+                    </a:lnL>
+                    <a:lnR>
+                      <a:noFill/>
+                    </a:lnR>
+                    <a:lnT>
+                      <a:noFill/>
+                    </a:lnT>
+                    <a:lnB>
+                      <a:noFill/>
+                    </a:lnB>
+                  </a:tcPr>
+                </a:tc>
+                <a:tc>
+                  <a:txBody>
+                    <a:bodyPr/>
+                    <a:lstStyle/>
+                    <a:p>
+                      <a:pPr algn="ctr" fontAlgn="ctr"/>
+                      <a:endParaRPr lang="en-US" sz="1100" b="0" i="0" u="none" strike="noStrike">
+                        <a:solidFill>
+                          <a:srgbClr val="000000"/>
+                        </a:solidFill>
+                        <a:effectLst/>
+                        <a:latin typeface="Calibri" panose="020F0502020204030204" pitchFamily="34" charset="0"/>
+                      </a:endParaRPr>
+                    </a:p>
+                  </a:txBody>
+                  <a:tcPr marL="9525" marR="9525" marT="9525" marB="0" anchor="ctr">
+                    <a:lnL>
+                      <a:noFill/>
+                    </a:lnL>
+                    <a:lnR>
+                      <a:noFill/>
+                    </a:lnR>
+                    <a:lnT>
+                      <a:noFill/>
+                    </a:lnT>
+                    <a:lnB>
+                      <a:noFill/>
+                    </a:lnB>
+                  </a:tcPr>
+                </a:tc>
+                <a:tc>
+                  <a:txBody>
+                    <a:bodyPr/>
+                    <a:lstStyle/>
+                    <a:p>
+                      <a:pPr algn="ctr" fontAlgn="ctr"/>
+                      <a:r>
+                        <a:rPr lang="en-US" sz="1100" b="0" i="0" u="none" strike="noStrike">
+                          <a:solidFill>
+                            <a:srgbClr val="000000"/>
+                          </a:solidFill>
+                          <a:effectLst/>
+                          <a:latin typeface="Calibri" panose="020F0502020204030204" pitchFamily="34" charset="0"/>
+                        </a:rPr>
+                        <a:t>Box plot</a:t>
+                      </a:r>
+                    </a:p>
+                  </a:txBody>
+                  <a:tcPr marL="9525" marR="9525" marT="9525" marB="0" anchor="ctr">
+                    <a:lnL>
+                      <a:noFill/>
+                    </a:lnL>
+                    <a:lnR>
+                      <a:noFill/>
+                    </a:lnR>
+                    <a:lnT>
+                      <a:noFill/>
+                    </a:lnT>
+                    <a:lnB>
+                      <a:noFill/>
+                    </a:lnB>
+                  </a:tcPr>
+                </a:tc>
+                <a:tc>
+                  <a:txBody>
+                    <a:bodyPr/>
+                    <a:lstStyle/>
+                    <a:p>
+                      <a:pPr algn="ctr" fontAlgn="ctr"/>
+                      <a:r>
+                        <a:rPr lang="en-US" sz="1100" b="0" i="0" u="none" strike="noStrike">
+                          <a:solidFill>
+                            <a:srgbClr val="000000"/>
+                          </a:solidFill>
+                          <a:effectLst/>
+                          <a:latin typeface="Calibri" panose="020F0502020204030204" pitchFamily="34" charset="0"/>
+                        </a:rPr>
+                        <a:t>No</a:t>
+                      </a:r>
+                    </a:p>
+                  </a:txBody>
+                  <a:tcPr marL="9525" marR="9525" marT="9525" marB="0" anchor="ctr">
+                    <a:lnL>
+                      <a:noFill/>
+                    </a:lnL>
+                    <a:lnR>
+                      <a:noFill/>
+                    </a:lnR>
+                    <a:lnT>
+                      <a:noFill/>
+                    </a:lnT>
+                    <a:lnB>
+                      <a:noFill/>
+                    </a:lnB>
+                  </a:tcPr>
+                </a:tc>
+                <a:tc>
+                  <a:txBody>
+                    <a:bodyPr/>
+                    <a:lstStyle/>
+                    <a:p>
+                      <a:pPr algn="ctr" fontAlgn="ctr"/>
+                      <a:r>
+                        <a:rPr lang="en-US" sz="1100" b="0" i="0" u="none" strike="noStrike">
+                          <a:solidFill>
+                            <a:srgbClr val="000000"/>
+                          </a:solidFill>
+                          <a:effectLst/>
+                          <a:latin typeface="Calibri" panose="020F0502020204030204" pitchFamily="34" charset="0"/>
+                        </a:rPr>
+                        <a:t>Length of case</a:t>
+                      </a:r>
+                    </a:p>
+                  </a:txBody>
+                  <a:tcPr marL="9525" marR="9525" marT="9525" marB="0" anchor="ctr">
+                    <a:lnL>
+                      <a:noFill/>
+                    </a:lnL>
+                    <a:lnR w="6350" cap="flat" cmpd="sng" algn="ctr">
+                      <a:solidFill>
+                        <a:srgbClr val="000000"/>
+                      </a:solidFill>
+                      <a:prstDash val="solid"/>
+                      <a:round/>
+                      <a:headEnd type="none" w="med" len="med"/>
+                      <a:tailEnd type="none" w="med" len="med"/>
+                    </a:lnR>
+                    <a:lnT>
+                      <a:noFill/>
+                    </a:lnT>
+                    <a:lnB>
+                      <a:noFill/>
+                    </a:lnB>
+                  </a:tcPr>
+                </a:tc>
+                <a:extLst>
+                  <a:ext uri="{0D108BD9-81ED-4DB2-BD59-A6C34878D82A}">
+                    <a16:rowId xmlns:a16="http://schemas.microsoft.com/office/drawing/2014/main" val="70753800"/>
+                  </a:ext>
+                </a:extLst>
+              </a:tr>
+              <a:tr h="190500">
+                <a:tc>
+                  <a:txBody>
+                    <a:bodyPr/>
+                    <a:lstStyle/>
+                    <a:p>
+                      <a:pPr algn="ctr" fontAlgn="ctr"/>
+                      <a:r>
+                        <a:rPr lang="en-US" sz="1100" b="0" i="0" u="none" strike="noStrike">
+                          <a:solidFill>
+                            <a:srgbClr val="000000"/>
+                          </a:solidFill>
+                          <a:effectLst/>
+                          <a:latin typeface="Calibri" panose="020F0502020204030204" pitchFamily="34" charset="0"/>
+                        </a:rPr>
+                        <a:t>COURT_NAME</a:t>
+                      </a:r>
+                    </a:p>
+                  </a:txBody>
+                  <a:tcPr marL="9525" marR="9525" marT="9525" marB="0" anchor="ctr">
+                    <a:lnL w="6350" cap="flat" cmpd="sng" algn="ctr">
+                      <a:solidFill>
+                        <a:srgbClr val="000000"/>
+                      </a:solidFill>
+                      <a:prstDash val="solid"/>
+                      <a:round/>
+                      <a:headEnd type="none" w="med" len="med"/>
+                      <a:tailEnd type="none" w="med" len="med"/>
+                    </a:lnL>
+                    <a:lnR>
+                      <a:noFill/>
+                    </a:lnR>
+                    <a:lnT>
+                      <a:noFill/>
+                    </a:lnT>
+                    <a:lnB>
+                      <a:noFill/>
+                    </a:lnB>
+                    <a:solidFill>
+                      <a:srgbClr val="D9D9D9"/>
+                    </a:solidFill>
+                  </a:tcPr>
+                </a:tc>
+                <a:tc>
+                  <a:txBody>
+                    <a:bodyPr/>
+                    <a:lstStyle/>
+                    <a:p>
+                      <a:pPr algn="ctr" fontAlgn="ctr"/>
+                      <a:r>
+                        <a:rPr lang="en-US" sz="1100" b="0" i="0" u="none" strike="noStrike">
+                          <a:solidFill>
+                            <a:srgbClr val="000000"/>
+                          </a:solidFill>
+                          <a:effectLst/>
+                          <a:latin typeface="Calibri" panose="020F0502020204030204" pitchFamily="34" charset="0"/>
+                        </a:rPr>
+                        <a:t>COMMITMENT_TYPE</a:t>
+                      </a:r>
+                    </a:p>
+                  </a:txBody>
+                  <a:tcPr marL="9525" marR="9525" marT="9525" marB="0" anchor="ctr">
+                    <a:lnL>
+                      <a:noFill/>
+                    </a:lnL>
+                    <a:lnR>
+                      <a:noFill/>
+                    </a:lnR>
+                    <a:lnT>
+                      <a:noFill/>
+                    </a:lnT>
+                    <a:lnB>
+                      <a:noFill/>
+                    </a:lnB>
+                    <a:solidFill>
+                      <a:srgbClr val="D9D9D9"/>
+                    </a:solidFill>
+                  </a:tcPr>
+                </a:tc>
+                <a:tc>
+                  <a:txBody>
+                    <a:bodyPr/>
+                    <a:lstStyle/>
+                    <a:p>
+                      <a:pPr algn="ctr" fontAlgn="ctr"/>
+                      <a:r>
+                        <a:rPr lang="en-US" sz="1100" b="0" i="0" u="none" strike="noStrike">
+                          <a:solidFill>
+                            <a:srgbClr val="000000"/>
+                          </a:solidFill>
+                          <a:effectLst/>
+                          <a:latin typeface="Calibri" panose="020F0502020204030204" pitchFamily="34" charset="0"/>
+                        </a:rPr>
+                        <a:t>Commitment term/unit (filter)</a:t>
+                      </a:r>
+                    </a:p>
+                  </a:txBody>
+                  <a:tcPr marL="9525" marR="9525" marT="9525" marB="0" anchor="ctr">
+                    <a:lnL>
+                      <a:noFill/>
+                    </a:lnL>
+                    <a:lnR>
+                      <a:noFill/>
+                    </a:lnR>
+                    <a:lnT>
+                      <a:noFill/>
+                    </a:lnT>
+                    <a:lnB>
+                      <a:noFill/>
+                    </a:lnB>
+                    <a:solidFill>
+                      <a:srgbClr val="D9D9D9"/>
+                    </a:solidFill>
+                  </a:tcPr>
+                </a:tc>
+                <a:tc>
+                  <a:txBody>
+                    <a:bodyPr/>
+                    <a:lstStyle/>
+                    <a:p>
+                      <a:pPr algn="ctr" fontAlgn="ctr"/>
+                      <a:r>
+                        <a:rPr lang="en-US" sz="1100" b="0" i="0" u="none" strike="noStrike">
+                          <a:solidFill>
+                            <a:srgbClr val="000000"/>
+                          </a:solidFill>
+                          <a:effectLst/>
+                          <a:latin typeface="Calibri" panose="020F0502020204030204" pitchFamily="34" charset="0"/>
+                        </a:rPr>
+                        <a:t>Offense (filter)</a:t>
+                      </a:r>
+                    </a:p>
+                  </a:txBody>
+                  <a:tcPr marL="9525" marR="9525" marT="9525" marB="0" anchor="ctr">
+                    <a:lnL>
+                      <a:noFill/>
+                    </a:lnL>
+                    <a:lnR>
+                      <a:noFill/>
+                    </a:lnR>
+                    <a:lnT>
+                      <a:noFill/>
+                    </a:lnT>
+                    <a:lnB>
+                      <a:noFill/>
+                    </a:lnB>
+                    <a:solidFill>
+                      <a:srgbClr val="D9D9D9"/>
+                    </a:solidFill>
+                  </a:tcPr>
+                </a:tc>
+                <a:tc>
+                  <a:txBody>
+                    <a:bodyPr/>
+                    <a:lstStyle/>
+                    <a:p>
+                      <a:pPr algn="ctr" fontAlgn="ctr"/>
+                      <a:r>
+                        <a:rPr lang="en-US" sz="1100" b="0" i="0" u="none" strike="noStrike">
+                          <a:solidFill>
+                            <a:srgbClr val="000000"/>
+                          </a:solidFill>
+                          <a:effectLst/>
+                          <a:latin typeface="Calibri" panose="020F0502020204030204" pitchFamily="34" charset="0"/>
+                        </a:rPr>
+                        <a:t>ID</a:t>
+                      </a:r>
+                    </a:p>
+                  </a:txBody>
+                  <a:tcPr marL="9525" marR="9525" marT="9525" marB="0" anchor="ctr">
+                    <a:lnL>
+                      <a:noFill/>
+                    </a:lnL>
+                    <a:lnR>
+                      <a:noFill/>
+                    </a:lnR>
+                    <a:lnT>
+                      <a:noFill/>
+                    </a:lnT>
+                    <a:lnB>
+                      <a:noFill/>
+                    </a:lnB>
+                    <a:solidFill>
+                      <a:srgbClr val="D9D9D9"/>
+                    </a:solidFill>
+                  </a:tcPr>
+                </a:tc>
+                <a:tc>
+                  <a:txBody>
+                    <a:bodyPr/>
+                    <a:lstStyle/>
+                    <a:p>
+                      <a:pPr algn="ctr" fontAlgn="ctr"/>
+                      <a:r>
+                        <a:rPr lang="en-US" sz="1100" b="0" i="0" u="none" strike="noStrike">
+                          <a:solidFill>
+                            <a:srgbClr val="000000"/>
+                          </a:solidFill>
+                          <a:effectLst/>
+                          <a:latin typeface="Calibri" panose="020F0502020204030204" pitchFamily="34" charset="0"/>
+                        </a:rPr>
+                        <a:t>Multi Color Bar chart</a:t>
+                      </a:r>
+                    </a:p>
+                  </a:txBody>
+                  <a:tcPr marL="9525" marR="9525" marT="9525" marB="0" anchor="ctr">
+                    <a:lnL>
+                      <a:noFill/>
+                    </a:lnL>
+                    <a:lnR>
+                      <a:noFill/>
+                    </a:lnR>
+                    <a:lnT>
+                      <a:noFill/>
+                    </a:lnT>
+                    <a:lnB>
+                      <a:noFill/>
+                    </a:lnB>
+                    <a:solidFill>
+                      <a:srgbClr val="D9D9D9"/>
+                    </a:solidFill>
+                  </a:tcPr>
+                </a:tc>
+                <a:tc>
+                  <a:txBody>
+                    <a:bodyPr/>
+                    <a:lstStyle/>
+                    <a:p>
+                      <a:pPr algn="ctr" fontAlgn="ctr"/>
+                      <a:r>
+                        <a:rPr lang="en-US" sz="1100" b="0" i="0" u="none" strike="noStrike">
+                          <a:solidFill>
+                            <a:srgbClr val="000000"/>
+                          </a:solidFill>
+                          <a:effectLst/>
+                          <a:latin typeface="Calibri" panose="020F0502020204030204" pitchFamily="34" charset="0"/>
+                        </a:rPr>
+                        <a:t>Yes</a:t>
+                      </a:r>
+                    </a:p>
+                  </a:txBody>
+                  <a:tcPr marL="9525" marR="9525" marT="9525" marB="0" anchor="ctr">
+                    <a:lnL>
+                      <a:noFill/>
+                    </a:lnL>
+                    <a:lnR>
+                      <a:noFill/>
+                    </a:lnR>
+                    <a:lnT>
+                      <a:noFill/>
+                    </a:lnT>
+                    <a:lnB>
+                      <a:noFill/>
+                    </a:lnB>
+                    <a:solidFill>
+                      <a:srgbClr val="D9D9D9"/>
+                    </a:solidFill>
+                  </a:tcPr>
+                </a:tc>
+                <a:tc>
+                  <a:txBody>
+                    <a:bodyPr/>
+                    <a:lstStyle/>
+                    <a:p>
+                      <a:pPr algn="ctr" fontAlgn="ctr"/>
+                      <a:r>
+                        <a:rPr lang="en-US" sz="1100" b="0" i="0" u="none" strike="noStrike">
+                          <a:solidFill>
+                            <a:srgbClr val="000000"/>
+                          </a:solidFill>
+                          <a:effectLst/>
+                          <a:latin typeface="Calibri" panose="020F0502020204030204" pitchFamily="34" charset="0"/>
+                        </a:rPr>
+                        <a:t>Courts</a:t>
+                      </a:r>
+                    </a:p>
+                  </a:txBody>
+                  <a:tcPr marL="9525" marR="9525" marT="9525" marB="0" anchor="ctr">
+                    <a:lnL>
+                      <a:noFill/>
+                    </a:lnL>
+                    <a:lnR w="6350" cap="flat" cmpd="sng" algn="ctr">
+                      <a:solidFill>
+                        <a:srgbClr val="000000"/>
+                      </a:solidFill>
+                      <a:prstDash val="solid"/>
+                      <a:round/>
+                      <a:headEnd type="none" w="med" len="med"/>
+                      <a:tailEnd type="none" w="med" len="med"/>
+                    </a:lnR>
+                    <a:lnT>
+                      <a:noFill/>
+                    </a:lnT>
+                    <a:lnB>
+                      <a:noFill/>
+                    </a:lnB>
+                    <a:solidFill>
+                      <a:srgbClr val="D9D9D9"/>
+                    </a:solidFill>
+                  </a:tcPr>
+                </a:tc>
+                <a:extLst>
+                  <a:ext uri="{0D108BD9-81ED-4DB2-BD59-A6C34878D82A}">
+                    <a16:rowId xmlns:a16="http://schemas.microsoft.com/office/drawing/2014/main" val="1079243955"/>
+                  </a:ext>
+                </a:extLst>
+              </a:tr>
+              <a:tr h="190500">
+                <a:tc>
+                  <a:txBody>
+                    <a:bodyPr/>
+                    <a:lstStyle/>
+                    <a:p>
+                      <a:pPr algn="ctr" fontAlgn="ctr"/>
+                      <a:r>
+                        <a:rPr lang="en-US" sz="1100" b="0" i="0" u="none" strike="noStrike">
+                          <a:solidFill>
+                            <a:srgbClr val="000000"/>
+                          </a:solidFill>
+                          <a:effectLst/>
+                          <a:latin typeface="Calibri" panose="020F0502020204030204" pitchFamily="34" charset="0"/>
+                        </a:rPr>
+                        <a:t>AGE_AT_INCIDENT</a:t>
+                      </a:r>
+                    </a:p>
+                  </a:txBody>
+                  <a:tcPr marL="9525" marR="9525" marT="9525" marB="0" anchor="ctr">
+                    <a:lnL w="6350" cap="flat" cmpd="sng" algn="ctr">
+                      <a:solidFill>
+                        <a:srgbClr val="000000"/>
+                      </a:solidFill>
+                      <a:prstDash val="solid"/>
+                      <a:round/>
+                      <a:headEnd type="none" w="med" len="med"/>
+                      <a:tailEnd type="none" w="med" len="med"/>
+                    </a:lnL>
+                    <a:lnR>
+                      <a:noFill/>
+                    </a:lnR>
+                    <a:lnT>
+                      <a:noFill/>
+                    </a:lnT>
+                    <a:lnB>
+                      <a:noFill/>
+                    </a:lnB>
+                  </a:tcPr>
+                </a:tc>
+                <a:tc>
+                  <a:txBody>
+                    <a:bodyPr/>
+                    <a:lstStyle/>
+                    <a:p>
+                      <a:pPr algn="ctr" fontAlgn="ctr"/>
+                      <a:r>
+                        <a:rPr lang="en-US" sz="1100" b="0" i="0" u="none" strike="noStrike">
+                          <a:solidFill>
+                            <a:srgbClr val="000000"/>
+                          </a:solidFill>
+                          <a:effectLst/>
+                          <a:latin typeface="Calibri" panose="020F0502020204030204" pitchFamily="34" charset="0"/>
+                        </a:rPr>
+                        <a:t>COMMITMENT_TYPE</a:t>
+                      </a:r>
+                    </a:p>
+                  </a:txBody>
+                  <a:tcPr marL="9525" marR="9525" marT="9525" marB="0" anchor="ctr">
+                    <a:lnL>
+                      <a:noFill/>
+                    </a:lnL>
+                    <a:lnR>
+                      <a:noFill/>
+                    </a:lnR>
+                    <a:lnT>
+                      <a:noFill/>
+                    </a:lnT>
+                    <a:lnB>
+                      <a:noFill/>
+                    </a:lnB>
+                  </a:tcPr>
+                </a:tc>
+                <a:tc>
+                  <a:txBody>
+                    <a:bodyPr/>
+                    <a:lstStyle/>
+                    <a:p>
+                      <a:pPr algn="ctr" fontAlgn="ctr"/>
+                      <a:r>
+                        <a:rPr lang="en-US" sz="1100" b="0" i="0" u="none" strike="noStrike">
+                          <a:solidFill>
+                            <a:srgbClr val="000000"/>
+                          </a:solidFill>
+                          <a:effectLst/>
+                          <a:latin typeface="Calibri" panose="020F0502020204030204" pitchFamily="34" charset="0"/>
+                        </a:rPr>
+                        <a:t>Commitment term/unit (filter)</a:t>
+                      </a:r>
+                    </a:p>
+                  </a:txBody>
+                  <a:tcPr marL="9525" marR="9525" marT="9525" marB="0" anchor="ctr">
+                    <a:lnL>
+                      <a:noFill/>
+                    </a:lnL>
+                    <a:lnR>
+                      <a:noFill/>
+                    </a:lnR>
+                    <a:lnT>
+                      <a:noFill/>
+                    </a:lnT>
+                    <a:lnB>
+                      <a:noFill/>
+                    </a:lnB>
+                  </a:tcPr>
+                </a:tc>
+                <a:tc>
+                  <a:txBody>
+                    <a:bodyPr/>
+                    <a:lstStyle/>
+                    <a:p>
+                      <a:pPr algn="ctr" fontAlgn="ctr"/>
+                      <a:r>
+                        <a:rPr lang="en-US" sz="1100" b="0" i="0" u="none" strike="noStrike">
+                          <a:solidFill>
+                            <a:srgbClr val="000000"/>
+                          </a:solidFill>
+                          <a:effectLst/>
+                          <a:latin typeface="Calibri" panose="020F0502020204030204" pitchFamily="34" charset="0"/>
+                        </a:rPr>
+                        <a:t>Court (filter)</a:t>
+                      </a:r>
+                    </a:p>
+                  </a:txBody>
+                  <a:tcPr marL="9525" marR="9525" marT="9525" marB="0" anchor="ctr">
+                    <a:lnL>
+                      <a:noFill/>
+                    </a:lnL>
+                    <a:lnR>
+                      <a:noFill/>
+                    </a:lnR>
+                    <a:lnT>
+                      <a:noFill/>
+                    </a:lnT>
+                    <a:lnB>
+                      <a:noFill/>
+                    </a:lnB>
+                  </a:tcPr>
+                </a:tc>
+                <a:tc>
+                  <a:txBody>
+                    <a:bodyPr/>
+                    <a:lstStyle/>
+                    <a:p>
+                      <a:pPr algn="ctr" fontAlgn="ctr"/>
+                      <a:r>
+                        <a:rPr lang="en-US" sz="1100" b="0" i="0" u="none" strike="noStrike">
+                          <a:solidFill>
+                            <a:srgbClr val="000000"/>
+                          </a:solidFill>
+                          <a:effectLst/>
+                          <a:latin typeface="Calibri" panose="020F0502020204030204" pitchFamily="34" charset="0"/>
+                        </a:rPr>
+                        <a:t>ID</a:t>
+                      </a:r>
+                    </a:p>
+                  </a:txBody>
+                  <a:tcPr marL="9525" marR="9525" marT="9525" marB="0" anchor="ctr">
+                    <a:lnL>
+                      <a:noFill/>
+                    </a:lnL>
+                    <a:lnR>
+                      <a:noFill/>
+                    </a:lnR>
+                    <a:lnT>
+                      <a:noFill/>
+                    </a:lnT>
+                    <a:lnB>
+                      <a:noFill/>
+                    </a:lnB>
+                  </a:tcPr>
+                </a:tc>
+                <a:tc>
+                  <a:txBody>
+                    <a:bodyPr/>
+                    <a:lstStyle/>
+                    <a:p>
+                      <a:pPr algn="ctr" fontAlgn="ctr"/>
+                      <a:r>
+                        <a:rPr lang="en-US" sz="1100" b="0" i="0" u="none" strike="noStrike">
+                          <a:solidFill>
+                            <a:srgbClr val="000000"/>
+                          </a:solidFill>
+                          <a:effectLst/>
+                          <a:latin typeface="Calibri" panose="020F0502020204030204" pitchFamily="34" charset="0"/>
+                        </a:rPr>
+                        <a:t>Line/scatter graph</a:t>
+                      </a:r>
+                    </a:p>
+                  </a:txBody>
+                  <a:tcPr marL="9525" marR="9525" marT="9525" marB="0" anchor="ctr">
+                    <a:lnL>
+                      <a:noFill/>
+                    </a:lnL>
+                    <a:lnR>
+                      <a:noFill/>
+                    </a:lnR>
+                    <a:lnT>
+                      <a:noFill/>
+                    </a:lnT>
+                    <a:lnB>
+                      <a:noFill/>
+                    </a:lnB>
+                  </a:tcPr>
+                </a:tc>
+                <a:tc>
+                  <a:txBody>
+                    <a:bodyPr/>
+                    <a:lstStyle/>
+                    <a:p>
+                      <a:pPr algn="ctr" fontAlgn="ctr"/>
+                      <a:r>
+                        <a:rPr lang="en-US" sz="1100" b="0" i="0" u="none" strike="noStrike">
+                          <a:solidFill>
+                            <a:srgbClr val="000000"/>
+                          </a:solidFill>
+                          <a:effectLst/>
+                          <a:latin typeface="Calibri" panose="020F0502020204030204" pitchFamily="34" charset="0"/>
+                        </a:rPr>
+                        <a:t>Yes</a:t>
+                      </a:r>
+                    </a:p>
+                  </a:txBody>
+                  <a:tcPr marL="9525" marR="9525" marT="9525" marB="0" anchor="ctr">
+                    <a:lnL>
+                      <a:noFill/>
+                    </a:lnL>
+                    <a:lnR>
+                      <a:noFill/>
+                    </a:lnR>
+                    <a:lnT>
+                      <a:noFill/>
+                    </a:lnT>
+                    <a:lnB>
+                      <a:noFill/>
+                    </a:lnB>
+                  </a:tcPr>
+                </a:tc>
+                <a:tc>
+                  <a:txBody>
+                    <a:bodyPr/>
+                    <a:lstStyle/>
+                    <a:p>
+                      <a:pPr algn="ctr" fontAlgn="ctr"/>
+                      <a:r>
+                        <a:rPr lang="en-US" sz="1100" b="0" i="0" u="none" strike="noStrike">
+                          <a:solidFill>
+                            <a:srgbClr val="000000"/>
+                          </a:solidFill>
+                          <a:effectLst/>
+                          <a:latin typeface="Calibri" panose="020F0502020204030204" pitchFamily="34" charset="0"/>
+                        </a:rPr>
+                        <a:t>Courts</a:t>
+                      </a:r>
+                    </a:p>
+                  </a:txBody>
+                  <a:tcPr marL="9525" marR="9525" marT="9525" marB="0" anchor="ctr">
+                    <a:lnL>
+                      <a:noFill/>
+                    </a:lnL>
+                    <a:lnR w="6350" cap="flat" cmpd="sng" algn="ctr">
+                      <a:solidFill>
+                        <a:srgbClr val="000000"/>
+                      </a:solidFill>
+                      <a:prstDash val="solid"/>
+                      <a:round/>
+                      <a:headEnd type="none" w="med" len="med"/>
+                      <a:tailEnd type="none" w="med" len="med"/>
+                    </a:lnR>
+                    <a:lnT>
+                      <a:noFill/>
+                    </a:lnT>
+                    <a:lnB>
+                      <a:noFill/>
+                    </a:lnB>
+                  </a:tcPr>
+                </a:tc>
+                <a:extLst>
+                  <a:ext uri="{0D108BD9-81ED-4DB2-BD59-A6C34878D82A}">
+                    <a16:rowId xmlns:a16="http://schemas.microsoft.com/office/drawing/2014/main" val="1004133604"/>
+                  </a:ext>
+                </a:extLst>
+              </a:tr>
+              <a:tr h="190500">
+                <a:tc>
+                  <a:txBody>
+                    <a:bodyPr/>
+                    <a:lstStyle/>
+                    <a:p>
+                      <a:pPr algn="ctr" fontAlgn="ctr"/>
+                      <a:r>
+                        <a:rPr lang="en-US" sz="1100" b="0" i="0" u="none" strike="noStrike">
+                          <a:solidFill>
+                            <a:srgbClr val="000000"/>
+                          </a:solidFill>
+                          <a:effectLst/>
+                          <a:latin typeface="Calibri" panose="020F0502020204030204" pitchFamily="34" charset="0"/>
+                        </a:rPr>
+                        <a:t>OFFENSE_CATEGORY</a:t>
+                      </a:r>
+                    </a:p>
+                  </a:txBody>
+                  <a:tcPr marL="9525" marR="9525" marT="9525" marB="0" anchor="ctr">
+                    <a:lnL w="6350" cap="flat" cmpd="sng" algn="ctr">
+                      <a:solidFill>
+                        <a:srgbClr val="000000"/>
+                      </a:solidFill>
+                      <a:prstDash val="solid"/>
+                      <a:round/>
+                      <a:headEnd type="none" w="med" len="med"/>
+                      <a:tailEnd type="none" w="med" len="med"/>
+                    </a:lnL>
+                    <a:lnR>
+                      <a:noFill/>
+                    </a:lnR>
+                    <a:lnT>
+                      <a:noFill/>
+                    </a:lnT>
+                    <a:lnB>
+                      <a:noFill/>
+                    </a:lnB>
+                    <a:solidFill>
+                      <a:srgbClr val="D9D9D9"/>
+                    </a:solidFill>
+                  </a:tcPr>
+                </a:tc>
+                <a:tc>
+                  <a:txBody>
+                    <a:bodyPr/>
+                    <a:lstStyle/>
+                    <a:p>
+                      <a:pPr algn="ctr" fontAlgn="ctr"/>
+                      <a:r>
+                        <a:rPr lang="en-US" sz="1100" b="0" i="0" u="none" strike="noStrike">
+                          <a:solidFill>
+                            <a:srgbClr val="000000"/>
+                          </a:solidFill>
+                          <a:effectLst/>
+                          <a:latin typeface="Calibri" panose="020F0502020204030204" pitchFamily="34" charset="0"/>
+                        </a:rPr>
+                        <a:t>COMMITMENT_TYPE</a:t>
+                      </a:r>
+                    </a:p>
+                  </a:txBody>
+                  <a:tcPr marL="9525" marR="9525" marT="9525" marB="0" anchor="ctr">
+                    <a:lnL>
+                      <a:noFill/>
+                    </a:lnL>
+                    <a:lnR>
+                      <a:noFill/>
+                    </a:lnR>
+                    <a:lnT>
+                      <a:noFill/>
+                    </a:lnT>
+                    <a:lnB>
+                      <a:noFill/>
+                    </a:lnB>
+                    <a:solidFill>
+                      <a:srgbClr val="D9D9D9"/>
+                    </a:solidFill>
+                  </a:tcPr>
+                </a:tc>
+                <a:tc>
+                  <a:txBody>
+                    <a:bodyPr/>
+                    <a:lstStyle/>
+                    <a:p>
+                      <a:pPr algn="ctr" fontAlgn="ctr"/>
+                      <a:r>
+                        <a:rPr lang="en-US" sz="1100" b="0" i="0" u="none" strike="noStrike">
+                          <a:solidFill>
+                            <a:srgbClr val="000000"/>
+                          </a:solidFill>
+                          <a:effectLst/>
+                          <a:latin typeface="Calibri" panose="020F0502020204030204" pitchFamily="34" charset="0"/>
+                        </a:rPr>
+                        <a:t>COMMITMENT_UNIT</a:t>
+                      </a:r>
+                    </a:p>
+                  </a:txBody>
+                  <a:tcPr marL="9525" marR="9525" marT="9525" marB="0" anchor="ctr">
+                    <a:lnL>
+                      <a:noFill/>
+                    </a:lnL>
+                    <a:lnR>
+                      <a:noFill/>
+                    </a:lnR>
+                    <a:lnT>
+                      <a:noFill/>
+                    </a:lnT>
+                    <a:lnB>
+                      <a:noFill/>
+                    </a:lnB>
+                    <a:solidFill>
+                      <a:srgbClr val="D9D9D9"/>
+                    </a:solidFill>
+                  </a:tcPr>
+                </a:tc>
+                <a:tc>
+                  <a:txBody>
+                    <a:bodyPr/>
+                    <a:lstStyle/>
+                    <a:p>
+                      <a:pPr algn="ctr" fontAlgn="ctr"/>
+                      <a:r>
+                        <a:rPr lang="en-US" sz="1100" b="0" i="0" u="none" strike="noStrike">
+                          <a:solidFill>
+                            <a:srgbClr val="000000"/>
+                          </a:solidFill>
+                          <a:effectLst/>
+                          <a:latin typeface="Calibri" panose="020F0502020204030204" pitchFamily="34" charset="0"/>
+                        </a:rPr>
+                        <a:t>COMMITMENT_TERM</a:t>
+                      </a:r>
+                    </a:p>
+                  </a:txBody>
+                  <a:tcPr marL="9525" marR="9525" marT="9525" marB="0" anchor="ctr">
+                    <a:lnL>
+                      <a:noFill/>
+                    </a:lnL>
+                    <a:lnR>
+                      <a:noFill/>
+                    </a:lnR>
+                    <a:lnT>
+                      <a:noFill/>
+                    </a:lnT>
+                    <a:lnB>
+                      <a:noFill/>
+                    </a:lnB>
+                    <a:solidFill>
+                      <a:srgbClr val="D9D9D9"/>
+                    </a:solidFill>
+                  </a:tcPr>
+                </a:tc>
+                <a:tc>
+                  <a:txBody>
+                    <a:bodyPr/>
+                    <a:lstStyle/>
+                    <a:p>
+                      <a:pPr algn="ctr" fontAlgn="ctr"/>
+                      <a:endParaRPr lang="en-US" sz="1100" b="0" i="0" u="none" strike="noStrike">
+                        <a:solidFill>
+                          <a:srgbClr val="000000"/>
+                        </a:solidFill>
+                        <a:effectLst/>
+                        <a:latin typeface="Calibri" panose="020F0502020204030204" pitchFamily="34" charset="0"/>
+                      </a:endParaRPr>
+                    </a:p>
+                  </a:txBody>
+                  <a:tcPr marL="9525" marR="9525" marT="9525" marB="0" anchor="ctr">
+                    <a:lnL>
+                      <a:noFill/>
+                    </a:lnL>
+                    <a:lnR>
+                      <a:noFill/>
+                    </a:lnR>
+                    <a:lnT>
+                      <a:noFill/>
+                    </a:lnT>
+                    <a:lnB>
+                      <a:noFill/>
+                    </a:lnB>
+                    <a:solidFill>
+                      <a:srgbClr val="D9D9D9"/>
+                    </a:solidFill>
+                  </a:tcPr>
+                </a:tc>
+                <a:tc>
+                  <a:txBody>
+                    <a:bodyPr/>
+                    <a:lstStyle/>
+                    <a:p>
+                      <a:pPr algn="ctr" fontAlgn="ctr"/>
+                      <a:r>
+                        <a:rPr lang="en-US" sz="1100" b="0" i="0" u="none" strike="noStrike">
+                          <a:solidFill>
+                            <a:srgbClr val="000000"/>
+                          </a:solidFill>
+                          <a:effectLst/>
+                          <a:latin typeface="Calibri" panose="020F0502020204030204" pitchFamily="34" charset="0"/>
+                        </a:rPr>
+                        <a:t>Multilevel pie chart</a:t>
+                      </a:r>
+                    </a:p>
+                  </a:txBody>
+                  <a:tcPr marL="9525" marR="9525" marT="9525" marB="0" anchor="ctr">
+                    <a:lnL>
+                      <a:noFill/>
+                    </a:lnL>
+                    <a:lnR>
+                      <a:noFill/>
+                    </a:lnR>
+                    <a:lnT>
+                      <a:noFill/>
+                    </a:lnT>
+                    <a:lnB>
+                      <a:noFill/>
+                    </a:lnB>
+                    <a:solidFill>
+                      <a:srgbClr val="D9D9D9"/>
+                    </a:solidFill>
+                  </a:tcPr>
+                </a:tc>
+                <a:tc>
+                  <a:txBody>
+                    <a:bodyPr/>
+                    <a:lstStyle/>
+                    <a:p>
+                      <a:pPr algn="ctr" fontAlgn="ctr"/>
+                      <a:r>
+                        <a:rPr lang="en-US" sz="1100" b="0" i="0" u="none" strike="noStrike">
+                          <a:solidFill>
+                            <a:srgbClr val="000000"/>
+                          </a:solidFill>
+                          <a:effectLst/>
+                          <a:latin typeface="Calibri" panose="020F0502020204030204" pitchFamily="34" charset="0"/>
+                        </a:rPr>
+                        <a:t>Yes</a:t>
+                      </a:r>
+                    </a:p>
+                  </a:txBody>
+                  <a:tcPr marL="9525" marR="9525" marT="9525" marB="0" anchor="ctr">
+                    <a:lnL>
+                      <a:noFill/>
+                    </a:lnL>
+                    <a:lnR>
+                      <a:noFill/>
+                    </a:lnR>
+                    <a:lnT>
+                      <a:noFill/>
+                    </a:lnT>
+                    <a:lnB>
+                      <a:noFill/>
+                    </a:lnB>
+                    <a:solidFill>
+                      <a:srgbClr val="D9D9D9"/>
+                    </a:solidFill>
+                  </a:tcPr>
+                </a:tc>
+                <a:tc>
+                  <a:txBody>
+                    <a:bodyPr/>
+                    <a:lstStyle/>
+                    <a:p>
+                      <a:pPr algn="ctr" fontAlgn="ctr"/>
+                      <a:r>
+                        <a:rPr lang="en-US" sz="1100" b="0" i="0" u="none" strike="noStrike">
+                          <a:solidFill>
+                            <a:srgbClr val="000000"/>
+                          </a:solidFill>
+                          <a:effectLst/>
+                          <a:latin typeface="Calibri" panose="020F0502020204030204" pitchFamily="34" charset="0"/>
+                        </a:rPr>
+                        <a:t>Offense Category</a:t>
+                      </a:r>
+                    </a:p>
+                  </a:txBody>
+                  <a:tcPr marL="9525" marR="9525" marT="9525" marB="0" anchor="ctr">
+                    <a:lnL>
+                      <a:noFill/>
+                    </a:lnL>
+                    <a:lnR w="6350" cap="flat" cmpd="sng" algn="ctr">
+                      <a:solidFill>
+                        <a:srgbClr val="000000"/>
+                      </a:solidFill>
+                      <a:prstDash val="solid"/>
+                      <a:round/>
+                      <a:headEnd type="none" w="med" len="med"/>
+                      <a:tailEnd type="none" w="med" len="med"/>
+                    </a:lnR>
+                    <a:lnT>
+                      <a:noFill/>
+                    </a:lnT>
+                    <a:lnB>
+                      <a:noFill/>
+                    </a:lnB>
+                    <a:solidFill>
+                      <a:srgbClr val="D9D9D9"/>
+                    </a:solidFill>
+                  </a:tcPr>
+                </a:tc>
+                <a:extLst>
+                  <a:ext uri="{0D108BD9-81ED-4DB2-BD59-A6C34878D82A}">
+                    <a16:rowId xmlns:a16="http://schemas.microsoft.com/office/drawing/2014/main" val="1569504245"/>
+                  </a:ext>
+                </a:extLst>
+              </a:tr>
+              <a:tr h="190500">
+                <a:tc>
+                  <a:txBody>
+                    <a:bodyPr/>
+                    <a:lstStyle/>
+                    <a:p>
+                      <a:pPr algn="ctr" fontAlgn="ctr"/>
+                      <a:r>
+                        <a:rPr lang="en-US" sz="1100" b="0" i="0" u="none" strike="noStrike">
+                          <a:solidFill>
+                            <a:srgbClr val="000000"/>
+                          </a:solidFill>
+                          <a:effectLst/>
+                          <a:latin typeface="Calibri" panose="020F0502020204030204" pitchFamily="34" charset="0"/>
+                        </a:rPr>
+                        <a:t>GENDER</a:t>
+                      </a:r>
+                    </a:p>
+                  </a:txBody>
+                  <a:tcPr marL="9525" marR="9525" marT="9525" marB="0" anchor="ctr">
+                    <a:lnL w="6350" cap="flat" cmpd="sng" algn="ctr">
+                      <a:solidFill>
+                        <a:srgbClr val="000000"/>
+                      </a:solidFill>
+                      <a:prstDash val="solid"/>
+                      <a:round/>
+                      <a:headEnd type="none" w="med" len="med"/>
+                      <a:tailEnd type="none" w="med" len="med"/>
+                    </a:lnL>
+                    <a:lnR>
+                      <a:noFill/>
+                    </a:lnR>
+                    <a:lnT>
+                      <a:noFill/>
+                    </a:lnT>
+                    <a:lnB w="6350" cap="flat" cmpd="sng" algn="ctr">
+                      <a:solidFill>
+                        <a:srgbClr val="000000"/>
+                      </a:solidFill>
+                      <a:prstDash val="solid"/>
+                      <a:round/>
+                      <a:headEnd type="none" w="med" len="med"/>
+                      <a:tailEnd type="none" w="med" len="med"/>
+                    </a:lnB>
+                  </a:tcPr>
+                </a:tc>
+                <a:tc>
+                  <a:txBody>
+                    <a:bodyPr/>
+                    <a:lstStyle/>
+                    <a:p>
+                      <a:pPr algn="ctr" fontAlgn="ctr"/>
+                      <a:r>
+                        <a:rPr lang="en-US" sz="1100" b="0" i="0" u="none" strike="noStrike">
+                          <a:solidFill>
+                            <a:srgbClr val="000000"/>
+                          </a:solidFill>
+                          <a:effectLst/>
+                          <a:latin typeface="Calibri" panose="020F0502020204030204" pitchFamily="34" charset="0"/>
+                        </a:rPr>
+                        <a:t>RACE</a:t>
+                      </a:r>
+                    </a:p>
+                  </a:txBody>
+                  <a:tcPr marL="9525" marR="9525" marT="9525" marB="0" anchor="ctr">
+                    <a:lnL>
+                      <a:noFill/>
+                    </a:lnL>
+                    <a:lnR>
+                      <a:noFill/>
+                    </a:lnR>
+                    <a:lnT>
+                      <a:noFill/>
+                    </a:lnT>
+                    <a:lnB w="6350" cap="flat" cmpd="sng" algn="ctr">
+                      <a:solidFill>
+                        <a:srgbClr val="000000"/>
+                      </a:solidFill>
+                      <a:prstDash val="solid"/>
+                      <a:round/>
+                      <a:headEnd type="none" w="med" len="med"/>
+                      <a:tailEnd type="none" w="med" len="med"/>
+                    </a:lnB>
+                  </a:tcPr>
+                </a:tc>
+                <a:tc>
+                  <a:txBody>
+                    <a:bodyPr/>
+                    <a:lstStyle/>
+                    <a:p>
+                      <a:pPr algn="ctr" fontAlgn="ctr"/>
+                      <a:r>
+                        <a:rPr lang="en-US" sz="1100" b="0" i="0" u="none" strike="noStrike">
+                          <a:solidFill>
+                            <a:srgbClr val="000000"/>
+                          </a:solidFill>
+                          <a:effectLst/>
+                          <a:latin typeface="Calibri" panose="020F0502020204030204" pitchFamily="34" charset="0"/>
+                        </a:rPr>
+                        <a:t>AGE_AT_INCIDENT</a:t>
+                      </a:r>
+                    </a:p>
+                  </a:txBody>
+                  <a:tcPr marL="9525" marR="9525" marT="9525" marB="0" anchor="ctr">
+                    <a:lnL>
+                      <a:noFill/>
+                    </a:lnL>
+                    <a:lnR>
+                      <a:noFill/>
+                    </a:lnR>
+                    <a:lnT>
+                      <a:noFill/>
+                    </a:lnT>
+                    <a:lnB w="6350" cap="flat" cmpd="sng" algn="ctr">
+                      <a:solidFill>
+                        <a:srgbClr val="000000"/>
+                      </a:solidFill>
+                      <a:prstDash val="solid"/>
+                      <a:round/>
+                      <a:headEnd type="none" w="med" len="med"/>
+                      <a:tailEnd type="none" w="med" len="med"/>
+                    </a:lnB>
+                  </a:tcPr>
+                </a:tc>
+                <a:tc>
+                  <a:txBody>
+                    <a:bodyPr/>
+                    <a:lstStyle/>
+                    <a:p>
+                      <a:pPr algn="ctr" fontAlgn="ctr"/>
+                      <a:endParaRPr lang="en-US" sz="1100" b="0" i="0" u="none" strike="noStrike">
+                        <a:solidFill>
+                          <a:srgbClr val="000000"/>
+                        </a:solidFill>
+                        <a:effectLst/>
+                        <a:latin typeface="Calibri" panose="020F0502020204030204" pitchFamily="34" charset="0"/>
+                      </a:endParaRPr>
+                    </a:p>
+                  </a:txBody>
+                  <a:tcPr marL="9525" marR="9525" marT="9525" marB="0" anchor="ctr">
+                    <a:lnL>
+                      <a:noFill/>
+                    </a:lnL>
+                    <a:lnR>
+                      <a:noFill/>
+                    </a:lnR>
+                    <a:lnT>
+                      <a:noFill/>
+                    </a:lnT>
+                    <a:lnB w="6350" cap="flat" cmpd="sng" algn="ctr">
+                      <a:solidFill>
+                        <a:srgbClr val="000000"/>
+                      </a:solidFill>
+                      <a:prstDash val="solid"/>
+                      <a:round/>
+                      <a:headEnd type="none" w="med" len="med"/>
+                      <a:tailEnd type="none" w="med" len="med"/>
+                    </a:lnB>
+                  </a:tcPr>
+                </a:tc>
+                <a:tc>
+                  <a:txBody>
+                    <a:bodyPr/>
+                    <a:lstStyle/>
+                    <a:p>
+                      <a:pPr algn="ctr" fontAlgn="ctr"/>
+                      <a:endParaRPr lang="en-US" sz="1100" b="0" i="0" u="none" strike="noStrike">
+                        <a:solidFill>
+                          <a:srgbClr val="000000"/>
+                        </a:solidFill>
+                        <a:effectLst/>
+                        <a:latin typeface="Calibri" panose="020F0502020204030204" pitchFamily="34" charset="0"/>
+                      </a:endParaRPr>
+                    </a:p>
+                  </a:txBody>
+                  <a:tcPr marL="9525" marR="9525" marT="9525" marB="0" anchor="ctr">
+                    <a:lnL>
+                      <a:noFill/>
+                    </a:lnL>
+                    <a:lnR>
+                      <a:noFill/>
+                    </a:lnR>
+                    <a:lnT>
+                      <a:noFill/>
+                    </a:lnT>
+                    <a:lnB w="6350" cap="flat" cmpd="sng" algn="ctr">
+                      <a:solidFill>
+                        <a:srgbClr val="000000"/>
+                      </a:solidFill>
+                      <a:prstDash val="solid"/>
+                      <a:round/>
+                      <a:headEnd type="none" w="med" len="med"/>
+                      <a:tailEnd type="none" w="med" len="med"/>
+                    </a:lnB>
+                  </a:tcPr>
+                </a:tc>
+                <a:tc>
+                  <a:txBody>
+                    <a:bodyPr/>
+                    <a:lstStyle/>
+                    <a:p>
+                      <a:pPr algn="ctr" fontAlgn="ctr"/>
+                      <a:r>
+                        <a:rPr lang="en-US" sz="1100" b="0" i="0" u="none" strike="noStrike">
+                          <a:solidFill>
+                            <a:srgbClr val="000000"/>
+                          </a:solidFill>
+                          <a:effectLst/>
+                          <a:latin typeface="Calibri" panose="020F0502020204030204" pitchFamily="34" charset="0"/>
+                        </a:rPr>
+                        <a:t>Multilevel pie chart</a:t>
+                      </a:r>
+                    </a:p>
+                  </a:txBody>
+                  <a:tcPr marL="9525" marR="9525" marT="9525" marB="0" anchor="ctr">
+                    <a:lnL>
+                      <a:noFill/>
+                    </a:lnL>
+                    <a:lnR>
+                      <a:noFill/>
+                    </a:lnR>
+                    <a:lnT>
+                      <a:noFill/>
+                    </a:lnT>
+                    <a:lnB w="6350" cap="flat" cmpd="sng" algn="ctr">
+                      <a:solidFill>
+                        <a:srgbClr val="000000"/>
+                      </a:solidFill>
+                      <a:prstDash val="solid"/>
+                      <a:round/>
+                      <a:headEnd type="none" w="med" len="med"/>
+                      <a:tailEnd type="none" w="med" len="med"/>
+                    </a:lnB>
+                  </a:tcPr>
+                </a:tc>
+                <a:tc>
+                  <a:txBody>
+                    <a:bodyPr/>
+                    <a:lstStyle/>
+                    <a:p>
+                      <a:pPr algn="ctr" fontAlgn="ctr"/>
+                      <a:r>
+                        <a:rPr lang="en-US" sz="1100" b="0" i="0" u="none" strike="noStrike">
+                          <a:solidFill>
+                            <a:srgbClr val="000000"/>
+                          </a:solidFill>
+                          <a:effectLst/>
+                          <a:latin typeface="Calibri" panose="020F0502020204030204" pitchFamily="34" charset="0"/>
+                        </a:rPr>
+                        <a:t>Yes</a:t>
+                      </a:r>
+                    </a:p>
+                  </a:txBody>
+                  <a:tcPr marL="9525" marR="9525" marT="9525" marB="0" anchor="ctr">
+                    <a:lnL>
+                      <a:noFill/>
+                    </a:lnL>
+                    <a:lnR>
+                      <a:noFill/>
+                    </a:lnR>
+                    <a:lnT>
+                      <a:noFill/>
+                    </a:lnT>
+                    <a:lnB w="6350" cap="flat" cmpd="sng" algn="ctr">
+                      <a:solidFill>
+                        <a:srgbClr val="000000"/>
+                      </a:solidFill>
+                      <a:prstDash val="solid"/>
+                      <a:round/>
+                      <a:headEnd type="none" w="med" len="med"/>
+                      <a:tailEnd type="none" w="med" len="med"/>
+                    </a:lnB>
+                  </a:tcPr>
+                </a:tc>
+                <a:tc>
+                  <a:txBody>
+                    <a:bodyPr/>
+                    <a:lstStyle/>
+                    <a:p>
+                      <a:pPr algn="ctr" fontAlgn="ctr"/>
+                      <a:r>
+                        <a:rPr lang="en-US" sz="1100" b="0" i="0" u="none" strike="noStrike" dirty="0">
+                          <a:solidFill>
+                            <a:srgbClr val="000000"/>
+                          </a:solidFill>
+                          <a:effectLst/>
+                          <a:latin typeface="Calibri" panose="020F0502020204030204" pitchFamily="34" charset="0"/>
+                        </a:rPr>
+                        <a:t>Demographic</a:t>
+                      </a:r>
+                    </a:p>
+                  </a:txBody>
+                  <a:tcPr marL="9525" marR="9525" marT="9525" marB="0" anchor="ctr">
+                    <a:lnL>
+                      <a:noFill/>
+                    </a:lnL>
+                    <a:lnR w="6350" cap="flat" cmpd="sng" algn="ctr">
+                      <a:solidFill>
+                        <a:srgbClr val="000000"/>
+                      </a:solidFill>
+                      <a:prstDash val="solid"/>
+                      <a:round/>
+                      <a:headEnd type="none" w="med" len="med"/>
+                      <a:tailEnd type="none" w="med" len="med"/>
+                    </a:lnR>
+                    <a:lnT>
+                      <a:noFill/>
+                    </a:lnT>
+                    <a:lnB w="6350" cap="flat" cmpd="sng" algn="ctr">
+                      <a:solidFill>
+                        <a:srgbClr val="000000"/>
+                      </a:solidFill>
+                      <a:prstDash val="solid"/>
+                      <a:round/>
+                      <a:headEnd type="none" w="med" len="med"/>
+                      <a:tailEnd type="none" w="med" len="med"/>
+                    </a:lnB>
+                  </a:tcPr>
+                </a:tc>
+                <a:extLst>
+                  <a:ext uri="{0D108BD9-81ED-4DB2-BD59-A6C34878D82A}">
+                    <a16:rowId xmlns:a16="http://schemas.microsoft.com/office/drawing/2014/main" val="4170347301"/>
+                  </a:ext>
+                </a:extLst>
+              </a:tr>
+            </a:tbl>
+          </a:graphicData>
+        </a:graphic>
+      </p:graphicFrame>
+    </p:spTree>
+    <p:extLst>
+      <p:ext uri="{BB962C8B-B14F-4D97-AF65-F5344CB8AC3E}">
+        <p14:creationId xmlns:p14="http://schemas.microsoft.com/office/powerpoint/2010/main" val="2841666136"/>
+      </p:ext>
+    </p:extLst>
+  </p:cSld>
+  <p:clrMapOvr>
+    <a:masterClrMapping/>
+  </p:clrMapOvr>
+</p:sld>
+</file>
+
+<file path=ppt/slides/slide3.xml><?xml version="1.0" encoding="utf-8"?>
+<p:sld xmlns:a="http://schemas.openxmlformats.org/drawingml/2006/main" xmlns:r="http://schemas.openxmlformats.org/officeDocument/2006/relationships" xmlns:p="http://schemas.openxmlformats.org/presentationml/2006/main">
+  <p:cSld>
+    <p:spTree>
+      <p:nvGrpSpPr>
+        <p:cNvPr id="1" name=""/>
+        <p:cNvGrpSpPr/>
+        <p:nvPr/>
+      </p:nvGrpSpPr>
+      <p:grpSpPr>
+        <a:xfrm>
+          <a:off x="0" y="0"/>
+          <a:ext cx="0" cy="0"/>
+          <a:chOff x="0" y="0"/>
+          <a:chExt cx="0" cy="0"/>
+        </a:xfrm>
+      </p:grpSpPr>
       <p:pic>
         <p:nvPicPr>
           <p:cNvPr id="4" name="Picture 3">
@@ -3720,7 +7461,7 @@
 </p:sld>
 </file>
 
-<file path=ppt/slides/slide2.xml><?xml version="1.0" encoding="utf-8"?>
+<file path=ppt/slides/slide4.xml><?xml version="1.0" encoding="utf-8"?>
 <p:sld xmlns:a="http://schemas.openxmlformats.org/drawingml/2006/main" xmlns:r="http://schemas.openxmlformats.org/officeDocument/2006/relationships" xmlns:p="http://schemas.openxmlformats.org/presentationml/2006/main">
   <p:cSld>
     <p:spTree>
@@ -3985,7 +7726,7 @@
 </p:sld>
 </file>
 
-<file path=ppt/slides/slide3.xml><?xml version="1.0" encoding="utf-8"?>
+<file path=ppt/slides/slide5.xml><?xml version="1.0" encoding="utf-8"?>
 <p:sld xmlns:a="http://schemas.openxmlformats.org/drawingml/2006/main" xmlns:r="http://schemas.openxmlformats.org/officeDocument/2006/relationships" xmlns:p="http://schemas.openxmlformats.org/presentationml/2006/main">
   <p:cSld>
     <p:spTree>
@@ -4436,7 +8177,7 @@
 </p:sld>
 </file>
 
-<file path=ppt/slides/slide4.xml><?xml version="1.0" encoding="utf-8"?>
+<file path=ppt/slides/slide6.xml><?xml version="1.0" encoding="utf-8"?>
 <p:sld xmlns:a="http://schemas.openxmlformats.org/drawingml/2006/main" xmlns:r="http://schemas.openxmlformats.org/officeDocument/2006/relationships" xmlns:p="http://schemas.openxmlformats.org/presentationml/2006/main">
   <p:cSld>
     <p:spTree>

</xml_diff>

<commit_message>
Updated charts table in ppt
</commit_message>
<xml_diff>
--- a/sketches.pptx
+++ b/sketches.pptx
@@ -117,6 +117,52 @@
 </p:presentation>
 </file>
 
+<file path=ppt/commentAuthors.xml><?xml version="1.0" encoding="utf-8"?>
+<p:cmAuthorLst xmlns:a="http://schemas.openxmlformats.org/drawingml/2006/main" xmlns:r="http://schemas.openxmlformats.org/officeDocument/2006/relationships" xmlns:p="http://schemas.openxmlformats.org/presentationml/2006/main">
+  <p:cmAuthor id="1" name="daniel orta" initials="do" lastIdx="3" clrIdx="0">
+    <p:extLst>
+      <p:ext uri="{19B8F6BF-5375-455C-9EA6-DF929625EA0E}">
+        <p15:presenceInfo xmlns:p15="http://schemas.microsoft.com/office/powerpoint/2012/main" userId="43d448a42e100a81" providerId="Windows Live"/>
+      </p:ext>
+    </p:extLst>
+  </p:cmAuthor>
+</p:cmAuthorLst>
+</file>
+
+<file path=ppt/comments/comment1.xml><?xml version="1.0" encoding="utf-8"?>
+<p:cmLst xmlns:a="http://schemas.openxmlformats.org/drawingml/2006/main" xmlns:r="http://schemas.openxmlformats.org/officeDocument/2006/relationships" xmlns:p="http://schemas.openxmlformats.org/presentationml/2006/main">
+  <p:cm authorId="1" dt="2020-05-26T21:54:29.791" idx="1">
+    <p:pos x="6977" y="1098"/>
+    <p:text>Gráficas pie charts con filtros.</p:text>
+    <p:extLst>
+      <p:ext uri="{C676402C-5697-4E1C-873F-D02D1690AC5C}">
+        <p15:threadingInfo xmlns:p15="http://schemas.microsoft.com/office/powerpoint/2012/main" timeZoneBias="300"/>
+      </p:ext>
+    </p:extLst>
+  </p:cm>
+  <p:cm authorId="1" dt="2020-05-26T21:55:59.818" idx="2">
+    <p:pos x="6977" y="1194"/>
+    <p:text>Reset button</p:text>
+    <p:extLst>
+      <p:ext uri="{C676402C-5697-4E1C-873F-D02D1690AC5C}">
+        <p15:threadingInfo xmlns:p15="http://schemas.microsoft.com/office/powerpoint/2012/main" timeZoneBias="300">
+          <p15:parentCm authorId="1" idx="1"/>
+        </p15:threadingInfo>
+      </p:ext>
+    </p:extLst>
+  </p:cm>
+  <p:cm authorId="1" dt="2020-05-26T22:20:30.031" idx="3">
+    <p:pos x="6921" y="1436"/>
+    <p:text>2 filters: 1 probation, 1 incarceration</p:text>
+    <p:extLst>
+      <p:ext uri="{C676402C-5697-4E1C-873F-D02D1690AC5C}">
+        <p15:threadingInfo xmlns:p15="http://schemas.microsoft.com/office/powerpoint/2012/main" timeZoneBias="300"/>
+      </p:ext>
+    </p:extLst>
+  </p:cm>
+</p:cmLst>
+</file>
+
 <file path=ppt/slideLayouts/slideLayout1.xml><?xml version="1.0" encoding="utf-8"?>
 <p:sldLayout xmlns:a="http://schemas.openxmlformats.org/drawingml/2006/main" xmlns:r="http://schemas.openxmlformats.org/officeDocument/2006/relationships" xmlns:p="http://schemas.openxmlformats.org/presentationml/2006/main" type="title" preserve="1">
   <p:cSld name="Title Slide">
@@ -139,7 +185,7 @@
           <p:cNvPr id="2" name="Title 1">
             <a:extLst>
               <a:ext uri="{FF2B5EF4-FFF2-40B4-BE49-F238E27FC236}">
-                <a16:creationId xmlns:a16="http://schemas.microsoft.com/office/drawing/2014/main" id="{9A4D770A-9C13-4F0E-A66E-EE9887B4DB3A}"/>
+                <a16:creationId xmlns:a16="http://schemas.microsoft.com/office/drawing/2014/main" xmlns="" id="{9A4D770A-9C13-4F0E-A66E-EE9887B4DB3A}"/>
               </a:ext>
             </a:extLst>
           </p:cNvPr>
@@ -176,7 +222,7 @@
           <p:cNvPr id="3" name="Subtitle 2">
             <a:extLst>
               <a:ext uri="{FF2B5EF4-FFF2-40B4-BE49-F238E27FC236}">
-                <a16:creationId xmlns:a16="http://schemas.microsoft.com/office/drawing/2014/main" id="{F15BA75E-4C76-47DF-A1AB-04DE77E372E8}"/>
+                <a16:creationId xmlns:a16="http://schemas.microsoft.com/office/drawing/2014/main" xmlns="" id="{F15BA75E-4C76-47DF-A1AB-04DE77E372E8}"/>
               </a:ext>
             </a:extLst>
           </p:cNvPr>
@@ -246,7 +292,7 @@
           <p:cNvPr id="4" name="Date Placeholder 3">
             <a:extLst>
               <a:ext uri="{FF2B5EF4-FFF2-40B4-BE49-F238E27FC236}">
-                <a16:creationId xmlns:a16="http://schemas.microsoft.com/office/drawing/2014/main" id="{79FD787B-D7B0-435B-A9FA-09CE62B3C5E0}"/>
+                <a16:creationId xmlns:a16="http://schemas.microsoft.com/office/drawing/2014/main" xmlns="" id="{79FD787B-D7B0-435B-A9FA-09CE62B3C5E0}"/>
               </a:ext>
             </a:extLst>
           </p:cNvPr>
@@ -264,7 +310,7 @@
           <a:p>
             <a:fld id="{25E08D22-8ABF-4F25-8268-5655165803FF}" type="datetimeFigureOut">
               <a:rPr lang="en-US" smtClean="0"/>
-              <a:t>5/23/2020</a:t>
+              <a:t>5/26/2020</a:t>
             </a:fld>
             <a:endParaRPr lang="en-US"/>
           </a:p>
@@ -275,7 +321,7 @@
           <p:cNvPr id="5" name="Footer Placeholder 4">
             <a:extLst>
               <a:ext uri="{FF2B5EF4-FFF2-40B4-BE49-F238E27FC236}">
-                <a16:creationId xmlns:a16="http://schemas.microsoft.com/office/drawing/2014/main" id="{393615F8-D6DC-4ABA-B0FE-153F84D1913F}"/>
+                <a16:creationId xmlns:a16="http://schemas.microsoft.com/office/drawing/2014/main" xmlns="" id="{393615F8-D6DC-4ABA-B0FE-153F84D1913F}"/>
               </a:ext>
             </a:extLst>
           </p:cNvPr>
@@ -300,7 +346,7 @@
           <p:cNvPr id="6" name="Slide Number Placeholder 5">
             <a:extLst>
               <a:ext uri="{FF2B5EF4-FFF2-40B4-BE49-F238E27FC236}">
-                <a16:creationId xmlns:a16="http://schemas.microsoft.com/office/drawing/2014/main" id="{C572F1CA-E8A4-4F7B-8DC0-479B318EB663}"/>
+                <a16:creationId xmlns:a16="http://schemas.microsoft.com/office/drawing/2014/main" xmlns="" id="{C572F1CA-E8A4-4F7B-8DC0-479B318EB663}"/>
               </a:ext>
             </a:extLst>
           </p:cNvPr>
@@ -318,7 +364,7 @@
           <a:p>
             <a:fld id="{05A204D3-7162-4E66-B5DE-41D55F78E01E}" type="slidenum">
               <a:rPr lang="en-US" smtClean="0"/>
-              <a:t>‹#›</a:t>
+              <a:t>‹Nº›</a:t>
             </a:fld>
             <a:endParaRPr lang="en-US"/>
           </a:p>
@@ -359,7 +405,7 @@
           <p:cNvPr id="2" name="Title 1">
             <a:extLst>
               <a:ext uri="{FF2B5EF4-FFF2-40B4-BE49-F238E27FC236}">
-                <a16:creationId xmlns:a16="http://schemas.microsoft.com/office/drawing/2014/main" id="{E01B379B-1EEC-4BB2-9FAD-97BD4E326EDD}"/>
+                <a16:creationId xmlns:a16="http://schemas.microsoft.com/office/drawing/2014/main" xmlns="" id="{E01B379B-1EEC-4BB2-9FAD-97BD4E326EDD}"/>
               </a:ext>
             </a:extLst>
           </p:cNvPr>
@@ -387,7 +433,7 @@
           <p:cNvPr id="3" name="Vertical Text Placeholder 2">
             <a:extLst>
               <a:ext uri="{FF2B5EF4-FFF2-40B4-BE49-F238E27FC236}">
-                <a16:creationId xmlns:a16="http://schemas.microsoft.com/office/drawing/2014/main" id="{6C86C4C6-B622-4294-8A42-AC79938DAD91}"/>
+                <a16:creationId xmlns:a16="http://schemas.microsoft.com/office/drawing/2014/main" xmlns="" id="{6C86C4C6-B622-4294-8A42-AC79938DAD91}"/>
               </a:ext>
             </a:extLst>
           </p:cNvPr>
@@ -444,7 +490,7 @@
           <p:cNvPr id="4" name="Date Placeholder 3">
             <a:extLst>
               <a:ext uri="{FF2B5EF4-FFF2-40B4-BE49-F238E27FC236}">
-                <a16:creationId xmlns:a16="http://schemas.microsoft.com/office/drawing/2014/main" id="{CDD8933A-CED4-4E3C-908C-1CA4383CDB68}"/>
+                <a16:creationId xmlns:a16="http://schemas.microsoft.com/office/drawing/2014/main" xmlns="" id="{CDD8933A-CED4-4E3C-908C-1CA4383CDB68}"/>
               </a:ext>
             </a:extLst>
           </p:cNvPr>
@@ -462,7 +508,7 @@
           <a:p>
             <a:fld id="{25E08D22-8ABF-4F25-8268-5655165803FF}" type="datetimeFigureOut">
               <a:rPr lang="en-US" smtClean="0"/>
-              <a:t>5/23/2020</a:t>
+              <a:t>5/26/2020</a:t>
             </a:fld>
             <a:endParaRPr lang="en-US"/>
           </a:p>
@@ -473,7 +519,7 @@
           <p:cNvPr id="5" name="Footer Placeholder 4">
             <a:extLst>
               <a:ext uri="{FF2B5EF4-FFF2-40B4-BE49-F238E27FC236}">
-                <a16:creationId xmlns:a16="http://schemas.microsoft.com/office/drawing/2014/main" id="{FAD1703C-1ECE-4C2E-9C35-0963114069E2}"/>
+                <a16:creationId xmlns:a16="http://schemas.microsoft.com/office/drawing/2014/main" xmlns="" id="{FAD1703C-1ECE-4C2E-9C35-0963114069E2}"/>
               </a:ext>
             </a:extLst>
           </p:cNvPr>
@@ -498,7 +544,7 @@
           <p:cNvPr id="6" name="Slide Number Placeholder 5">
             <a:extLst>
               <a:ext uri="{FF2B5EF4-FFF2-40B4-BE49-F238E27FC236}">
-                <a16:creationId xmlns:a16="http://schemas.microsoft.com/office/drawing/2014/main" id="{CE2B89AA-C69C-4A92-9985-086502F69A03}"/>
+                <a16:creationId xmlns:a16="http://schemas.microsoft.com/office/drawing/2014/main" xmlns="" id="{CE2B89AA-C69C-4A92-9985-086502F69A03}"/>
               </a:ext>
             </a:extLst>
           </p:cNvPr>
@@ -516,7 +562,7 @@
           <a:p>
             <a:fld id="{05A204D3-7162-4E66-B5DE-41D55F78E01E}" type="slidenum">
               <a:rPr lang="en-US" smtClean="0"/>
-              <a:t>‹#›</a:t>
+              <a:t>‹Nº›</a:t>
             </a:fld>
             <a:endParaRPr lang="en-US"/>
           </a:p>
@@ -557,7 +603,7 @@
           <p:cNvPr id="2" name="Vertical Title 1">
             <a:extLst>
               <a:ext uri="{FF2B5EF4-FFF2-40B4-BE49-F238E27FC236}">
-                <a16:creationId xmlns:a16="http://schemas.microsoft.com/office/drawing/2014/main" id="{9BFED6EF-859C-4A40-87BB-BF5CBDCAC3FC}"/>
+                <a16:creationId xmlns:a16="http://schemas.microsoft.com/office/drawing/2014/main" xmlns="" id="{9BFED6EF-859C-4A40-87BB-BF5CBDCAC3FC}"/>
               </a:ext>
             </a:extLst>
           </p:cNvPr>
@@ -590,7 +636,7 @@
           <p:cNvPr id="3" name="Vertical Text Placeholder 2">
             <a:extLst>
               <a:ext uri="{FF2B5EF4-FFF2-40B4-BE49-F238E27FC236}">
-                <a16:creationId xmlns:a16="http://schemas.microsoft.com/office/drawing/2014/main" id="{12B802DD-7995-4236-B00B-72E1531FE622}"/>
+                <a16:creationId xmlns:a16="http://schemas.microsoft.com/office/drawing/2014/main" xmlns="" id="{12B802DD-7995-4236-B00B-72E1531FE622}"/>
               </a:ext>
             </a:extLst>
           </p:cNvPr>
@@ -652,7 +698,7 @@
           <p:cNvPr id="4" name="Date Placeholder 3">
             <a:extLst>
               <a:ext uri="{FF2B5EF4-FFF2-40B4-BE49-F238E27FC236}">
-                <a16:creationId xmlns:a16="http://schemas.microsoft.com/office/drawing/2014/main" id="{5076E3F2-EE1A-4038-8C27-AA09271B0497}"/>
+                <a16:creationId xmlns:a16="http://schemas.microsoft.com/office/drawing/2014/main" xmlns="" id="{5076E3F2-EE1A-4038-8C27-AA09271B0497}"/>
               </a:ext>
             </a:extLst>
           </p:cNvPr>
@@ -670,7 +716,7 @@
           <a:p>
             <a:fld id="{25E08D22-8ABF-4F25-8268-5655165803FF}" type="datetimeFigureOut">
               <a:rPr lang="en-US" smtClean="0"/>
-              <a:t>5/23/2020</a:t>
+              <a:t>5/26/2020</a:t>
             </a:fld>
             <a:endParaRPr lang="en-US"/>
           </a:p>
@@ -681,7 +727,7 @@
           <p:cNvPr id="5" name="Footer Placeholder 4">
             <a:extLst>
               <a:ext uri="{FF2B5EF4-FFF2-40B4-BE49-F238E27FC236}">
-                <a16:creationId xmlns:a16="http://schemas.microsoft.com/office/drawing/2014/main" id="{FAEA5069-1FFB-4241-B6E9-93FED4394E25}"/>
+                <a16:creationId xmlns:a16="http://schemas.microsoft.com/office/drawing/2014/main" xmlns="" id="{FAEA5069-1FFB-4241-B6E9-93FED4394E25}"/>
               </a:ext>
             </a:extLst>
           </p:cNvPr>
@@ -706,7 +752,7 @@
           <p:cNvPr id="6" name="Slide Number Placeholder 5">
             <a:extLst>
               <a:ext uri="{FF2B5EF4-FFF2-40B4-BE49-F238E27FC236}">
-                <a16:creationId xmlns:a16="http://schemas.microsoft.com/office/drawing/2014/main" id="{F9A4A6EC-568E-48A1-A491-745EF71F39A7}"/>
+                <a16:creationId xmlns:a16="http://schemas.microsoft.com/office/drawing/2014/main" xmlns="" id="{F9A4A6EC-568E-48A1-A491-745EF71F39A7}"/>
               </a:ext>
             </a:extLst>
           </p:cNvPr>
@@ -724,7 +770,7 @@
           <a:p>
             <a:fld id="{05A204D3-7162-4E66-B5DE-41D55F78E01E}" type="slidenum">
               <a:rPr lang="en-US" smtClean="0"/>
-              <a:t>‹#›</a:t>
+              <a:t>‹Nº›</a:t>
             </a:fld>
             <a:endParaRPr lang="en-US"/>
           </a:p>
@@ -765,7 +811,7 @@
           <p:cNvPr id="2" name="Title 1">
             <a:extLst>
               <a:ext uri="{FF2B5EF4-FFF2-40B4-BE49-F238E27FC236}">
-                <a16:creationId xmlns:a16="http://schemas.microsoft.com/office/drawing/2014/main" id="{DFA803E8-FF7F-4713-AA15-BFA38E3AFB55}"/>
+                <a16:creationId xmlns:a16="http://schemas.microsoft.com/office/drawing/2014/main" xmlns="" id="{DFA803E8-FF7F-4713-AA15-BFA38E3AFB55}"/>
               </a:ext>
             </a:extLst>
           </p:cNvPr>
@@ -793,7 +839,7 @@
           <p:cNvPr id="3" name="Content Placeholder 2">
             <a:extLst>
               <a:ext uri="{FF2B5EF4-FFF2-40B4-BE49-F238E27FC236}">
-                <a16:creationId xmlns:a16="http://schemas.microsoft.com/office/drawing/2014/main" id="{219188E8-E772-4D1D-AE21-76A2B119178B}"/>
+                <a16:creationId xmlns:a16="http://schemas.microsoft.com/office/drawing/2014/main" xmlns="" id="{219188E8-E772-4D1D-AE21-76A2B119178B}"/>
               </a:ext>
             </a:extLst>
           </p:cNvPr>
@@ -850,7 +896,7 @@
           <p:cNvPr id="4" name="Date Placeholder 3">
             <a:extLst>
               <a:ext uri="{FF2B5EF4-FFF2-40B4-BE49-F238E27FC236}">
-                <a16:creationId xmlns:a16="http://schemas.microsoft.com/office/drawing/2014/main" id="{4C9FE070-A712-4690-A9EE-521973BD060C}"/>
+                <a16:creationId xmlns:a16="http://schemas.microsoft.com/office/drawing/2014/main" xmlns="" id="{4C9FE070-A712-4690-A9EE-521973BD060C}"/>
               </a:ext>
             </a:extLst>
           </p:cNvPr>
@@ -868,7 +914,7 @@
           <a:p>
             <a:fld id="{25E08D22-8ABF-4F25-8268-5655165803FF}" type="datetimeFigureOut">
               <a:rPr lang="en-US" smtClean="0"/>
-              <a:t>5/23/2020</a:t>
+              <a:t>5/26/2020</a:t>
             </a:fld>
             <a:endParaRPr lang="en-US"/>
           </a:p>
@@ -879,7 +925,7 @@
           <p:cNvPr id="5" name="Footer Placeholder 4">
             <a:extLst>
               <a:ext uri="{FF2B5EF4-FFF2-40B4-BE49-F238E27FC236}">
-                <a16:creationId xmlns:a16="http://schemas.microsoft.com/office/drawing/2014/main" id="{C2A68579-F5E0-4173-B795-1498249A20B8}"/>
+                <a16:creationId xmlns:a16="http://schemas.microsoft.com/office/drawing/2014/main" xmlns="" id="{C2A68579-F5E0-4173-B795-1498249A20B8}"/>
               </a:ext>
             </a:extLst>
           </p:cNvPr>
@@ -904,7 +950,7 @@
           <p:cNvPr id="6" name="Slide Number Placeholder 5">
             <a:extLst>
               <a:ext uri="{FF2B5EF4-FFF2-40B4-BE49-F238E27FC236}">
-                <a16:creationId xmlns:a16="http://schemas.microsoft.com/office/drawing/2014/main" id="{941E30F5-EDB2-4397-A3B7-7BE4301B2E50}"/>
+                <a16:creationId xmlns:a16="http://schemas.microsoft.com/office/drawing/2014/main" xmlns="" id="{941E30F5-EDB2-4397-A3B7-7BE4301B2E50}"/>
               </a:ext>
             </a:extLst>
           </p:cNvPr>
@@ -922,7 +968,7 @@
           <a:p>
             <a:fld id="{05A204D3-7162-4E66-B5DE-41D55F78E01E}" type="slidenum">
               <a:rPr lang="en-US" smtClean="0"/>
-              <a:t>‹#›</a:t>
+              <a:t>‹Nº›</a:t>
             </a:fld>
             <a:endParaRPr lang="en-US"/>
           </a:p>
@@ -963,7 +1009,7 @@
           <p:cNvPr id="2" name="Title 1">
             <a:extLst>
               <a:ext uri="{FF2B5EF4-FFF2-40B4-BE49-F238E27FC236}">
-                <a16:creationId xmlns:a16="http://schemas.microsoft.com/office/drawing/2014/main" id="{F71154DB-B116-44EB-B026-1F5C708AA6AD}"/>
+                <a16:creationId xmlns:a16="http://schemas.microsoft.com/office/drawing/2014/main" xmlns="" id="{F71154DB-B116-44EB-B026-1F5C708AA6AD}"/>
               </a:ext>
             </a:extLst>
           </p:cNvPr>
@@ -1000,7 +1046,7 @@
           <p:cNvPr id="3" name="Text Placeholder 2">
             <a:extLst>
               <a:ext uri="{FF2B5EF4-FFF2-40B4-BE49-F238E27FC236}">
-                <a16:creationId xmlns:a16="http://schemas.microsoft.com/office/drawing/2014/main" id="{F6D23B97-6310-4666-BE32-2887DA16EC76}"/>
+                <a16:creationId xmlns:a16="http://schemas.microsoft.com/office/drawing/2014/main" xmlns="" id="{F6D23B97-6310-4666-BE32-2887DA16EC76}"/>
               </a:ext>
             </a:extLst>
           </p:cNvPr>
@@ -1125,7 +1171,7 @@
           <p:cNvPr id="4" name="Date Placeholder 3">
             <a:extLst>
               <a:ext uri="{FF2B5EF4-FFF2-40B4-BE49-F238E27FC236}">
-                <a16:creationId xmlns:a16="http://schemas.microsoft.com/office/drawing/2014/main" id="{5C0E284C-CAE1-47C9-BF61-48ED22315AE0}"/>
+                <a16:creationId xmlns:a16="http://schemas.microsoft.com/office/drawing/2014/main" xmlns="" id="{5C0E284C-CAE1-47C9-BF61-48ED22315AE0}"/>
               </a:ext>
             </a:extLst>
           </p:cNvPr>
@@ -1143,7 +1189,7 @@
           <a:p>
             <a:fld id="{25E08D22-8ABF-4F25-8268-5655165803FF}" type="datetimeFigureOut">
               <a:rPr lang="en-US" smtClean="0"/>
-              <a:t>5/23/2020</a:t>
+              <a:t>5/26/2020</a:t>
             </a:fld>
             <a:endParaRPr lang="en-US"/>
           </a:p>
@@ -1154,7 +1200,7 @@
           <p:cNvPr id="5" name="Footer Placeholder 4">
             <a:extLst>
               <a:ext uri="{FF2B5EF4-FFF2-40B4-BE49-F238E27FC236}">
-                <a16:creationId xmlns:a16="http://schemas.microsoft.com/office/drawing/2014/main" id="{23B2317D-C473-44E6-BA04-10395E2452F8}"/>
+                <a16:creationId xmlns:a16="http://schemas.microsoft.com/office/drawing/2014/main" xmlns="" id="{23B2317D-C473-44E6-BA04-10395E2452F8}"/>
               </a:ext>
             </a:extLst>
           </p:cNvPr>
@@ -1179,7 +1225,7 @@
           <p:cNvPr id="6" name="Slide Number Placeholder 5">
             <a:extLst>
               <a:ext uri="{FF2B5EF4-FFF2-40B4-BE49-F238E27FC236}">
-                <a16:creationId xmlns:a16="http://schemas.microsoft.com/office/drawing/2014/main" id="{296BF17E-BAC7-44FF-B0CD-7C7A9DE0F907}"/>
+                <a16:creationId xmlns:a16="http://schemas.microsoft.com/office/drawing/2014/main" xmlns="" id="{296BF17E-BAC7-44FF-B0CD-7C7A9DE0F907}"/>
               </a:ext>
             </a:extLst>
           </p:cNvPr>
@@ -1197,7 +1243,7 @@
           <a:p>
             <a:fld id="{05A204D3-7162-4E66-B5DE-41D55F78E01E}" type="slidenum">
               <a:rPr lang="en-US" smtClean="0"/>
-              <a:t>‹#›</a:t>
+              <a:t>‹Nº›</a:t>
             </a:fld>
             <a:endParaRPr lang="en-US"/>
           </a:p>
@@ -1238,7 +1284,7 @@
           <p:cNvPr id="2" name="Title 1">
             <a:extLst>
               <a:ext uri="{FF2B5EF4-FFF2-40B4-BE49-F238E27FC236}">
-                <a16:creationId xmlns:a16="http://schemas.microsoft.com/office/drawing/2014/main" id="{7FFE40BA-D679-452C-B186-129153F439FE}"/>
+                <a16:creationId xmlns:a16="http://schemas.microsoft.com/office/drawing/2014/main" xmlns="" id="{7FFE40BA-D679-452C-B186-129153F439FE}"/>
               </a:ext>
             </a:extLst>
           </p:cNvPr>
@@ -1266,7 +1312,7 @@
           <p:cNvPr id="3" name="Content Placeholder 2">
             <a:extLst>
               <a:ext uri="{FF2B5EF4-FFF2-40B4-BE49-F238E27FC236}">
-                <a16:creationId xmlns:a16="http://schemas.microsoft.com/office/drawing/2014/main" id="{4C33E594-B1B4-49BC-B7D7-9E27AEABB6EB}"/>
+                <a16:creationId xmlns:a16="http://schemas.microsoft.com/office/drawing/2014/main" xmlns="" id="{4C33E594-B1B4-49BC-B7D7-9E27AEABB6EB}"/>
               </a:ext>
             </a:extLst>
           </p:cNvPr>
@@ -1328,7 +1374,7 @@
           <p:cNvPr id="4" name="Content Placeholder 3">
             <a:extLst>
               <a:ext uri="{FF2B5EF4-FFF2-40B4-BE49-F238E27FC236}">
-                <a16:creationId xmlns:a16="http://schemas.microsoft.com/office/drawing/2014/main" id="{C7FD8A7F-68CB-427B-BC19-6C9D9FDE90C7}"/>
+                <a16:creationId xmlns:a16="http://schemas.microsoft.com/office/drawing/2014/main" xmlns="" id="{C7FD8A7F-68CB-427B-BC19-6C9D9FDE90C7}"/>
               </a:ext>
             </a:extLst>
           </p:cNvPr>
@@ -1390,7 +1436,7 @@
           <p:cNvPr id="5" name="Date Placeholder 4">
             <a:extLst>
               <a:ext uri="{FF2B5EF4-FFF2-40B4-BE49-F238E27FC236}">
-                <a16:creationId xmlns:a16="http://schemas.microsoft.com/office/drawing/2014/main" id="{A342EDBB-5FE3-4716-A2FC-DFFE05861B5B}"/>
+                <a16:creationId xmlns:a16="http://schemas.microsoft.com/office/drawing/2014/main" xmlns="" id="{A342EDBB-5FE3-4716-A2FC-DFFE05861B5B}"/>
               </a:ext>
             </a:extLst>
           </p:cNvPr>
@@ -1408,7 +1454,7 @@
           <a:p>
             <a:fld id="{25E08D22-8ABF-4F25-8268-5655165803FF}" type="datetimeFigureOut">
               <a:rPr lang="en-US" smtClean="0"/>
-              <a:t>5/23/2020</a:t>
+              <a:t>5/26/2020</a:t>
             </a:fld>
             <a:endParaRPr lang="en-US"/>
           </a:p>
@@ -1419,7 +1465,7 @@
           <p:cNvPr id="6" name="Footer Placeholder 5">
             <a:extLst>
               <a:ext uri="{FF2B5EF4-FFF2-40B4-BE49-F238E27FC236}">
-                <a16:creationId xmlns:a16="http://schemas.microsoft.com/office/drawing/2014/main" id="{ECE74E8B-0B8F-4A39-8D6C-1BE0A541307B}"/>
+                <a16:creationId xmlns:a16="http://schemas.microsoft.com/office/drawing/2014/main" xmlns="" id="{ECE74E8B-0B8F-4A39-8D6C-1BE0A541307B}"/>
               </a:ext>
             </a:extLst>
           </p:cNvPr>
@@ -1444,7 +1490,7 @@
           <p:cNvPr id="7" name="Slide Number Placeholder 6">
             <a:extLst>
               <a:ext uri="{FF2B5EF4-FFF2-40B4-BE49-F238E27FC236}">
-                <a16:creationId xmlns:a16="http://schemas.microsoft.com/office/drawing/2014/main" id="{CF46E2FF-4A04-4CB3-B21D-F236803A06E1}"/>
+                <a16:creationId xmlns:a16="http://schemas.microsoft.com/office/drawing/2014/main" xmlns="" id="{CF46E2FF-4A04-4CB3-B21D-F236803A06E1}"/>
               </a:ext>
             </a:extLst>
           </p:cNvPr>
@@ -1462,7 +1508,7 @@
           <a:p>
             <a:fld id="{05A204D3-7162-4E66-B5DE-41D55F78E01E}" type="slidenum">
               <a:rPr lang="en-US" smtClean="0"/>
-              <a:t>‹#›</a:t>
+              <a:t>‹Nº›</a:t>
             </a:fld>
             <a:endParaRPr lang="en-US"/>
           </a:p>
@@ -1503,7 +1549,7 @@
           <p:cNvPr id="2" name="Title 1">
             <a:extLst>
               <a:ext uri="{FF2B5EF4-FFF2-40B4-BE49-F238E27FC236}">
-                <a16:creationId xmlns:a16="http://schemas.microsoft.com/office/drawing/2014/main" id="{99312E1D-F8B8-46EA-A381-80D1B0E06134}"/>
+                <a16:creationId xmlns:a16="http://schemas.microsoft.com/office/drawing/2014/main" xmlns="" id="{99312E1D-F8B8-46EA-A381-80D1B0E06134}"/>
               </a:ext>
             </a:extLst>
           </p:cNvPr>
@@ -1536,7 +1582,7 @@
           <p:cNvPr id="3" name="Text Placeholder 2">
             <a:extLst>
               <a:ext uri="{FF2B5EF4-FFF2-40B4-BE49-F238E27FC236}">
-                <a16:creationId xmlns:a16="http://schemas.microsoft.com/office/drawing/2014/main" id="{CB08C27D-8DD6-41DF-AF76-84FD02904645}"/>
+                <a16:creationId xmlns:a16="http://schemas.microsoft.com/office/drawing/2014/main" xmlns="" id="{CB08C27D-8DD6-41DF-AF76-84FD02904645}"/>
               </a:ext>
             </a:extLst>
           </p:cNvPr>
@@ -1607,7 +1653,7 @@
           <p:cNvPr id="4" name="Content Placeholder 3">
             <a:extLst>
               <a:ext uri="{FF2B5EF4-FFF2-40B4-BE49-F238E27FC236}">
-                <a16:creationId xmlns:a16="http://schemas.microsoft.com/office/drawing/2014/main" id="{0FF855E0-CC4A-420B-B07D-3C86BE0DAB1F}"/>
+                <a16:creationId xmlns:a16="http://schemas.microsoft.com/office/drawing/2014/main" xmlns="" id="{0FF855E0-CC4A-420B-B07D-3C86BE0DAB1F}"/>
               </a:ext>
             </a:extLst>
           </p:cNvPr>
@@ -1669,7 +1715,7 @@
           <p:cNvPr id="5" name="Text Placeholder 4">
             <a:extLst>
               <a:ext uri="{FF2B5EF4-FFF2-40B4-BE49-F238E27FC236}">
-                <a16:creationId xmlns:a16="http://schemas.microsoft.com/office/drawing/2014/main" id="{450C9337-9619-48BD-8DA7-74EAEB8F9E2E}"/>
+                <a16:creationId xmlns:a16="http://schemas.microsoft.com/office/drawing/2014/main" xmlns="" id="{450C9337-9619-48BD-8DA7-74EAEB8F9E2E}"/>
               </a:ext>
             </a:extLst>
           </p:cNvPr>
@@ -1740,7 +1786,7 @@
           <p:cNvPr id="6" name="Content Placeholder 5">
             <a:extLst>
               <a:ext uri="{FF2B5EF4-FFF2-40B4-BE49-F238E27FC236}">
-                <a16:creationId xmlns:a16="http://schemas.microsoft.com/office/drawing/2014/main" id="{CC064C0A-876B-4132-9322-53632F4BE34E}"/>
+                <a16:creationId xmlns:a16="http://schemas.microsoft.com/office/drawing/2014/main" xmlns="" id="{CC064C0A-876B-4132-9322-53632F4BE34E}"/>
               </a:ext>
             </a:extLst>
           </p:cNvPr>
@@ -1802,7 +1848,7 @@
           <p:cNvPr id="7" name="Date Placeholder 6">
             <a:extLst>
               <a:ext uri="{FF2B5EF4-FFF2-40B4-BE49-F238E27FC236}">
-                <a16:creationId xmlns:a16="http://schemas.microsoft.com/office/drawing/2014/main" id="{14341782-33B0-4C19-97B3-610B4D1CDA1C}"/>
+                <a16:creationId xmlns:a16="http://schemas.microsoft.com/office/drawing/2014/main" xmlns="" id="{14341782-33B0-4C19-97B3-610B4D1CDA1C}"/>
               </a:ext>
             </a:extLst>
           </p:cNvPr>
@@ -1820,7 +1866,7 @@
           <a:p>
             <a:fld id="{25E08D22-8ABF-4F25-8268-5655165803FF}" type="datetimeFigureOut">
               <a:rPr lang="en-US" smtClean="0"/>
-              <a:t>5/23/2020</a:t>
+              <a:t>5/26/2020</a:t>
             </a:fld>
             <a:endParaRPr lang="en-US"/>
           </a:p>
@@ -1831,7 +1877,7 @@
           <p:cNvPr id="8" name="Footer Placeholder 7">
             <a:extLst>
               <a:ext uri="{FF2B5EF4-FFF2-40B4-BE49-F238E27FC236}">
-                <a16:creationId xmlns:a16="http://schemas.microsoft.com/office/drawing/2014/main" id="{0E08182E-0B8A-4F5C-B3B2-5861BD027141}"/>
+                <a16:creationId xmlns:a16="http://schemas.microsoft.com/office/drawing/2014/main" xmlns="" id="{0E08182E-0B8A-4F5C-B3B2-5861BD027141}"/>
               </a:ext>
             </a:extLst>
           </p:cNvPr>
@@ -1856,7 +1902,7 @@
           <p:cNvPr id="9" name="Slide Number Placeholder 8">
             <a:extLst>
               <a:ext uri="{FF2B5EF4-FFF2-40B4-BE49-F238E27FC236}">
-                <a16:creationId xmlns:a16="http://schemas.microsoft.com/office/drawing/2014/main" id="{1C626A81-BB06-4322-A7D6-687C2D6DAC1A}"/>
+                <a16:creationId xmlns:a16="http://schemas.microsoft.com/office/drawing/2014/main" xmlns="" id="{1C626A81-BB06-4322-A7D6-687C2D6DAC1A}"/>
               </a:ext>
             </a:extLst>
           </p:cNvPr>
@@ -1874,7 +1920,7 @@
           <a:p>
             <a:fld id="{05A204D3-7162-4E66-B5DE-41D55F78E01E}" type="slidenum">
               <a:rPr lang="en-US" smtClean="0"/>
-              <a:t>‹#›</a:t>
+              <a:t>‹Nº›</a:t>
             </a:fld>
             <a:endParaRPr lang="en-US"/>
           </a:p>
@@ -1915,7 +1961,7 @@
           <p:cNvPr id="2" name="Title 1">
             <a:extLst>
               <a:ext uri="{FF2B5EF4-FFF2-40B4-BE49-F238E27FC236}">
-                <a16:creationId xmlns:a16="http://schemas.microsoft.com/office/drawing/2014/main" id="{7E872EC0-12A5-4239-8214-3694AB898BCB}"/>
+                <a16:creationId xmlns:a16="http://schemas.microsoft.com/office/drawing/2014/main" xmlns="" id="{7E872EC0-12A5-4239-8214-3694AB898BCB}"/>
               </a:ext>
             </a:extLst>
           </p:cNvPr>
@@ -1943,7 +1989,7 @@
           <p:cNvPr id="3" name="Date Placeholder 2">
             <a:extLst>
               <a:ext uri="{FF2B5EF4-FFF2-40B4-BE49-F238E27FC236}">
-                <a16:creationId xmlns:a16="http://schemas.microsoft.com/office/drawing/2014/main" id="{35ABB1E8-1626-4E9A-960B-E7992737B958}"/>
+                <a16:creationId xmlns:a16="http://schemas.microsoft.com/office/drawing/2014/main" xmlns="" id="{35ABB1E8-1626-4E9A-960B-E7992737B958}"/>
               </a:ext>
             </a:extLst>
           </p:cNvPr>
@@ -1961,7 +2007,7 @@
           <a:p>
             <a:fld id="{25E08D22-8ABF-4F25-8268-5655165803FF}" type="datetimeFigureOut">
               <a:rPr lang="en-US" smtClean="0"/>
-              <a:t>5/23/2020</a:t>
+              <a:t>5/26/2020</a:t>
             </a:fld>
             <a:endParaRPr lang="en-US"/>
           </a:p>
@@ -1972,7 +2018,7 @@
           <p:cNvPr id="4" name="Footer Placeholder 3">
             <a:extLst>
               <a:ext uri="{FF2B5EF4-FFF2-40B4-BE49-F238E27FC236}">
-                <a16:creationId xmlns:a16="http://schemas.microsoft.com/office/drawing/2014/main" id="{97EA97C0-E9B7-4ECE-95A0-3FEF6DB2576C}"/>
+                <a16:creationId xmlns:a16="http://schemas.microsoft.com/office/drawing/2014/main" xmlns="" id="{97EA97C0-E9B7-4ECE-95A0-3FEF6DB2576C}"/>
               </a:ext>
             </a:extLst>
           </p:cNvPr>
@@ -1997,7 +2043,7 @@
           <p:cNvPr id="5" name="Slide Number Placeholder 4">
             <a:extLst>
               <a:ext uri="{FF2B5EF4-FFF2-40B4-BE49-F238E27FC236}">
-                <a16:creationId xmlns:a16="http://schemas.microsoft.com/office/drawing/2014/main" id="{26B5CB60-825D-4758-86BB-739B672B3825}"/>
+                <a16:creationId xmlns:a16="http://schemas.microsoft.com/office/drawing/2014/main" xmlns="" id="{26B5CB60-825D-4758-86BB-739B672B3825}"/>
               </a:ext>
             </a:extLst>
           </p:cNvPr>
@@ -2015,7 +2061,7 @@
           <a:p>
             <a:fld id="{05A204D3-7162-4E66-B5DE-41D55F78E01E}" type="slidenum">
               <a:rPr lang="en-US" smtClean="0"/>
-              <a:t>‹#›</a:t>
+              <a:t>‹Nº›</a:t>
             </a:fld>
             <a:endParaRPr lang="en-US"/>
           </a:p>
@@ -2056,7 +2102,7 @@
           <p:cNvPr id="2" name="Date Placeholder 1">
             <a:extLst>
               <a:ext uri="{FF2B5EF4-FFF2-40B4-BE49-F238E27FC236}">
-                <a16:creationId xmlns:a16="http://schemas.microsoft.com/office/drawing/2014/main" id="{AA0AF745-03EE-4564-98C8-E2DCCCFFD08A}"/>
+                <a16:creationId xmlns:a16="http://schemas.microsoft.com/office/drawing/2014/main" xmlns="" id="{AA0AF745-03EE-4564-98C8-E2DCCCFFD08A}"/>
               </a:ext>
             </a:extLst>
           </p:cNvPr>
@@ -2074,7 +2120,7 @@
           <a:p>
             <a:fld id="{25E08D22-8ABF-4F25-8268-5655165803FF}" type="datetimeFigureOut">
               <a:rPr lang="en-US" smtClean="0"/>
-              <a:t>5/23/2020</a:t>
+              <a:t>5/26/2020</a:t>
             </a:fld>
             <a:endParaRPr lang="en-US"/>
           </a:p>
@@ -2085,7 +2131,7 @@
           <p:cNvPr id="3" name="Footer Placeholder 2">
             <a:extLst>
               <a:ext uri="{FF2B5EF4-FFF2-40B4-BE49-F238E27FC236}">
-                <a16:creationId xmlns:a16="http://schemas.microsoft.com/office/drawing/2014/main" id="{63D66902-8D69-4151-8767-81BC9A253C63}"/>
+                <a16:creationId xmlns:a16="http://schemas.microsoft.com/office/drawing/2014/main" xmlns="" id="{63D66902-8D69-4151-8767-81BC9A253C63}"/>
               </a:ext>
             </a:extLst>
           </p:cNvPr>
@@ -2110,7 +2156,7 @@
           <p:cNvPr id="4" name="Slide Number Placeholder 3">
             <a:extLst>
               <a:ext uri="{FF2B5EF4-FFF2-40B4-BE49-F238E27FC236}">
-                <a16:creationId xmlns:a16="http://schemas.microsoft.com/office/drawing/2014/main" id="{8959A8CA-1C21-4E1C-A3F8-4146B1AD29E3}"/>
+                <a16:creationId xmlns:a16="http://schemas.microsoft.com/office/drawing/2014/main" xmlns="" id="{8959A8CA-1C21-4E1C-A3F8-4146B1AD29E3}"/>
               </a:ext>
             </a:extLst>
           </p:cNvPr>
@@ -2128,7 +2174,7 @@
           <a:p>
             <a:fld id="{05A204D3-7162-4E66-B5DE-41D55F78E01E}" type="slidenum">
               <a:rPr lang="en-US" smtClean="0"/>
-              <a:t>‹#›</a:t>
+              <a:t>‹Nº›</a:t>
             </a:fld>
             <a:endParaRPr lang="en-US"/>
           </a:p>
@@ -2169,7 +2215,7 @@
           <p:cNvPr id="2" name="Title 1">
             <a:extLst>
               <a:ext uri="{FF2B5EF4-FFF2-40B4-BE49-F238E27FC236}">
-                <a16:creationId xmlns:a16="http://schemas.microsoft.com/office/drawing/2014/main" id="{3881C098-F047-4C7E-B0D1-5D16BBD1B346}"/>
+                <a16:creationId xmlns:a16="http://schemas.microsoft.com/office/drawing/2014/main" xmlns="" id="{3881C098-F047-4C7E-B0D1-5D16BBD1B346}"/>
               </a:ext>
             </a:extLst>
           </p:cNvPr>
@@ -2206,7 +2252,7 @@
           <p:cNvPr id="3" name="Content Placeholder 2">
             <a:extLst>
               <a:ext uri="{FF2B5EF4-FFF2-40B4-BE49-F238E27FC236}">
-                <a16:creationId xmlns:a16="http://schemas.microsoft.com/office/drawing/2014/main" id="{618B0872-AA06-45B9-A9B5-278AC0174D82}"/>
+                <a16:creationId xmlns:a16="http://schemas.microsoft.com/office/drawing/2014/main" xmlns="" id="{618B0872-AA06-45B9-A9B5-278AC0174D82}"/>
               </a:ext>
             </a:extLst>
           </p:cNvPr>
@@ -2296,7 +2342,7 @@
           <p:cNvPr id="4" name="Text Placeholder 3">
             <a:extLst>
               <a:ext uri="{FF2B5EF4-FFF2-40B4-BE49-F238E27FC236}">
-                <a16:creationId xmlns:a16="http://schemas.microsoft.com/office/drawing/2014/main" id="{38C65E4F-2ED8-495B-A179-F958A31E5D55}"/>
+                <a16:creationId xmlns:a16="http://schemas.microsoft.com/office/drawing/2014/main" xmlns="" id="{38C65E4F-2ED8-495B-A179-F958A31E5D55}"/>
               </a:ext>
             </a:extLst>
           </p:cNvPr>
@@ -2367,7 +2413,7 @@
           <p:cNvPr id="5" name="Date Placeholder 4">
             <a:extLst>
               <a:ext uri="{FF2B5EF4-FFF2-40B4-BE49-F238E27FC236}">
-                <a16:creationId xmlns:a16="http://schemas.microsoft.com/office/drawing/2014/main" id="{9CDEC24D-F446-44D5-B71F-EBE310809B53}"/>
+                <a16:creationId xmlns:a16="http://schemas.microsoft.com/office/drawing/2014/main" xmlns="" id="{9CDEC24D-F446-44D5-B71F-EBE310809B53}"/>
               </a:ext>
             </a:extLst>
           </p:cNvPr>
@@ -2385,7 +2431,7 @@
           <a:p>
             <a:fld id="{25E08D22-8ABF-4F25-8268-5655165803FF}" type="datetimeFigureOut">
               <a:rPr lang="en-US" smtClean="0"/>
-              <a:t>5/23/2020</a:t>
+              <a:t>5/26/2020</a:t>
             </a:fld>
             <a:endParaRPr lang="en-US"/>
           </a:p>
@@ -2396,7 +2442,7 @@
           <p:cNvPr id="6" name="Footer Placeholder 5">
             <a:extLst>
               <a:ext uri="{FF2B5EF4-FFF2-40B4-BE49-F238E27FC236}">
-                <a16:creationId xmlns:a16="http://schemas.microsoft.com/office/drawing/2014/main" id="{41F78E83-81EA-4F58-98E2-1878CCDE0614}"/>
+                <a16:creationId xmlns:a16="http://schemas.microsoft.com/office/drawing/2014/main" xmlns="" id="{41F78E83-81EA-4F58-98E2-1878CCDE0614}"/>
               </a:ext>
             </a:extLst>
           </p:cNvPr>
@@ -2421,7 +2467,7 @@
           <p:cNvPr id="7" name="Slide Number Placeholder 6">
             <a:extLst>
               <a:ext uri="{FF2B5EF4-FFF2-40B4-BE49-F238E27FC236}">
-                <a16:creationId xmlns:a16="http://schemas.microsoft.com/office/drawing/2014/main" id="{A2CA65FF-1CDD-457C-B4CB-6265FEC6D8EE}"/>
+                <a16:creationId xmlns:a16="http://schemas.microsoft.com/office/drawing/2014/main" xmlns="" id="{A2CA65FF-1CDD-457C-B4CB-6265FEC6D8EE}"/>
               </a:ext>
             </a:extLst>
           </p:cNvPr>
@@ -2439,7 +2485,7 @@
           <a:p>
             <a:fld id="{05A204D3-7162-4E66-B5DE-41D55F78E01E}" type="slidenum">
               <a:rPr lang="en-US" smtClean="0"/>
-              <a:t>‹#›</a:t>
+              <a:t>‹Nº›</a:t>
             </a:fld>
             <a:endParaRPr lang="en-US"/>
           </a:p>
@@ -2480,7 +2526,7 @@
           <p:cNvPr id="2" name="Title 1">
             <a:extLst>
               <a:ext uri="{FF2B5EF4-FFF2-40B4-BE49-F238E27FC236}">
-                <a16:creationId xmlns:a16="http://schemas.microsoft.com/office/drawing/2014/main" id="{80C08F37-5678-4AB2-B181-1373C99FC925}"/>
+                <a16:creationId xmlns:a16="http://schemas.microsoft.com/office/drawing/2014/main" xmlns="" id="{80C08F37-5678-4AB2-B181-1373C99FC925}"/>
               </a:ext>
             </a:extLst>
           </p:cNvPr>
@@ -2517,7 +2563,7 @@
           <p:cNvPr id="3" name="Picture Placeholder 2">
             <a:extLst>
               <a:ext uri="{FF2B5EF4-FFF2-40B4-BE49-F238E27FC236}">
-                <a16:creationId xmlns:a16="http://schemas.microsoft.com/office/drawing/2014/main" id="{78A9D96D-CA8B-4A4D-A5E9-AF389D0BA44E}"/>
+                <a16:creationId xmlns:a16="http://schemas.microsoft.com/office/drawing/2014/main" xmlns="" id="{78A9D96D-CA8B-4A4D-A5E9-AF389D0BA44E}"/>
               </a:ext>
             </a:extLst>
           </p:cNvPr>
@@ -2584,7 +2630,7 @@
           <p:cNvPr id="4" name="Text Placeholder 3">
             <a:extLst>
               <a:ext uri="{FF2B5EF4-FFF2-40B4-BE49-F238E27FC236}">
-                <a16:creationId xmlns:a16="http://schemas.microsoft.com/office/drawing/2014/main" id="{97E690A2-62C9-4E47-8712-191FA5C99CD0}"/>
+                <a16:creationId xmlns:a16="http://schemas.microsoft.com/office/drawing/2014/main" xmlns="" id="{97E690A2-62C9-4E47-8712-191FA5C99CD0}"/>
               </a:ext>
             </a:extLst>
           </p:cNvPr>
@@ -2655,7 +2701,7 @@
           <p:cNvPr id="5" name="Date Placeholder 4">
             <a:extLst>
               <a:ext uri="{FF2B5EF4-FFF2-40B4-BE49-F238E27FC236}">
-                <a16:creationId xmlns:a16="http://schemas.microsoft.com/office/drawing/2014/main" id="{84EF91DF-B740-4E35-9F52-4B997DD559BD}"/>
+                <a16:creationId xmlns:a16="http://schemas.microsoft.com/office/drawing/2014/main" xmlns="" id="{84EF91DF-B740-4E35-9F52-4B997DD559BD}"/>
               </a:ext>
             </a:extLst>
           </p:cNvPr>
@@ -2673,7 +2719,7 @@
           <a:p>
             <a:fld id="{25E08D22-8ABF-4F25-8268-5655165803FF}" type="datetimeFigureOut">
               <a:rPr lang="en-US" smtClean="0"/>
-              <a:t>5/23/2020</a:t>
+              <a:t>5/26/2020</a:t>
             </a:fld>
             <a:endParaRPr lang="en-US"/>
           </a:p>
@@ -2684,7 +2730,7 @@
           <p:cNvPr id="6" name="Footer Placeholder 5">
             <a:extLst>
               <a:ext uri="{FF2B5EF4-FFF2-40B4-BE49-F238E27FC236}">
-                <a16:creationId xmlns:a16="http://schemas.microsoft.com/office/drawing/2014/main" id="{3B9E62FE-8AFC-43BF-BF36-35E118C45396}"/>
+                <a16:creationId xmlns:a16="http://schemas.microsoft.com/office/drawing/2014/main" xmlns="" id="{3B9E62FE-8AFC-43BF-BF36-35E118C45396}"/>
               </a:ext>
             </a:extLst>
           </p:cNvPr>
@@ -2709,7 +2755,7 @@
           <p:cNvPr id="7" name="Slide Number Placeholder 6">
             <a:extLst>
               <a:ext uri="{FF2B5EF4-FFF2-40B4-BE49-F238E27FC236}">
-                <a16:creationId xmlns:a16="http://schemas.microsoft.com/office/drawing/2014/main" id="{FF3A22E0-46F9-436F-B8FF-ED18868CB29E}"/>
+                <a16:creationId xmlns:a16="http://schemas.microsoft.com/office/drawing/2014/main" xmlns="" id="{FF3A22E0-46F9-436F-B8FF-ED18868CB29E}"/>
               </a:ext>
             </a:extLst>
           </p:cNvPr>
@@ -2727,7 +2773,7 @@
           <a:p>
             <a:fld id="{05A204D3-7162-4E66-B5DE-41D55F78E01E}" type="slidenum">
               <a:rPr lang="en-US" smtClean="0"/>
-              <a:t>‹#›</a:t>
+              <a:t>‹Nº›</a:t>
             </a:fld>
             <a:endParaRPr lang="en-US"/>
           </a:p>
@@ -2773,7 +2819,7 @@
           <p:cNvPr id="2" name="Title Placeholder 1">
             <a:extLst>
               <a:ext uri="{FF2B5EF4-FFF2-40B4-BE49-F238E27FC236}">
-                <a16:creationId xmlns:a16="http://schemas.microsoft.com/office/drawing/2014/main" id="{23FC80F1-42CD-4D52-ADD9-D403CD055392}"/>
+                <a16:creationId xmlns:a16="http://schemas.microsoft.com/office/drawing/2014/main" xmlns="" id="{23FC80F1-42CD-4D52-ADD9-D403CD055392}"/>
               </a:ext>
             </a:extLst>
           </p:cNvPr>
@@ -2811,7 +2857,7 @@
           <p:cNvPr id="3" name="Text Placeholder 2">
             <a:extLst>
               <a:ext uri="{FF2B5EF4-FFF2-40B4-BE49-F238E27FC236}">
-                <a16:creationId xmlns:a16="http://schemas.microsoft.com/office/drawing/2014/main" id="{C8BB968B-8C92-4280-B79B-5990E22F16C6}"/>
+                <a16:creationId xmlns:a16="http://schemas.microsoft.com/office/drawing/2014/main" xmlns="" id="{C8BB968B-8C92-4280-B79B-5990E22F16C6}"/>
               </a:ext>
             </a:extLst>
           </p:cNvPr>
@@ -2878,7 +2924,7 @@
           <p:cNvPr id="4" name="Date Placeholder 3">
             <a:extLst>
               <a:ext uri="{FF2B5EF4-FFF2-40B4-BE49-F238E27FC236}">
-                <a16:creationId xmlns:a16="http://schemas.microsoft.com/office/drawing/2014/main" id="{A9B467D9-42DF-41E3-AB90-C567B674FBDC}"/>
+                <a16:creationId xmlns:a16="http://schemas.microsoft.com/office/drawing/2014/main" xmlns="" id="{A9B467D9-42DF-41E3-AB90-C567B674FBDC}"/>
               </a:ext>
             </a:extLst>
           </p:cNvPr>
@@ -2914,7 +2960,7 @@
           <a:p>
             <a:fld id="{25E08D22-8ABF-4F25-8268-5655165803FF}" type="datetimeFigureOut">
               <a:rPr lang="en-US" smtClean="0"/>
-              <a:t>5/23/2020</a:t>
+              <a:t>5/26/2020</a:t>
             </a:fld>
             <a:endParaRPr lang="en-US"/>
           </a:p>
@@ -2925,7 +2971,7 @@
           <p:cNvPr id="5" name="Footer Placeholder 4">
             <a:extLst>
               <a:ext uri="{FF2B5EF4-FFF2-40B4-BE49-F238E27FC236}">
-                <a16:creationId xmlns:a16="http://schemas.microsoft.com/office/drawing/2014/main" id="{1E908AD8-17CE-4881-A2A8-318A90D77C3C}"/>
+                <a16:creationId xmlns:a16="http://schemas.microsoft.com/office/drawing/2014/main" xmlns="" id="{1E908AD8-17CE-4881-A2A8-318A90D77C3C}"/>
               </a:ext>
             </a:extLst>
           </p:cNvPr>
@@ -2968,7 +3014,7 @@
           <p:cNvPr id="6" name="Slide Number Placeholder 5">
             <a:extLst>
               <a:ext uri="{FF2B5EF4-FFF2-40B4-BE49-F238E27FC236}">
-                <a16:creationId xmlns:a16="http://schemas.microsoft.com/office/drawing/2014/main" id="{64663006-5CE9-4D97-87B0-84197A966CDA}"/>
+                <a16:creationId xmlns:a16="http://schemas.microsoft.com/office/drawing/2014/main" xmlns="" id="{64663006-5CE9-4D97-87B0-84197A966CDA}"/>
               </a:ext>
             </a:extLst>
           </p:cNvPr>
@@ -3004,7 +3050,7 @@
           <a:p>
             <a:fld id="{05A204D3-7162-4E66-B5DE-41D55F78E01E}" type="slidenum">
               <a:rPr lang="en-US" smtClean="0"/>
-              <a:t>‹#›</a:t>
+              <a:t>‹Nº›</a:t>
             </a:fld>
             <a:endParaRPr lang="en-US"/>
           </a:p>
@@ -3336,7 +3382,7 @@
           <p:cNvPr id="2" name="Title 1">
             <a:extLst>
               <a:ext uri="{FF2B5EF4-FFF2-40B4-BE49-F238E27FC236}">
-                <a16:creationId xmlns:a16="http://schemas.microsoft.com/office/drawing/2014/main" id="{2D16427A-47C6-441D-BD42-361307F2FE4E}"/>
+                <a16:creationId xmlns:a16="http://schemas.microsoft.com/office/drawing/2014/main" xmlns="" id="{2D16427A-47C6-441D-BD42-361307F2FE4E}"/>
               </a:ext>
             </a:extLst>
           </p:cNvPr>
@@ -3364,7 +3410,7 @@
           <p:cNvPr id="3" name="Content Placeholder 2">
             <a:extLst>
               <a:ext uri="{FF2B5EF4-FFF2-40B4-BE49-F238E27FC236}">
-                <a16:creationId xmlns:a16="http://schemas.microsoft.com/office/drawing/2014/main" id="{392835C1-2B56-4771-A704-2A14BB4297FC}"/>
+                <a16:creationId xmlns:a16="http://schemas.microsoft.com/office/drawing/2014/main" xmlns="" id="{392835C1-2B56-4771-A704-2A14BB4297FC}"/>
               </a:ext>
             </a:extLst>
           </p:cNvPr>
@@ -3468,7 +3514,7 @@
           <p:cNvPr id="2" name="Title 1">
             <a:extLst>
               <a:ext uri="{FF2B5EF4-FFF2-40B4-BE49-F238E27FC236}">
-                <a16:creationId xmlns:a16="http://schemas.microsoft.com/office/drawing/2014/main" id="{15FA1F91-4BD3-45D8-B1A1-07E889728899}"/>
+                <a16:creationId xmlns:a16="http://schemas.microsoft.com/office/drawing/2014/main" xmlns="" id="{15FA1F91-4BD3-45D8-B1A1-07E889728899}"/>
               </a:ext>
             </a:extLst>
           </p:cNvPr>
@@ -3496,7 +3542,7 @@
           <p:cNvPr id="4" name="Content Placeholder 3">
             <a:extLst>
               <a:ext uri="{FF2B5EF4-FFF2-40B4-BE49-F238E27FC236}">
-                <a16:creationId xmlns:a16="http://schemas.microsoft.com/office/drawing/2014/main" id="{7F3328D4-DD29-405C-8F7E-E94645B8ACC9}"/>
+                <a16:creationId xmlns:a16="http://schemas.microsoft.com/office/drawing/2014/main" xmlns="" id="{7F3328D4-DD29-405C-8F7E-E94645B8ACC9}"/>
               </a:ext>
             </a:extLst>
           </p:cNvPr>
@@ -3507,78 +3553,78 @@
             <p:ph idx="1"/>
             <p:extLst>
               <p:ext uri="{D42A27DB-BD31-4B8C-83A1-F6EECF244321}">
-                <p14:modId xmlns:p14="http://schemas.microsoft.com/office/powerpoint/2010/main" val="4177961560"/>
+                <p14:modId xmlns:p14="http://schemas.microsoft.com/office/powerpoint/2010/main" val="3080892634"/>
               </p:ext>
             </p:extLst>
           </p:nvPr>
         </p:nvGraphicFramePr>
         <p:xfrm>
           <a:off x="889000" y="1566569"/>
-          <a:ext cx="10414000" cy="2249805"/>
+          <a:ext cx="10414000" cy="3592625"/>
         </p:xfrm>
         <a:graphic>
           <a:graphicData uri="http://schemas.openxmlformats.org/drawingml/2006/table">
             <a:tbl>
               <a:tblPr/>
               <a:tblGrid>
-                <a:gridCol w="1665859">
+                <a:gridCol w="1680029">
                   <a:extLst>
                     <a:ext uri="{9D8B030D-6E8A-4147-A177-3AD203B41FA5}">
-                      <a16:colId xmlns:a16="http://schemas.microsoft.com/office/drawing/2014/main" val="690787118"/>
+                      <a16:colId xmlns:a16="http://schemas.microsoft.com/office/drawing/2014/main" xmlns="" val="690787118"/>
                     </a:ext>
                   </a:extLst>
                 </a:gridCol>
-                <a:gridCol w="1484995">
+                <a:gridCol w="1470825">
                   <a:extLst>
                     <a:ext uri="{9D8B030D-6E8A-4147-A177-3AD203B41FA5}">
-                      <a16:colId xmlns:a16="http://schemas.microsoft.com/office/drawing/2014/main" val="750064233"/>
+                      <a16:colId xmlns:a16="http://schemas.microsoft.com/office/drawing/2014/main" xmlns="" val="750064233"/>
                     </a:ext>
                   </a:extLst>
                 </a:gridCol>
                 <a:gridCol w="1916531">
                   <a:extLst>
                     <a:ext uri="{9D8B030D-6E8A-4147-A177-3AD203B41FA5}">
-                      <a16:colId xmlns:a16="http://schemas.microsoft.com/office/drawing/2014/main" val="2105501645"/>
+                      <a16:colId xmlns:a16="http://schemas.microsoft.com/office/drawing/2014/main" xmlns="" val="2105501645"/>
                     </a:ext>
                   </a:extLst>
                 </a:gridCol>
                 <a:gridCol w="1662686">
                   <a:extLst>
                     <a:ext uri="{9D8B030D-6E8A-4147-A177-3AD203B41FA5}">
-                      <a16:colId xmlns:a16="http://schemas.microsoft.com/office/drawing/2014/main" val="1977887359"/>
+                      <a16:colId xmlns:a16="http://schemas.microsoft.com/office/drawing/2014/main" xmlns="" val="1977887359"/>
                     </a:ext>
                   </a:extLst>
                 </a:gridCol>
                 <a:gridCol w="596536">
                   <a:extLst>
                     <a:ext uri="{9D8B030D-6E8A-4147-A177-3AD203B41FA5}">
-                      <a16:colId xmlns:a16="http://schemas.microsoft.com/office/drawing/2014/main" val="906656688"/>
+                      <a16:colId xmlns:a16="http://schemas.microsoft.com/office/drawing/2014/main" xmlns="" val="906656688"/>
                     </a:ext>
                   </a:extLst>
                 </a:gridCol>
                 <a:gridCol w="1307303">
                   <a:extLst>
                     <a:ext uri="{9D8B030D-6E8A-4147-A177-3AD203B41FA5}">
-                      <a16:colId xmlns:a16="http://schemas.microsoft.com/office/drawing/2014/main" val="2019976033"/>
+                      <a16:colId xmlns:a16="http://schemas.microsoft.com/office/drawing/2014/main" xmlns="" val="2019976033"/>
                     </a:ext>
                   </a:extLst>
                 </a:gridCol>
                 <a:gridCol w="675863">
                   <a:extLst>
                     <a:ext uri="{9D8B030D-6E8A-4147-A177-3AD203B41FA5}">
-                      <a16:colId xmlns:a16="http://schemas.microsoft.com/office/drawing/2014/main" val="4067438892"/>
+                      <a16:colId xmlns:a16="http://schemas.microsoft.com/office/drawing/2014/main" xmlns="" val="4067438892"/>
                     </a:ext>
                   </a:extLst>
                 </a:gridCol>
                 <a:gridCol w="1104227">
                   <a:extLst>
                     <a:ext uri="{9D8B030D-6E8A-4147-A177-3AD203B41FA5}">
-                      <a16:colId xmlns:a16="http://schemas.microsoft.com/office/drawing/2014/main" val="2981415886"/>
+                      <a16:colId xmlns:a16="http://schemas.microsoft.com/office/drawing/2014/main" xmlns="" val="2981415886"/>
                     </a:ext>
                   </a:extLst>
                 </a:gridCol>
               </a:tblGrid>
-              <a:tr h="190500">
+              <a:tr h="220028">
                 <a:tc>
                   <a:txBody>
                     <a:bodyPr/>
@@ -3586,7 +3632,7 @@
                     <a:p>
                       <a:pPr algn="ctr" fontAlgn="ctr"/>
                       <a:r>
-                        <a:rPr lang="en-US" sz="1100" b="1" i="0" u="none" strike="noStrike">
+                        <a:rPr lang="en-US" sz="1100" b="1" i="0" u="none" strike="noStrike" dirty="0">
                           <a:solidFill>
                             <a:srgbClr val="FFFFFF"/>
                           </a:solidFill>
@@ -3886,7 +3932,7 @@
                     <a:p>
                       <a:pPr algn="ctr" fontAlgn="ctr"/>
                       <a:r>
-                        <a:rPr lang="en-US" sz="1100" b="1" i="0" u="none" strike="noStrike">
+                        <a:rPr lang="en-US" sz="1100" b="1" i="0" u="none" strike="noStrike" dirty="0">
                           <a:solidFill>
                             <a:srgbClr val="FFFFFF"/>
                           </a:solidFill>
@@ -3946,14 +3992,24 @@
                     <a:p>
                       <a:pPr algn="ctr" fontAlgn="ctr"/>
                       <a:r>
-                        <a:rPr lang="en-US" sz="1100" b="1" i="0" u="none" strike="noStrike">
+                        <a:rPr lang="en-US" sz="1100" b="1" i="0" u="none" strike="noStrike" dirty="0" err="1">
                           <a:solidFill>
                             <a:srgbClr val="FFFFFF"/>
                           </a:solidFill>
                           <a:effectLst/>
                           <a:latin typeface="Calibri" panose="020F0502020204030204" pitchFamily="34" charset="0"/>
                         </a:rPr>
-                        <a:t>Speciffic page</a:t>
+                        <a:t>Speciffic</a:t>
+                      </a:r>
+                      <a:r>
+                        <a:rPr lang="en-US" sz="1100" b="1" i="0" u="none" strike="noStrike" dirty="0">
+                          <a:solidFill>
+                            <a:srgbClr val="FFFFFF"/>
+                          </a:solidFill>
+                          <a:effectLst/>
+                          <a:latin typeface="Calibri" panose="020F0502020204030204" pitchFamily="34" charset="0"/>
+                        </a:rPr>
+                        <a:t> page</a:t>
                       </a:r>
                     </a:p>
                   </a:txBody>
@@ -4001,7 +4057,7 @@
                 </a:tc>
                 <a:extLst>
                   <a:ext uri="{0D108BD9-81ED-4DB2-BD59-A6C34878D82A}">
-                    <a16:rowId xmlns:a16="http://schemas.microsoft.com/office/drawing/2014/main" val="4280455846"/>
+                    <a16:rowId xmlns:a16="http://schemas.microsoft.com/office/drawing/2014/main" xmlns="" val="4280455846"/>
                   </a:ext>
                 </a:extLst>
               </a:tr>
@@ -4013,7 +4069,7 @@
                     <a:p>
                       <a:pPr algn="ctr" fontAlgn="ctr"/>
                       <a:r>
-                        <a:rPr lang="en-US" sz="1100" b="0" i="0" u="none" strike="noStrike">
+                        <a:rPr lang="en-US" sz="1100" b="0" i="0" u="none" strike="noStrike" dirty="0">
                           <a:solidFill>
                             <a:srgbClr val="000000"/>
                           </a:solidFill>
@@ -4061,14 +4117,34 @@
                     <a:p>
                       <a:pPr algn="ctr" fontAlgn="ctr"/>
                       <a:r>
-                        <a:rPr lang="en-US" sz="1100" b="0" i="0" u="none" strike="noStrike">
-                          <a:solidFill>
-                            <a:srgbClr val="000000"/>
-                          </a:solidFill>
-                          <a:effectLst/>
-                          <a:latin typeface="Calibri" panose="020F0502020204030204" pitchFamily="34" charset="0"/>
-                        </a:rPr>
-                        <a:t>Court (filter)</a:t>
+                        <a:rPr lang="en-US" sz="1100" b="0" i="0" u="none" strike="noStrike" dirty="0" err="1" smtClean="0">
+                          <a:solidFill>
+                            <a:srgbClr val="000000"/>
+                          </a:solidFill>
+                          <a:effectLst/>
+                          <a:latin typeface="Calibri" panose="020F0502020204030204" pitchFamily="34" charset="0"/>
+                        </a:rPr>
+                        <a:t>Court_name</a:t>
+                      </a:r>
+                      <a:r>
+                        <a:rPr lang="en-US" sz="1100" b="0" i="0" u="none" strike="noStrike" dirty="0" smtClean="0">
+                          <a:solidFill>
+                            <a:srgbClr val="000000"/>
+                          </a:solidFill>
+                          <a:effectLst/>
+                          <a:latin typeface="Calibri" panose="020F0502020204030204" pitchFamily="34" charset="0"/>
+                        </a:rPr>
+                        <a:t>(filter</a:t>
+                      </a:r>
+                      <a:r>
+                        <a:rPr lang="en-US" sz="1100" b="0" i="0" u="none" strike="noStrike" dirty="0">
+                          <a:solidFill>
+                            <a:srgbClr val="000000"/>
+                          </a:solidFill>
+                          <a:effectLst/>
+                          <a:latin typeface="Calibri" panose="020F0502020204030204" pitchFamily="34" charset="0"/>
+                        </a:rPr>
+                        <a:t>)</a:t>
                       </a:r>
                     </a:p>
                   </a:txBody>
@@ -4103,14 +4179,34 @@
                     <a:p>
                       <a:pPr algn="ctr" fontAlgn="ctr"/>
                       <a:r>
-                        <a:rPr lang="en-US" sz="1100" b="0" i="0" u="none" strike="noStrike">
-                          <a:solidFill>
-                            <a:srgbClr val="000000"/>
-                          </a:solidFill>
-                          <a:effectLst/>
-                          <a:latin typeface="Calibri" panose="020F0502020204030204" pitchFamily="34" charset="0"/>
-                        </a:rPr>
-                        <a:t>Offense (filter)</a:t>
+                        <a:rPr lang="en-US" sz="1100" b="0" i="0" u="none" strike="noStrike" dirty="0" err="1" smtClean="0">
+                          <a:solidFill>
+                            <a:srgbClr val="000000"/>
+                          </a:solidFill>
+                          <a:effectLst/>
+                          <a:latin typeface="Calibri" panose="020F0502020204030204" pitchFamily="34" charset="0"/>
+                        </a:rPr>
+                        <a:t>Offense_category</a:t>
+                      </a:r>
+                      <a:r>
+                        <a:rPr lang="en-US" sz="1100" b="0" i="0" u="none" strike="noStrike" dirty="0" smtClean="0">
+                          <a:solidFill>
+                            <a:srgbClr val="000000"/>
+                          </a:solidFill>
+                          <a:effectLst/>
+                          <a:latin typeface="Calibri" panose="020F0502020204030204" pitchFamily="34" charset="0"/>
+                        </a:rPr>
+                        <a:t> </a:t>
+                      </a:r>
+                      <a:r>
+                        <a:rPr lang="en-US" sz="1100" b="0" i="0" u="none" strike="noStrike" dirty="0">
+                          <a:solidFill>
+                            <a:srgbClr val="000000"/>
+                          </a:solidFill>
+                          <a:effectLst/>
+                          <a:latin typeface="Calibri" panose="020F0502020204030204" pitchFamily="34" charset="0"/>
+                        </a:rPr>
+                        <a:t>(filter)</a:t>
                       </a:r>
                     </a:p>
                   </a:txBody>
@@ -4145,15 +4241,22 @@
                     <a:p>
                       <a:pPr algn="ctr" fontAlgn="ctr"/>
                       <a:r>
-                        <a:rPr lang="en-US" sz="1100" b="0" i="0" u="none" strike="noStrike">
-                          <a:solidFill>
-                            <a:srgbClr val="000000"/>
-                          </a:solidFill>
-                          <a:effectLst/>
-                          <a:latin typeface="Calibri" panose="020F0502020204030204" pitchFamily="34" charset="0"/>
-                        </a:rPr>
-                        <a:t>Sentence (filter)</a:t>
-                      </a:r>
+                        <a:rPr lang="en-US" sz="1100" b="0" i="0" u="none" strike="noStrike" dirty="0" smtClean="0">
+                          <a:solidFill>
+                            <a:srgbClr val="000000"/>
+                          </a:solidFill>
+                          <a:effectLst/>
+                          <a:latin typeface="Calibri" panose="020F0502020204030204" pitchFamily="34" charset="0"/>
+                        </a:rPr>
+                        <a:t>SENTENCE_TYPE (filter)</a:t>
+                      </a:r>
+                      <a:endParaRPr lang="en-US" sz="1100" b="0" i="0" u="none" strike="noStrike" dirty="0">
+                        <a:solidFill>
+                          <a:srgbClr val="000000"/>
+                        </a:solidFill>
+                        <a:effectLst/>
+                        <a:latin typeface="Calibri" panose="020F0502020204030204" pitchFamily="34" charset="0"/>
+                      </a:endParaRPr>
                     </a:p>
                   </a:txBody>
                   <a:tcPr marL="9525" marR="9525" marT="9525" marB="0" anchor="ctr">
@@ -4271,7 +4374,7 @@
                     <a:p>
                       <a:pPr algn="ctr" fontAlgn="ctr"/>
                       <a:r>
-                        <a:rPr lang="en-US" sz="1100" b="0" i="0" u="none" strike="noStrike">
+                        <a:rPr lang="en-US" sz="1100" b="0" i="0" u="none" strike="noStrike" dirty="0">
                           <a:solidFill>
                             <a:srgbClr val="000000"/>
                           </a:solidFill>
@@ -4313,15 +4416,22 @@
                     <a:p>
                       <a:pPr algn="ctr" fontAlgn="ctr"/>
                       <a:r>
-                        <a:rPr lang="en-US" sz="1100" b="0" i="0" u="none" strike="noStrike">
-                          <a:solidFill>
-                            <a:srgbClr val="000000"/>
-                          </a:solidFill>
-                          <a:effectLst/>
-                          <a:latin typeface="Calibri" panose="020F0502020204030204" pitchFamily="34" charset="0"/>
-                        </a:rPr>
-                        <a:t>Demographic</a:t>
-                      </a:r>
+                        <a:rPr lang="en-US" sz="1100" b="0" i="0" u="none" strike="noStrike" dirty="0" smtClean="0">
+                          <a:solidFill>
+                            <a:srgbClr val="000000"/>
+                          </a:solidFill>
+                          <a:effectLst/>
+                          <a:latin typeface="Calibri" panose="020F0502020204030204" pitchFamily="34" charset="0"/>
+                        </a:rPr>
+                        <a:t>/Demographics</a:t>
+                      </a:r>
+                      <a:endParaRPr lang="en-US" sz="1100" b="0" i="0" u="none" strike="noStrike" dirty="0">
+                        <a:solidFill>
+                          <a:srgbClr val="000000"/>
+                        </a:solidFill>
+                        <a:effectLst/>
+                        <a:latin typeface="Calibri" panose="020F0502020204030204" pitchFamily="34" charset="0"/>
+                      </a:endParaRPr>
                     </a:p>
                   </a:txBody>
                   <a:tcPr marL="9525" marR="9525" marT="9525" marB="0" anchor="ctr">
@@ -4356,7 +4466,7 @@
                 </a:tc>
                 <a:extLst>
                   <a:ext uri="{0D108BD9-81ED-4DB2-BD59-A6C34878D82A}">
-                    <a16:rowId xmlns:a16="http://schemas.microsoft.com/office/drawing/2014/main" val="3611411439"/>
+                    <a16:rowId xmlns:a16="http://schemas.microsoft.com/office/drawing/2014/main" xmlns="" val="3611411439"/>
                   </a:ext>
                 </a:extLst>
               </a:tr>
@@ -4368,7 +4478,7 @@
                     <a:p>
                       <a:pPr algn="ctr" fontAlgn="ctr"/>
                       <a:r>
-                        <a:rPr lang="en-US" sz="1100" b="0" i="0" u="none" strike="noStrike">
+                        <a:rPr lang="en-US" sz="1100" b="0" i="0" u="none" strike="noStrike" dirty="0">
                           <a:solidFill>
                             <a:srgbClr val="000000"/>
                           </a:solidFill>
@@ -4407,14 +4517,34 @@
                     <a:p>
                       <a:pPr algn="ctr" fontAlgn="ctr"/>
                       <a:r>
-                        <a:rPr lang="en-US" sz="1100" b="0" i="0" u="none" strike="noStrike">
-                          <a:solidFill>
-                            <a:srgbClr val="000000"/>
-                          </a:solidFill>
-                          <a:effectLst/>
-                          <a:latin typeface="Calibri" panose="020F0502020204030204" pitchFamily="34" charset="0"/>
-                        </a:rPr>
-                        <a:t>Court (filter)</a:t>
+                        <a:rPr lang="en-US" sz="1100" b="0" i="0" u="none" strike="noStrike" dirty="0" err="1" smtClean="0">
+                          <a:solidFill>
+                            <a:srgbClr val="000000"/>
+                          </a:solidFill>
+                          <a:effectLst/>
+                          <a:latin typeface="Calibri" panose="020F0502020204030204" pitchFamily="34" charset="0"/>
+                        </a:rPr>
+                        <a:t>Court_name</a:t>
+                      </a:r>
+                      <a:r>
+                        <a:rPr lang="en-US" sz="1100" b="0" i="0" u="none" strike="noStrike" dirty="0" smtClean="0">
+                          <a:solidFill>
+                            <a:srgbClr val="000000"/>
+                          </a:solidFill>
+                          <a:effectLst/>
+                          <a:latin typeface="Calibri" panose="020F0502020204030204" pitchFamily="34" charset="0"/>
+                        </a:rPr>
+                        <a:t>(filter</a:t>
+                      </a:r>
+                      <a:r>
+                        <a:rPr lang="en-US" sz="1100" b="0" i="0" u="none" strike="noStrike" dirty="0">
+                          <a:solidFill>
+                            <a:srgbClr val="000000"/>
+                          </a:solidFill>
+                          <a:effectLst/>
+                          <a:latin typeface="Calibri" panose="020F0502020204030204" pitchFamily="34" charset="0"/>
+                        </a:rPr>
+                        <a:t>)</a:t>
                       </a:r>
                     </a:p>
                   </a:txBody>
@@ -4440,14 +4570,34 @@
                     <a:p>
                       <a:pPr algn="ctr" fontAlgn="ctr"/>
                       <a:r>
-                        <a:rPr lang="en-US" sz="1100" b="0" i="0" u="none" strike="noStrike">
-                          <a:solidFill>
-                            <a:srgbClr val="000000"/>
-                          </a:solidFill>
-                          <a:effectLst/>
-                          <a:latin typeface="Calibri" panose="020F0502020204030204" pitchFamily="34" charset="0"/>
-                        </a:rPr>
-                        <a:t>Offense (filter)</a:t>
+                        <a:rPr lang="en-US" sz="1100" b="0" i="0" u="none" strike="noStrike" dirty="0" err="1" smtClean="0">
+                          <a:solidFill>
+                            <a:srgbClr val="000000"/>
+                          </a:solidFill>
+                          <a:effectLst/>
+                          <a:latin typeface="Calibri" panose="020F0502020204030204" pitchFamily="34" charset="0"/>
+                        </a:rPr>
+                        <a:t>Offense_category</a:t>
+                      </a:r>
+                      <a:r>
+                        <a:rPr lang="en-US" sz="1100" b="0" i="0" u="none" strike="noStrike" dirty="0" smtClean="0">
+                          <a:solidFill>
+                            <a:srgbClr val="000000"/>
+                          </a:solidFill>
+                          <a:effectLst/>
+                          <a:latin typeface="Calibri" panose="020F0502020204030204" pitchFamily="34" charset="0"/>
+                        </a:rPr>
+                        <a:t> </a:t>
+                      </a:r>
+                      <a:r>
+                        <a:rPr lang="en-US" sz="1100" b="0" i="0" u="none" strike="noStrike" dirty="0">
+                          <a:solidFill>
+                            <a:srgbClr val="000000"/>
+                          </a:solidFill>
+                          <a:effectLst/>
+                          <a:latin typeface="Calibri" panose="020F0502020204030204" pitchFamily="34" charset="0"/>
+                        </a:rPr>
+                        <a:t>(filter)</a:t>
                       </a:r>
                     </a:p>
                   </a:txBody>
@@ -4471,16 +4621,32 @@
                     <a:bodyPr/>
                     <a:lstStyle/>
                     <a:p>
-                      <a:pPr algn="ctr" fontAlgn="ctr"/>
-                      <a:r>
-                        <a:rPr lang="en-US" sz="1100" b="0" i="0" u="none" strike="noStrike">
-                          <a:solidFill>
-                            <a:srgbClr val="000000"/>
-                          </a:solidFill>
-                          <a:effectLst/>
-                          <a:latin typeface="Calibri" panose="020F0502020204030204" pitchFamily="34" charset="0"/>
-                        </a:rPr>
-                        <a:t>Sentence (filter)</a:t>
+                      <a:pPr marL="0" marR="0" indent="0" algn="ctr" defTabSz="914400" rtl="0" eaLnBrk="1" fontAlgn="ctr" latinLnBrk="0" hangingPunct="1">
+                        <a:lnSpc>
+                          <a:spcPct val="100000"/>
+                        </a:lnSpc>
+                        <a:spcBef>
+                          <a:spcPts val="0"/>
+                        </a:spcBef>
+                        <a:spcAft>
+                          <a:spcPts val="0"/>
+                        </a:spcAft>
+                        <a:buClrTx/>
+                        <a:buSzTx/>
+                        <a:buFontTx/>
+                        <a:buNone/>
+                        <a:tabLst/>
+                        <a:defRPr/>
+                      </a:pPr>
+                      <a:r>
+                        <a:rPr lang="en-US" sz="1100" b="0" i="0" u="none" strike="noStrike" dirty="0" smtClean="0">
+                          <a:solidFill>
+                            <a:srgbClr val="000000"/>
+                          </a:solidFill>
+                          <a:effectLst/>
+                          <a:latin typeface="Calibri" panose="020F0502020204030204" pitchFamily="34" charset="0"/>
+                        </a:rPr>
+                        <a:t>SENTENCE_TYPE (filter)</a:t>
                       </a:r>
                     </a:p>
                   </a:txBody>
@@ -4572,7 +4738,7 @@
                     <a:p>
                       <a:pPr algn="ctr" fontAlgn="ctr"/>
                       <a:r>
-                        <a:rPr lang="en-US" sz="1100" b="0" i="0" u="none" strike="noStrike">
+                        <a:rPr lang="en-US" sz="1100" b="0" i="0" u="none" strike="noStrike" dirty="0">
                           <a:solidFill>
                             <a:srgbClr val="000000"/>
                           </a:solidFill>
@@ -4605,15 +4771,22 @@
                     <a:p>
                       <a:pPr algn="ctr" fontAlgn="ctr"/>
                       <a:r>
-                        <a:rPr lang="en-US" sz="1100" b="0" i="0" u="none" strike="noStrike">
-                          <a:solidFill>
-                            <a:srgbClr val="000000"/>
-                          </a:solidFill>
-                          <a:effectLst/>
-                          <a:latin typeface="Calibri" panose="020F0502020204030204" pitchFamily="34" charset="0"/>
-                        </a:rPr>
-                        <a:t>Demographic</a:t>
-                      </a:r>
+                        <a:rPr lang="en-US" sz="1100" b="0" i="0" u="none" strike="noStrike" dirty="0" smtClean="0">
+                          <a:solidFill>
+                            <a:srgbClr val="000000"/>
+                          </a:solidFill>
+                          <a:effectLst/>
+                          <a:latin typeface="Calibri" panose="020F0502020204030204" pitchFamily="34" charset="0"/>
+                        </a:rPr>
+                        <a:t>/Demographics</a:t>
+                      </a:r>
+                      <a:endParaRPr lang="en-US" sz="1100" b="0" i="0" u="none" strike="noStrike" dirty="0">
+                        <a:solidFill>
+                          <a:srgbClr val="000000"/>
+                        </a:solidFill>
+                        <a:effectLst/>
+                        <a:latin typeface="Calibri" panose="020F0502020204030204" pitchFamily="34" charset="0"/>
+                      </a:endParaRPr>
                     </a:p>
                   </a:txBody>
                   <a:tcPr marL="9525" marR="9525" marT="9525" marB="0" anchor="ctr">
@@ -4639,7 +4812,7 @@
                 </a:tc>
                 <a:extLst>
                   <a:ext uri="{0D108BD9-81ED-4DB2-BD59-A6C34878D82A}">
-                    <a16:rowId xmlns:a16="http://schemas.microsoft.com/office/drawing/2014/main" val="1861627"/>
+                    <a16:rowId xmlns:a16="http://schemas.microsoft.com/office/drawing/2014/main" xmlns="" val="1861627"/>
                   </a:ext>
                 </a:extLst>
               </a:tr>
@@ -4651,7 +4824,7 @@
                     <a:p>
                       <a:pPr algn="ctr" fontAlgn="ctr"/>
                       <a:r>
-                        <a:rPr lang="en-US" sz="1100" b="0" i="0" u="none" strike="noStrike">
+                        <a:rPr lang="en-US" sz="1100" b="0" i="0" u="none" strike="noStrike" dirty="0">
                           <a:solidFill>
                             <a:srgbClr val="000000"/>
                           </a:solidFill>
@@ -4693,14 +4866,34 @@
                     <a:p>
                       <a:pPr algn="ctr" fontAlgn="ctr"/>
                       <a:r>
-                        <a:rPr lang="en-US" sz="1100" b="0" i="0" u="none" strike="noStrike">
-                          <a:solidFill>
-                            <a:srgbClr val="000000"/>
-                          </a:solidFill>
-                          <a:effectLst/>
-                          <a:latin typeface="Calibri" panose="020F0502020204030204" pitchFamily="34" charset="0"/>
-                        </a:rPr>
-                        <a:t>Court (filter)</a:t>
+                        <a:rPr lang="en-US" sz="1100" b="0" i="0" u="none" strike="noStrike" dirty="0" err="1" smtClean="0">
+                          <a:solidFill>
+                            <a:srgbClr val="000000"/>
+                          </a:solidFill>
+                          <a:effectLst/>
+                          <a:latin typeface="Calibri" panose="020F0502020204030204" pitchFamily="34" charset="0"/>
+                        </a:rPr>
+                        <a:t>Court_name</a:t>
+                      </a:r>
+                      <a:r>
+                        <a:rPr lang="en-US" sz="1100" b="0" i="0" u="none" strike="noStrike" dirty="0" smtClean="0">
+                          <a:solidFill>
+                            <a:srgbClr val="000000"/>
+                          </a:solidFill>
+                          <a:effectLst/>
+                          <a:latin typeface="Calibri" panose="020F0502020204030204" pitchFamily="34" charset="0"/>
+                        </a:rPr>
+                        <a:t> </a:t>
+                      </a:r>
+                      <a:r>
+                        <a:rPr lang="en-US" sz="1100" b="0" i="0" u="none" strike="noStrike" dirty="0">
+                          <a:solidFill>
+                            <a:srgbClr val="000000"/>
+                          </a:solidFill>
+                          <a:effectLst/>
+                          <a:latin typeface="Calibri" panose="020F0502020204030204" pitchFamily="34" charset="0"/>
+                        </a:rPr>
+                        <a:t>(filter)</a:t>
                       </a:r>
                     </a:p>
                   </a:txBody>
@@ -4729,14 +4922,34 @@
                     <a:p>
                       <a:pPr algn="ctr" fontAlgn="ctr"/>
                       <a:r>
-                        <a:rPr lang="en-US" sz="1100" b="0" i="0" u="none" strike="noStrike">
-                          <a:solidFill>
-                            <a:srgbClr val="000000"/>
-                          </a:solidFill>
-                          <a:effectLst/>
-                          <a:latin typeface="Calibri" panose="020F0502020204030204" pitchFamily="34" charset="0"/>
-                        </a:rPr>
-                        <a:t>Offense (filter)</a:t>
+                        <a:rPr lang="en-US" sz="1100" b="0" i="0" u="none" strike="noStrike" dirty="0" err="1" smtClean="0">
+                          <a:solidFill>
+                            <a:srgbClr val="000000"/>
+                          </a:solidFill>
+                          <a:effectLst/>
+                          <a:latin typeface="Calibri" panose="020F0502020204030204" pitchFamily="34" charset="0"/>
+                        </a:rPr>
+                        <a:t>Offense_category</a:t>
+                      </a:r>
+                      <a:r>
+                        <a:rPr lang="en-US" sz="1100" b="0" i="0" u="none" strike="noStrike" dirty="0" smtClean="0">
+                          <a:solidFill>
+                            <a:srgbClr val="000000"/>
+                          </a:solidFill>
+                          <a:effectLst/>
+                          <a:latin typeface="Calibri" panose="020F0502020204030204" pitchFamily="34" charset="0"/>
+                        </a:rPr>
+                        <a:t> </a:t>
+                      </a:r>
+                      <a:r>
+                        <a:rPr lang="en-US" sz="1100" b="0" i="0" u="none" strike="noStrike" dirty="0">
+                          <a:solidFill>
+                            <a:srgbClr val="000000"/>
+                          </a:solidFill>
+                          <a:effectLst/>
+                          <a:latin typeface="Calibri" panose="020F0502020204030204" pitchFamily="34" charset="0"/>
+                        </a:rPr>
+                        <a:t>(filter)</a:t>
                       </a:r>
                     </a:p>
                   </a:txBody>
@@ -4765,15 +4978,22 @@
                     <a:p>
                       <a:pPr algn="ctr" fontAlgn="ctr"/>
                       <a:r>
-                        <a:rPr lang="en-US" sz="1100" b="0" i="0" u="none" strike="noStrike">
-                          <a:solidFill>
-                            <a:srgbClr val="000000"/>
-                          </a:solidFill>
-                          <a:effectLst/>
-                          <a:latin typeface="Calibri" panose="020F0502020204030204" pitchFamily="34" charset="0"/>
-                        </a:rPr>
-                        <a:t>Sentence (filter)</a:t>
-                      </a:r>
+                        <a:rPr lang="en-US" sz="1100" b="0" i="0" u="none" strike="noStrike" dirty="0" smtClean="0">
+                          <a:solidFill>
+                            <a:srgbClr val="000000"/>
+                          </a:solidFill>
+                          <a:effectLst/>
+                          <a:latin typeface="Calibri" panose="020F0502020204030204" pitchFamily="34" charset="0"/>
+                        </a:rPr>
+                        <a:t>SENTENCE_TYPE (filter)</a:t>
+                      </a:r>
+                      <a:endParaRPr lang="en-US" sz="1100" b="0" i="0" u="none" strike="noStrike" dirty="0">
+                        <a:solidFill>
+                          <a:srgbClr val="000000"/>
+                        </a:solidFill>
+                        <a:effectLst/>
+                        <a:latin typeface="Calibri" panose="020F0502020204030204" pitchFamily="34" charset="0"/>
+                      </a:endParaRPr>
                     </a:p>
                   </a:txBody>
                   <a:tcPr marL="9525" marR="9525" marT="9525" marB="0" anchor="ctr">
@@ -4873,7 +5093,7 @@
                     <a:p>
                       <a:pPr algn="ctr" fontAlgn="ctr"/>
                       <a:r>
-                        <a:rPr lang="en-US" sz="1100" b="0" i="0" u="none" strike="noStrike">
+                        <a:rPr lang="en-US" sz="1100" b="0" i="0" u="none" strike="noStrike" dirty="0">
                           <a:solidFill>
                             <a:srgbClr val="000000"/>
                           </a:solidFill>
@@ -4909,15 +5129,22 @@
                     <a:p>
                       <a:pPr algn="ctr" fontAlgn="ctr"/>
                       <a:r>
-                        <a:rPr lang="en-US" sz="1100" b="0" i="0" u="none" strike="noStrike">
-                          <a:solidFill>
-                            <a:srgbClr val="000000"/>
-                          </a:solidFill>
-                          <a:effectLst/>
-                          <a:latin typeface="Calibri" panose="020F0502020204030204" pitchFamily="34" charset="0"/>
-                        </a:rPr>
-                        <a:t>Demographic</a:t>
-                      </a:r>
+                        <a:rPr lang="en-US" sz="1100" b="0" i="0" u="none" strike="noStrike" dirty="0" smtClean="0">
+                          <a:solidFill>
+                            <a:srgbClr val="000000"/>
+                          </a:solidFill>
+                          <a:effectLst/>
+                          <a:latin typeface="Calibri" panose="020F0502020204030204" pitchFamily="34" charset="0"/>
+                        </a:rPr>
+                        <a:t>/Demographics</a:t>
+                      </a:r>
+                      <a:endParaRPr lang="en-US" sz="1100" b="0" i="0" u="none" strike="noStrike" dirty="0">
+                        <a:solidFill>
+                          <a:srgbClr val="000000"/>
+                        </a:solidFill>
+                        <a:effectLst/>
+                        <a:latin typeface="Calibri" panose="020F0502020204030204" pitchFamily="34" charset="0"/>
+                      </a:endParaRPr>
                     </a:p>
                   </a:txBody>
                   <a:tcPr marL="9525" marR="9525" marT="9525" marB="0" anchor="ctr">
@@ -4946,11 +5173,11 @@
                 </a:tc>
                 <a:extLst>
                   <a:ext uri="{0D108BD9-81ED-4DB2-BD59-A6C34878D82A}">
-                    <a16:rowId xmlns:a16="http://schemas.microsoft.com/office/drawing/2014/main" val="952423537"/>
+                    <a16:rowId xmlns:a16="http://schemas.microsoft.com/office/drawing/2014/main" xmlns="" val="952423537"/>
                   </a:ext>
                 </a:extLst>
               </a:tr>
-              <a:tr h="190500">
+              <a:tr h="718932">
                 <a:tc>
                   <a:txBody>
                     <a:bodyPr/>
@@ -4958,15 +5185,42 @@
                     <a:p>
                       <a:pPr algn="ctr" fontAlgn="ctr"/>
                       <a:r>
-                        <a:rPr lang="en-US" sz="1100" b="0" i="0" u="none" strike="noStrike">
-                          <a:solidFill>
-                            <a:srgbClr val="000000"/>
-                          </a:solidFill>
-                          <a:effectLst/>
-                          <a:latin typeface="Calibri" panose="020F0502020204030204" pitchFamily="34" charset="0"/>
-                        </a:rPr>
-                        <a:t>Commitment term/unit</a:t>
-                      </a:r>
+                        <a:rPr lang="en-US" sz="1100" b="0" i="0" u="none" strike="noStrike" dirty="0" smtClean="0">
+                          <a:solidFill>
+                            <a:srgbClr val="000000"/>
+                          </a:solidFill>
+                          <a:effectLst/>
+                          <a:latin typeface="Calibri" panose="020F0502020204030204" pitchFamily="34" charset="0"/>
+                        </a:rPr>
+                        <a:t>Commitment term/unit(corresponding</a:t>
+                      </a:r>
+                      <a:r>
+                        <a:rPr lang="en-US" sz="1100" b="0" i="0" u="none" strike="noStrike" baseline="0" dirty="0" smtClean="0">
+                          <a:solidFill>
+                            <a:srgbClr val="000000"/>
+                          </a:solidFill>
+                          <a:effectLst/>
+                          <a:latin typeface="Calibri" panose="020F0502020204030204" pitchFamily="34" charset="0"/>
+                        </a:rPr>
+                        <a:t> terms</a:t>
+                      </a:r>
+                      <a:r>
+                        <a:rPr lang="en-US" sz="1100" b="0" i="0" u="none" strike="noStrike" dirty="0" smtClean="0">
+                          <a:solidFill>
+                            <a:srgbClr val="000000"/>
+                          </a:solidFill>
+                          <a:effectLst/>
+                          <a:latin typeface="Calibri" panose="020F0502020204030204" pitchFamily="34" charset="0"/>
+                        </a:rPr>
+                        <a:t>)</a:t>
+                      </a:r>
+                      <a:endParaRPr lang="en-US" sz="1100" b="0" i="0" u="none" strike="noStrike" dirty="0">
+                        <a:solidFill>
+                          <a:srgbClr val="000000"/>
+                        </a:solidFill>
+                        <a:effectLst/>
+                        <a:latin typeface="Calibri" panose="020F0502020204030204" pitchFamily="34" charset="0"/>
+                      </a:endParaRPr>
                     </a:p>
                   </a:txBody>
                   <a:tcPr marL="9525" marR="9525" marT="9525" marB="0" anchor="ctr">
@@ -4997,105 +5251,16 @@
                     <a:p>
                       <a:pPr algn="ctr" fontAlgn="ctr"/>
                       <a:r>
-                        <a:rPr lang="en-US" sz="1100" b="0" i="0" u="none" strike="noStrike">
-                          <a:solidFill>
-                            <a:srgbClr val="000000"/>
-                          </a:solidFill>
-                          <a:effectLst/>
-                          <a:latin typeface="Calibri" panose="020F0502020204030204" pitchFamily="34" charset="0"/>
-                        </a:rPr>
-                        <a:t>OFFENSE_CATEGORY</a:t>
-                      </a:r>
-                    </a:p>
-                  </a:txBody>
-                  <a:tcPr marL="9525" marR="9525" marT="9525" marB="0" anchor="ctr">
-                    <a:lnL>
-                      <a:noFill/>
-                    </a:lnL>
-                    <a:lnR>
-                      <a:noFill/>
-                    </a:lnR>
-                    <a:lnT>
-                      <a:noFill/>
-                    </a:lnT>
-                    <a:lnB>
-                      <a:noFill/>
-                    </a:lnB>
-                  </a:tcPr>
-                </a:tc>
-                <a:tc>
-                  <a:txBody>
-                    <a:bodyPr/>
-                    <a:lstStyle/>
-                    <a:p>
-                      <a:pPr algn="ctr" fontAlgn="ctr"/>
-                      <a:r>
-                        <a:rPr lang="en-US" sz="1100" b="0" i="0" u="none" strike="noStrike">
-                          <a:solidFill>
-                            <a:srgbClr val="000000"/>
-                          </a:solidFill>
-                          <a:effectLst/>
-                          <a:latin typeface="Calibri" panose="020F0502020204030204" pitchFamily="34" charset="0"/>
-                        </a:rPr>
-                        <a:t>commitment type (filter)</a:t>
-                      </a:r>
-                    </a:p>
-                  </a:txBody>
-                  <a:tcPr marL="9525" marR="9525" marT="9525" marB="0" anchor="ctr">
-                    <a:lnL>
-                      <a:noFill/>
-                    </a:lnL>
-                    <a:lnR>
-                      <a:noFill/>
-                    </a:lnR>
-                    <a:lnT>
-                      <a:noFill/>
-                    </a:lnT>
-                    <a:lnB>
-                      <a:noFill/>
-                    </a:lnB>
-                  </a:tcPr>
-                </a:tc>
-                <a:tc>
-                  <a:txBody>
-                    <a:bodyPr/>
-                    <a:lstStyle/>
-                    <a:p>
-                      <a:pPr algn="ctr" fontAlgn="ctr"/>
-                      <a:r>
-                        <a:rPr lang="en-US" sz="1100" b="0" i="0" u="none" strike="noStrike">
-                          <a:solidFill>
-                            <a:srgbClr val="000000"/>
-                          </a:solidFill>
-                          <a:effectLst/>
-                          <a:latin typeface="Calibri" panose="020F0502020204030204" pitchFamily="34" charset="0"/>
-                        </a:rPr>
-                        <a:t>Court (filter)????</a:t>
-                      </a:r>
-                    </a:p>
-                  </a:txBody>
-                  <a:tcPr marL="9525" marR="9525" marT="9525" marB="0" anchor="ctr">
-                    <a:lnL>
-                      <a:noFill/>
-                    </a:lnL>
-                    <a:lnR>
-                      <a:noFill/>
-                    </a:lnR>
-                    <a:lnT>
-                      <a:noFill/>
-                    </a:lnT>
-                    <a:lnB>
-                      <a:noFill/>
-                    </a:lnB>
-                  </a:tcPr>
-                </a:tc>
-                <a:tc>
-                  <a:txBody>
-                    <a:bodyPr/>
-                    <a:lstStyle/>
-                    <a:p>
-                      <a:pPr algn="ctr" fontAlgn="ctr"/>
-                      <a:endParaRPr lang="en-US" sz="1100" b="0" i="0" u="none" strike="noStrike">
+                        <a:rPr lang="en-US" sz="1100" b="0" i="0" u="none" strike="noStrike" dirty="0" smtClean="0">
+                          <a:solidFill>
+                            <a:srgbClr val="000000"/>
+                          </a:solidFill>
+                          <a:effectLst/>
+                          <a:latin typeface="Calibri" panose="020F0502020204030204" pitchFamily="34" charset="0"/>
+                        </a:rPr>
+                        <a:t>OFFENSE_CATEGORY(count)</a:t>
+                      </a:r>
+                      <a:endParaRPr lang="en-US" sz="1100" b="0" i="0" u="none" strike="noStrike" dirty="0">
                         <a:solidFill>
                           <a:srgbClr val="000000"/>
                         </a:solidFill>
@@ -5126,14 +5291,24 @@
                     <a:p>
                       <a:pPr algn="ctr" fontAlgn="ctr"/>
                       <a:r>
-                        <a:rPr lang="en-US" sz="1100" b="0" i="0" u="none" strike="noStrike">
-                          <a:solidFill>
-                            <a:srgbClr val="000000"/>
-                          </a:solidFill>
-                          <a:effectLst/>
-                          <a:latin typeface="Calibri" panose="020F0502020204030204" pitchFamily="34" charset="0"/>
-                        </a:rPr>
-                        <a:t>Bar chart</a:t>
+                        <a:rPr lang="en-US" sz="1100" b="0" i="0" u="none" strike="noStrike" dirty="0" smtClean="0">
+                          <a:solidFill>
+                            <a:srgbClr val="000000"/>
+                          </a:solidFill>
+                          <a:effectLst/>
+                          <a:latin typeface="Calibri" panose="020F0502020204030204" pitchFamily="34" charset="0"/>
+                        </a:rPr>
+                        <a:t>sentence </a:t>
+                      </a:r>
+                      <a:r>
+                        <a:rPr lang="en-US" sz="1100" b="0" i="0" u="none" strike="noStrike" dirty="0">
+                          <a:solidFill>
+                            <a:srgbClr val="000000"/>
+                          </a:solidFill>
+                          <a:effectLst/>
+                          <a:latin typeface="Calibri" panose="020F0502020204030204" pitchFamily="34" charset="0"/>
+                        </a:rPr>
+                        <a:t>type (filter)</a:t>
                       </a:r>
                     </a:p>
                   </a:txBody>
@@ -5159,15 +5334,52 @@
                     <a:p>
                       <a:pPr algn="ctr" fontAlgn="ctr"/>
                       <a:r>
-                        <a:rPr lang="en-US" sz="1100" b="0" i="0" u="none" strike="noStrike">
-                          <a:solidFill>
-                            <a:srgbClr val="000000"/>
-                          </a:solidFill>
-                          <a:effectLst/>
-                          <a:latin typeface="Calibri" panose="020F0502020204030204" pitchFamily="34" charset="0"/>
-                        </a:rPr>
-                        <a:t>Yes</a:t>
-                      </a:r>
+                        <a:rPr lang="en-US" sz="1100" b="0" i="0" u="none" strike="noStrike" dirty="0" err="1" smtClean="0">
+                          <a:solidFill>
+                            <a:srgbClr val="000000"/>
+                          </a:solidFill>
+                          <a:effectLst/>
+                          <a:latin typeface="Calibri" panose="020F0502020204030204" pitchFamily="34" charset="0"/>
+                        </a:rPr>
+                        <a:t>Court_name</a:t>
+                      </a:r>
+                      <a:r>
+                        <a:rPr lang="en-US" sz="1100" b="0" i="0" u="none" strike="noStrike" dirty="0" smtClean="0">
+                          <a:solidFill>
+                            <a:srgbClr val="000000"/>
+                          </a:solidFill>
+                          <a:effectLst/>
+                          <a:latin typeface="Calibri" panose="020F0502020204030204" pitchFamily="34" charset="0"/>
+                        </a:rPr>
+                        <a:t> </a:t>
+                      </a:r>
+                      <a:r>
+                        <a:rPr lang="en-US" sz="1100" b="0" i="0" u="none" strike="noStrike" dirty="0">
+                          <a:solidFill>
+                            <a:srgbClr val="000000"/>
+                          </a:solidFill>
+                          <a:effectLst/>
+                          <a:latin typeface="Calibri" panose="020F0502020204030204" pitchFamily="34" charset="0"/>
+                        </a:rPr>
+                        <a:t>(filter</a:t>
+                      </a:r>
+                      <a:r>
+                        <a:rPr lang="en-US" sz="1100" b="0" i="0" u="none" strike="noStrike" dirty="0" smtClean="0">
+                          <a:solidFill>
+                            <a:srgbClr val="000000"/>
+                          </a:solidFill>
+                          <a:effectLst/>
+                          <a:latin typeface="Calibri" panose="020F0502020204030204" pitchFamily="34" charset="0"/>
+                        </a:rPr>
+                        <a:t>)</a:t>
+                      </a:r>
+                      <a:endParaRPr lang="en-US" sz="1100" b="0" i="0" u="none" strike="noStrike" dirty="0">
+                        <a:solidFill>
+                          <a:srgbClr val="000000"/>
+                        </a:solidFill>
+                        <a:effectLst/>
+                        <a:latin typeface="Calibri" panose="020F0502020204030204" pitchFamily="34" charset="0"/>
+                      </a:endParaRPr>
                     </a:p>
                   </a:txBody>
                   <a:tcPr marL="9525" marR="9525" marT="9525" marB="0" anchor="ctr">
@@ -5191,16 +5403,142 @@
                     <a:lstStyle/>
                     <a:p>
                       <a:pPr algn="ctr" fontAlgn="ctr"/>
-                      <a:r>
-                        <a:rPr lang="en-US" sz="1100" b="0" i="0" u="none" strike="noStrike">
-                          <a:solidFill>
-                            <a:srgbClr val="000000"/>
-                          </a:solidFill>
-                          <a:effectLst/>
-                          <a:latin typeface="Calibri" panose="020F0502020204030204" pitchFamily="34" charset="0"/>
-                        </a:rPr>
-                        <a:t>Offense Category</a:t>
-                      </a:r>
+                      <a:endParaRPr lang="en-US" sz="1100" b="0" i="0" u="none" strike="noStrike" dirty="0">
+                        <a:solidFill>
+                          <a:srgbClr val="000000"/>
+                        </a:solidFill>
+                        <a:effectLst/>
+                        <a:latin typeface="Calibri" panose="020F0502020204030204" pitchFamily="34" charset="0"/>
+                      </a:endParaRPr>
+                    </a:p>
+                  </a:txBody>
+                  <a:tcPr marL="9525" marR="9525" marT="9525" marB="0" anchor="ctr">
+                    <a:lnL>
+                      <a:noFill/>
+                    </a:lnL>
+                    <a:lnR>
+                      <a:noFill/>
+                    </a:lnR>
+                    <a:lnT>
+                      <a:noFill/>
+                    </a:lnT>
+                    <a:lnB>
+                      <a:noFill/>
+                    </a:lnB>
+                  </a:tcPr>
+                </a:tc>
+                <a:tc>
+                  <a:txBody>
+                    <a:bodyPr/>
+                    <a:lstStyle/>
+                    <a:p>
+                      <a:pPr algn="ctr" fontAlgn="ctr"/>
+                      <a:r>
+                        <a:rPr lang="en-US" sz="1100" b="0" i="0" u="none" strike="noStrike" dirty="0" smtClean="0">
+                          <a:solidFill>
+                            <a:srgbClr val="000000"/>
+                          </a:solidFill>
+                          <a:effectLst/>
+                          <a:latin typeface="Calibri" panose="020F0502020204030204" pitchFamily="34" charset="0"/>
+                        </a:rPr>
+                        <a:t>boxplot </a:t>
+                      </a:r>
+                      <a:r>
+                        <a:rPr lang="en-US" sz="1100" b="0" i="0" u="none" strike="noStrike" dirty="0">
+                          <a:solidFill>
+                            <a:srgbClr val="000000"/>
+                          </a:solidFill>
+                          <a:effectLst/>
+                          <a:latin typeface="Calibri" panose="020F0502020204030204" pitchFamily="34" charset="0"/>
+                        </a:rPr>
+                        <a:t>chart</a:t>
+                      </a:r>
+                    </a:p>
+                  </a:txBody>
+                  <a:tcPr marL="9525" marR="9525" marT="9525" marB="0" anchor="ctr">
+                    <a:lnL>
+                      <a:noFill/>
+                    </a:lnL>
+                    <a:lnR>
+                      <a:noFill/>
+                    </a:lnR>
+                    <a:lnT>
+                      <a:noFill/>
+                    </a:lnT>
+                    <a:lnB>
+                      <a:noFill/>
+                    </a:lnB>
+                  </a:tcPr>
+                </a:tc>
+                <a:tc>
+                  <a:txBody>
+                    <a:bodyPr/>
+                    <a:lstStyle/>
+                    <a:p>
+                      <a:pPr algn="ctr" fontAlgn="ctr"/>
+                      <a:r>
+                        <a:rPr lang="en-US" sz="1100" b="0" i="0" u="none" strike="noStrike" dirty="0">
+                          <a:solidFill>
+                            <a:srgbClr val="000000"/>
+                          </a:solidFill>
+                          <a:effectLst/>
+                          <a:latin typeface="Calibri" panose="020F0502020204030204" pitchFamily="34" charset="0"/>
+                        </a:rPr>
+                        <a:t>Yes</a:t>
+                      </a:r>
+                    </a:p>
+                  </a:txBody>
+                  <a:tcPr marL="9525" marR="9525" marT="9525" marB="0" anchor="ctr">
+                    <a:lnL>
+                      <a:noFill/>
+                    </a:lnL>
+                    <a:lnR>
+                      <a:noFill/>
+                    </a:lnR>
+                    <a:lnT>
+                      <a:noFill/>
+                    </a:lnT>
+                    <a:lnB>
+                      <a:noFill/>
+                    </a:lnB>
+                  </a:tcPr>
+                </a:tc>
+                <a:tc>
+                  <a:txBody>
+                    <a:bodyPr/>
+                    <a:lstStyle/>
+                    <a:p>
+                      <a:pPr algn="ctr" fontAlgn="ctr"/>
+                      <a:r>
+                        <a:rPr lang="en-US" sz="1100" b="0" i="0" u="none" strike="noStrike" dirty="0" smtClean="0">
+                          <a:solidFill>
+                            <a:srgbClr val="000000"/>
+                          </a:solidFill>
+                          <a:effectLst/>
+                          <a:latin typeface="Calibri" panose="020F0502020204030204" pitchFamily="34" charset="0"/>
+                        </a:rPr>
+                        <a:t>/index</a:t>
+                      </a:r>
+                    </a:p>
+                    <a:p>
+                      <a:pPr algn="ctr" fontAlgn="ctr"/>
+                      <a:r>
+                        <a:rPr lang="en-US" sz="1100" b="0" i="0" u="none" strike="noStrike" dirty="0" smtClean="0">
+                          <a:solidFill>
+                            <a:srgbClr val="000000"/>
+                          </a:solidFill>
+                          <a:effectLst/>
+                          <a:latin typeface="Calibri" panose="020F0502020204030204" pitchFamily="34" charset="0"/>
+                        </a:rPr>
+                        <a:t>/Offense category(in depth analysis)</a:t>
+                      </a:r>
+                      <a:endParaRPr lang="en-US" sz="1100" b="0" i="0" u="none" strike="noStrike" dirty="0">
+                        <a:solidFill>
+                          <a:srgbClr val="000000"/>
+                        </a:solidFill>
+                        <a:effectLst/>
+                        <a:latin typeface="Calibri" panose="020F0502020204030204" pitchFamily="34" charset="0"/>
+                      </a:endParaRPr>
                     </a:p>
                   </a:txBody>
                   <a:tcPr marL="9525" marR="9525" marT="9525" marB="0" anchor="ctr">
@@ -5226,7 +5564,7 @@
                 </a:tc>
                 <a:extLst>
                   <a:ext uri="{0D108BD9-81ED-4DB2-BD59-A6C34878D82A}">
-                    <a16:rowId xmlns:a16="http://schemas.microsoft.com/office/drawing/2014/main" val="801547016"/>
+                    <a16:rowId xmlns:a16="http://schemas.microsoft.com/office/drawing/2014/main" xmlns="" val="801547016"/>
                   </a:ext>
                 </a:extLst>
               </a:tr>
@@ -5238,7 +5576,7 @@
                     <a:p>
                       <a:pPr algn="ctr" fontAlgn="ctr"/>
                       <a:r>
-                        <a:rPr lang="en-US" sz="1100" b="0" i="0" u="none" strike="noStrike">
+                        <a:rPr lang="en-US" sz="1100" b="0" i="0" u="none" strike="noStrike" dirty="0" err="1">
                           <a:solidFill>
                             <a:srgbClr val="000000"/>
                           </a:solidFill>
@@ -5247,6 +5585,13 @@
                         </a:rPr>
                         <a:t>LENGTH_OF_CASE_in_Days</a:t>
                       </a:r>
+                      <a:endParaRPr lang="en-US" sz="1100" b="0" i="0" u="none" strike="noStrike" dirty="0">
+                        <a:solidFill>
+                          <a:srgbClr val="000000"/>
+                        </a:solidFill>
+                        <a:effectLst/>
+                        <a:latin typeface="Calibri" panose="020F0502020204030204" pitchFamily="34" charset="0"/>
+                      </a:endParaRPr>
                     </a:p>
                   </a:txBody>
                   <a:tcPr marL="9525" marR="9525" marT="9525" marB="0" anchor="ctr">
@@ -5280,7 +5625,7 @@
                     <a:p>
                       <a:pPr algn="ctr" fontAlgn="ctr"/>
                       <a:r>
-                        <a:rPr lang="en-US" sz="1100" b="0" i="0" u="none" strike="noStrike">
+                        <a:rPr lang="en-US" sz="1100" b="0" i="0" u="none" strike="noStrike" dirty="0">
                           <a:solidFill>
                             <a:srgbClr val="000000"/>
                           </a:solidFill>
@@ -5316,14 +5661,34 @@
                     <a:p>
                       <a:pPr algn="ctr" fontAlgn="ctr"/>
                       <a:r>
-                        <a:rPr lang="en-US" sz="1100" b="0" i="0" u="none" strike="noStrike">
-                          <a:solidFill>
-                            <a:srgbClr val="000000"/>
-                          </a:solidFill>
-                          <a:effectLst/>
-                          <a:latin typeface="Calibri" panose="020F0502020204030204" pitchFamily="34" charset="0"/>
-                        </a:rPr>
-                        <a:t>Offense (filter)</a:t>
+                        <a:rPr lang="en-US" sz="1100" b="0" i="0" u="none" strike="noStrike" dirty="0" err="1" smtClean="0">
+                          <a:solidFill>
+                            <a:srgbClr val="000000"/>
+                          </a:solidFill>
+                          <a:effectLst/>
+                          <a:latin typeface="Calibri" panose="020F0502020204030204" pitchFamily="34" charset="0"/>
+                        </a:rPr>
+                        <a:t>Offense_category</a:t>
+                      </a:r>
+                      <a:r>
+                        <a:rPr lang="en-US" sz="1100" b="0" i="0" u="none" strike="noStrike" dirty="0" smtClean="0">
+                          <a:solidFill>
+                            <a:srgbClr val="000000"/>
+                          </a:solidFill>
+                          <a:effectLst/>
+                          <a:latin typeface="Calibri" panose="020F0502020204030204" pitchFamily="34" charset="0"/>
+                        </a:rPr>
+                        <a:t> (filter</a:t>
+                      </a:r>
+                      <a:r>
+                        <a:rPr lang="en-US" sz="1100" b="0" i="0" u="none" strike="noStrike" dirty="0">
+                          <a:solidFill>
+                            <a:srgbClr val="000000"/>
+                          </a:solidFill>
+                          <a:effectLst/>
+                          <a:latin typeface="Calibri" panose="020F0502020204030204" pitchFamily="34" charset="0"/>
+                        </a:rPr>
+                        <a:t>)</a:t>
                       </a:r>
                     </a:p>
                   </a:txBody>
@@ -5352,14 +5717,24 @@
                     <a:p>
                       <a:pPr algn="ctr" fontAlgn="ctr"/>
                       <a:r>
-                        <a:rPr lang="en-US" sz="1100" b="0" i="0" u="none" strike="noStrike">
-                          <a:solidFill>
-                            <a:srgbClr val="000000"/>
-                          </a:solidFill>
-                          <a:effectLst/>
-                          <a:latin typeface="Calibri" panose="020F0502020204030204" pitchFamily="34" charset="0"/>
-                        </a:rPr>
-                        <a:t>COMMITMENT_TYPE (filter)</a:t>
+                        <a:rPr lang="en-US" sz="1100" b="0" i="0" u="none" strike="noStrike" dirty="0" smtClean="0">
+                          <a:solidFill>
+                            <a:srgbClr val="000000"/>
+                          </a:solidFill>
+                          <a:effectLst/>
+                          <a:latin typeface="Calibri" panose="020F0502020204030204" pitchFamily="34" charset="0"/>
+                        </a:rPr>
+                        <a:t>SENTENCE_TYPE </a:t>
+                      </a:r>
+                      <a:r>
+                        <a:rPr lang="en-US" sz="1100" b="0" i="0" u="none" strike="noStrike" dirty="0">
+                          <a:solidFill>
+                            <a:srgbClr val="000000"/>
+                          </a:solidFill>
+                          <a:effectLst/>
+                          <a:latin typeface="Calibri" panose="020F0502020204030204" pitchFamily="34" charset="0"/>
+                        </a:rPr>
+                        <a:t>(filter)</a:t>
                       </a:r>
                     </a:p>
                   </a:txBody>
@@ -5388,7 +5763,7 @@
                     <a:p>
                       <a:pPr algn="ctr" fontAlgn="ctr"/>
                       <a:r>
-                        <a:rPr lang="en-US" sz="1100" b="0" i="0" u="none" strike="noStrike">
+                        <a:rPr lang="en-US" sz="1100" b="0" i="0" u="none" strike="noStrike" dirty="0">
                           <a:solidFill>
                             <a:srgbClr val="000000"/>
                           </a:solidFill>
@@ -5424,14 +5799,24 @@
                     <a:p>
                       <a:pPr algn="ctr" fontAlgn="ctr"/>
                       <a:r>
-                        <a:rPr lang="en-US" sz="1100" b="0" i="0" u="none" strike="noStrike">
-                          <a:solidFill>
-                            <a:srgbClr val="000000"/>
-                          </a:solidFill>
-                          <a:effectLst/>
-                          <a:latin typeface="Calibri" panose="020F0502020204030204" pitchFamily="34" charset="0"/>
-                        </a:rPr>
-                        <a:t>Line/scatter graph</a:t>
+                        <a:rPr lang="en-US" sz="1100" b="0" i="0" u="none" strike="noStrike" dirty="0" smtClean="0">
+                          <a:solidFill>
+                            <a:srgbClr val="000000"/>
+                          </a:solidFill>
+                          <a:effectLst/>
+                          <a:latin typeface="Calibri" panose="020F0502020204030204" pitchFamily="34" charset="0"/>
+                        </a:rPr>
+                        <a:t>scatter </a:t>
+                      </a:r>
+                      <a:r>
+                        <a:rPr lang="en-US" sz="1100" b="0" i="0" u="none" strike="noStrike" dirty="0">
+                          <a:solidFill>
+                            <a:srgbClr val="000000"/>
+                          </a:solidFill>
+                          <a:effectLst/>
+                          <a:latin typeface="Calibri" panose="020F0502020204030204" pitchFamily="34" charset="0"/>
+                        </a:rPr>
+                        <a:t>graph</a:t>
                       </a:r>
                     </a:p>
                   </a:txBody>
@@ -5460,7 +5845,7 @@
                     <a:p>
                       <a:pPr algn="ctr" fontAlgn="ctr"/>
                       <a:r>
-                        <a:rPr lang="en-US" sz="1100" b="0" i="0" u="none" strike="noStrike">
+                        <a:rPr lang="en-US" sz="1100" b="0" i="0" u="none" strike="noStrike" dirty="0">
                           <a:solidFill>
                             <a:srgbClr val="000000"/>
                           </a:solidFill>
@@ -5496,15 +5881,65 @@
                     <a:p>
                       <a:pPr algn="ctr" fontAlgn="ctr"/>
                       <a:r>
-                        <a:rPr lang="en-US" sz="1100" b="0" i="0" u="none" strike="noStrike">
-                          <a:solidFill>
-                            <a:srgbClr val="000000"/>
-                          </a:solidFill>
-                          <a:effectLst/>
-                          <a:latin typeface="Calibri" panose="020F0502020204030204" pitchFamily="34" charset="0"/>
-                        </a:rPr>
-                        <a:t>Length of case</a:t>
-                      </a:r>
+                        <a:rPr lang="en-US" sz="1100" b="0" i="0" u="none" strike="noStrike" dirty="0" smtClean="0">
+                          <a:solidFill>
+                            <a:srgbClr val="000000"/>
+                          </a:solidFill>
+                          <a:effectLst/>
+                          <a:latin typeface="Calibri" panose="020F0502020204030204" pitchFamily="34" charset="0"/>
+                        </a:rPr>
+                        <a:t>/index</a:t>
+                      </a:r>
+                    </a:p>
+                    <a:p>
+                      <a:pPr algn="ctr" fontAlgn="ctr"/>
+                      <a:r>
+                        <a:rPr lang="en-US" sz="1100" b="0" i="0" u="none" strike="noStrike" dirty="0" smtClean="0">
+                          <a:solidFill>
+                            <a:srgbClr val="000000"/>
+                          </a:solidFill>
+                          <a:effectLst/>
+                          <a:latin typeface="Calibri" panose="020F0502020204030204" pitchFamily="34" charset="0"/>
+                        </a:rPr>
+                        <a:t>/Length </a:t>
+                      </a:r>
+                      <a:r>
+                        <a:rPr lang="en-US" sz="1100" b="0" i="0" u="none" strike="noStrike" dirty="0">
+                          <a:solidFill>
+                            <a:srgbClr val="000000"/>
+                          </a:solidFill>
+                          <a:effectLst/>
+                          <a:latin typeface="Calibri" panose="020F0502020204030204" pitchFamily="34" charset="0"/>
+                        </a:rPr>
+                        <a:t>of </a:t>
+                      </a:r>
+                      <a:r>
+                        <a:rPr lang="en-US" sz="1100" b="0" i="0" u="none" strike="noStrike" dirty="0" smtClean="0">
+                          <a:solidFill>
+                            <a:srgbClr val="000000"/>
+                          </a:solidFill>
+                          <a:effectLst/>
+                          <a:latin typeface="Calibri" panose="020F0502020204030204" pitchFamily="34" charset="0"/>
+                        </a:rPr>
+                        <a:t>case(in</a:t>
+                      </a:r>
+                      <a:r>
+                        <a:rPr lang="en-US" sz="1100" b="0" i="0" u="none" strike="noStrike" baseline="0" dirty="0" smtClean="0">
+                          <a:solidFill>
+                            <a:srgbClr val="000000"/>
+                          </a:solidFill>
+                          <a:effectLst/>
+                          <a:latin typeface="Calibri" panose="020F0502020204030204" pitchFamily="34" charset="0"/>
+                        </a:rPr>
+                        <a:t> depth)</a:t>
+                      </a:r>
+                      <a:endParaRPr lang="en-US" sz="1100" b="0" i="0" u="none" strike="noStrike" dirty="0">
+                        <a:solidFill>
+                          <a:srgbClr val="000000"/>
+                        </a:solidFill>
+                        <a:effectLst/>
+                        <a:latin typeface="Calibri" panose="020F0502020204030204" pitchFamily="34" charset="0"/>
+                      </a:endParaRPr>
                     </a:p>
                   </a:txBody>
                   <a:tcPr marL="9525" marR="9525" marT="9525" marB="0" anchor="ctr">
@@ -5533,7 +5968,7 @@
                 </a:tc>
                 <a:extLst>
                   <a:ext uri="{0D108BD9-81ED-4DB2-BD59-A6C34878D82A}">
-                    <a16:rowId xmlns:a16="http://schemas.microsoft.com/office/drawing/2014/main" val="3023096550"/>
+                    <a16:rowId xmlns:a16="http://schemas.microsoft.com/office/drawing/2014/main" xmlns="" val="3023096550"/>
                   </a:ext>
                 </a:extLst>
               </a:tr>
@@ -5545,7 +5980,7 @@
                     <a:p>
                       <a:pPr algn="ctr" fontAlgn="ctr"/>
                       <a:r>
-                        <a:rPr lang="en-US" sz="1100" b="0" i="0" u="none" strike="noStrike">
+                        <a:rPr lang="en-US" sz="1100" b="0" i="0" u="none" strike="noStrike" dirty="0" err="1">
                           <a:solidFill>
                             <a:srgbClr val="000000"/>
                           </a:solidFill>
@@ -5554,6 +5989,13 @@
                         </a:rPr>
                         <a:t>LENGTH_OF_CASE_in_Days</a:t>
                       </a:r>
+                      <a:endParaRPr lang="en-US" sz="1100" b="0" i="0" u="none" strike="noStrike" dirty="0">
+                        <a:solidFill>
+                          <a:srgbClr val="000000"/>
+                        </a:solidFill>
+                        <a:effectLst/>
+                        <a:latin typeface="Calibri" panose="020F0502020204030204" pitchFamily="34" charset="0"/>
+                      </a:endParaRPr>
                     </a:p>
                   </a:txBody>
                   <a:tcPr marL="9525" marR="9525" marT="9525" marB="0" anchor="ctr">
@@ -5584,105 +6026,26 @@
                     <a:p>
                       <a:pPr algn="ctr" fontAlgn="ctr"/>
                       <a:r>
-                        <a:rPr lang="en-US" sz="1100" b="0" i="0" u="none" strike="noStrike">
-                          <a:solidFill>
-                            <a:srgbClr val="000000"/>
-                          </a:solidFill>
-                          <a:effectLst/>
-                          <a:latin typeface="Calibri" panose="020F0502020204030204" pitchFamily="34" charset="0"/>
-                        </a:rPr>
-                        <a:t>Commitment term/unit</a:t>
-                      </a:r>
-                    </a:p>
-                  </a:txBody>
-                  <a:tcPr marL="9525" marR="9525" marT="9525" marB="0" anchor="ctr">
-                    <a:lnL>
-                      <a:noFill/>
-                    </a:lnL>
-                    <a:lnR>
-                      <a:noFill/>
-                    </a:lnR>
-                    <a:lnT>
-                      <a:noFill/>
-                    </a:lnT>
-                    <a:lnB>
-                      <a:noFill/>
-                    </a:lnB>
-                  </a:tcPr>
-                </a:tc>
-                <a:tc>
-                  <a:txBody>
-                    <a:bodyPr/>
-                    <a:lstStyle/>
-                    <a:p>
-                      <a:pPr algn="ctr" fontAlgn="ctr"/>
-                      <a:r>
-                        <a:rPr lang="en-US" sz="1100" b="0" i="0" u="none" strike="noStrike">
-                          <a:solidFill>
-                            <a:srgbClr val="000000"/>
-                          </a:solidFill>
-                          <a:effectLst/>
-                          <a:latin typeface="Calibri" panose="020F0502020204030204" pitchFamily="34" charset="0"/>
-                        </a:rPr>
-                        <a:t>Offense (filter)</a:t>
-                      </a:r>
-                    </a:p>
-                  </a:txBody>
-                  <a:tcPr marL="9525" marR="9525" marT="9525" marB="0" anchor="ctr">
-                    <a:lnL>
-                      <a:noFill/>
-                    </a:lnL>
-                    <a:lnR>
-                      <a:noFill/>
-                    </a:lnR>
-                    <a:lnT>
-                      <a:noFill/>
-                    </a:lnT>
-                    <a:lnB>
-                      <a:noFill/>
-                    </a:lnB>
-                  </a:tcPr>
-                </a:tc>
-                <a:tc>
-                  <a:txBody>
-                    <a:bodyPr/>
-                    <a:lstStyle/>
-                    <a:p>
-                      <a:pPr algn="ctr" fontAlgn="ctr"/>
-                      <a:r>
-                        <a:rPr lang="en-US" sz="1100" b="0" i="0" u="none" strike="noStrike">
-                          <a:solidFill>
-                            <a:srgbClr val="000000"/>
-                          </a:solidFill>
-                          <a:effectLst/>
-                          <a:latin typeface="Calibri" panose="020F0502020204030204" pitchFamily="34" charset="0"/>
-                        </a:rPr>
-                        <a:t>COMMITMENT_TYPE (filter)</a:t>
-                      </a:r>
-                    </a:p>
-                  </a:txBody>
-                  <a:tcPr marL="9525" marR="9525" marT="9525" marB="0" anchor="ctr">
-                    <a:lnL>
-                      <a:noFill/>
-                    </a:lnL>
-                    <a:lnR>
-                      <a:noFill/>
-                    </a:lnR>
-                    <a:lnT>
-                      <a:noFill/>
-                    </a:lnT>
-                    <a:lnB>
-                      <a:noFill/>
-                    </a:lnB>
-                  </a:tcPr>
-                </a:tc>
-                <a:tc>
-                  <a:txBody>
-                    <a:bodyPr/>
-                    <a:lstStyle/>
-                    <a:p>
-                      <a:pPr algn="ctr" fontAlgn="ctr"/>
-                      <a:endParaRPr lang="en-US" sz="1100" b="0" i="0" u="none" strike="noStrike">
+                        <a:rPr lang="en-US" sz="1100" b="0" i="0" u="none" strike="noStrike" dirty="0" err="1" smtClean="0">
+                          <a:solidFill>
+                            <a:srgbClr val="000000"/>
+                          </a:solidFill>
+                          <a:effectLst/>
+                          <a:latin typeface="Calibri" panose="020F0502020204030204" pitchFamily="34" charset="0"/>
+                        </a:rPr>
+                        <a:t>Offense_category</a:t>
+                      </a:r>
+                      <a:r>
+                        <a:rPr lang="en-US" sz="1100" b="0" i="0" u="none" strike="noStrike" dirty="0" smtClean="0">
+                          <a:solidFill>
+                            <a:srgbClr val="000000"/>
+                          </a:solidFill>
+                          <a:effectLst/>
+                          <a:latin typeface="Calibri" panose="020F0502020204030204" pitchFamily="34" charset="0"/>
+                        </a:rPr>
+                        <a:t>  </a:t>
+                      </a:r>
+                      <a:endParaRPr lang="en-US" sz="1100" b="0" i="0" u="none" strike="noStrike" dirty="0">
                         <a:solidFill>
                           <a:srgbClr val="000000"/>
                         </a:solidFill>
@@ -5713,15 +6076,22 @@
                     <a:p>
                       <a:pPr algn="ctr" fontAlgn="ctr"/>
                       <a:r>
-                        <a:rPr lang="en-US" sz="1100" b="0" i="0" u="none" strike="noStrike">
-                          <a:solidFill>
-                            <a:srgbClr val="000000"/>
-                          </a:solidFill>
-                          <a:effectLst/>
-                          <a:latin typeface="Calibri" panose="020F0502020204030204" pitchFamily="34" charset="0"/>
-                        </a:rPr>
-                        <a:t>Box plot</a:t>
-                      </a:r>
+                        <a:rPr lang="en-US" sz="1100" b="0" i="0" u="none" strike="noStrike" dirty="0" smtClean="0">
+                          <a:solidFill>
+                            <a:srgbClr val="000000"/>
+                          </a:solidFill>
+                          <a:effectLst/>
+                          <a:latin typeface="Calibri" panose="020F0502020204030204" pitchFamily="34" charset="0"/>
+                        </a:rPr>
+                        <a:t>SENTENCE_TYPE (filter)</a:t>
+                      </a:r>
+                      <a:endParaRPr lang="en-US" sz="1100" b="0" i="0" u="none" strike="noStrike" dirty="0">
+                        <a:solidFill>
+                          <a:srgbClr val="000000"/>
+                        </a:solidFill>
+                        <a:effectLst/>
+                        <a:latin typeface="Calibri" panose="020F0502020204030204" pitchFamily="34" charset="0"/>
+                      </a:endParaRPr>
                     </a:p>
                   </a:txBody>
                   <a:tcPr marL="9525" marR="9525" marT="9525" marB="0" anchor="ctr">
@@ -5746,15 +6116,32 @@
                     <a:p>
                       <a:pPr algn="ctr" fontAlgn="ctr"/>
                       <a:r>
-                        <a:rPr lang="en-US" sz="1100" b="0" i="0" u="none" strike="noStrike">
-                          <a:solidFill>
-                            <a:srgbClr val="000000"/>
-                          </a:solidFill>
-                          <a:effectLst/>
-                          <a:latin typeface="Calibri" panose="020F0502020204030204" pitchFamily="34" charset="0"/>
-                        </a:rPr>
-                        <a:t>No</a:t>
-                      </a:r>
+                        <a:rPr lang="en-US" sz="1100" b="0" i="0" u="none" strike="noStrike" dirty="0" err="1" smtClean="0">
+                          <a:solidFill>
+                            <a:srgbClr val="000000"/>
+                          </a:solidFill>
+                          <a:effectLst/>
+                          <a:latin typeface="Calibri" panose="020F0502020204030204" pitchFamily="34" charset="0"/>
+                        </a:rPr>
+                        <a:t>Court_name</a:t>
+                      </a:r>
+                      <a:r>
+                        <a:rPr lang="en-US" sz="1100" b="0" i="0" u="none" strike="noStrike" dirty="0" smtClean="0">
+                          <a:solidFill>
+                            <a:srgbClr val="000000"/>
+                          </a:solidFill>
+                          <a:effectLst/>
+                          <a:latin typeface="Calibri" panose="020F0502020204030204" pitchFamily="34" charset="0"/>
+                        </a:rPr>
+                        <a:t>(filter)</a:t>
+                      </a:r>
+                      <a:endParaRPr lang="en-US" sz="1100" b="0" i="0" u="none" strike="noStrike" dirty="0">
+                        <a:solidFill>
+                          <a:srgbClr val="000000"/>
+                        </a:solidFill>
+                        <a:effectLst/>
+                        <a:latin typeface="Calibri" panose="020F0502020204030204" pitchFamily="34" charset="0"/>
+                      </a:endParaRPr>
                     </a:p>
                   </a:txBody>
                   <a:tcPr marL="9525" marR="9525" marT="9525" marB="0" anchor="ctr">
@@ -5778,15 +6165,121 @@
                     <a:lstStyle/>
                     <a:p>
                       <a:pPr algn="ctr" fontAlgn="ctr"/>
-                      <a:r>
-                        <a:rPr lang="en-US" sz="1100" b="0" i="0" u="none" strike="noStrike">
-                          <a:solidFill>
-                            <a:srgbClr val="000000"/>
-                          </a:solidFill>
-                          <a:effectLst/>
-                          <a:latin typeface="Calibri" panose="020F0502020204030204" pitchFamily="34" charset="0"/>
-                        </a:rPr>
-                        <a:t>Length of case</a:t>
+                      <a:endParaRPr lang="en-US" sz="1100" b="0" i="0" u="none" strike="noStrike" dirty="0">
+                        <a:solidFill>
+                          <a:srgbClr val="000000"/>
+                        </a:solidFill>
+                        <a:effectLst/>
+                        <a:latin typeface="Calibri" panose="020F0502020204030204" pitchFamily="34" charset="0"/>
+                      </a:endParaRPr>
+                    </a:p>
+                  </a:txBody>
+                  <a:tcPr marL="9525" marR="9525" marT="9525" marB="0" anchor="ctr">
+                    <a:lnL>
+                      <a:noFill/>
+                    </a:lnL>
+                    <a:lnR>
+                      <a:noFill/>
+                    </a:lnR>
+                    <a:lnT>
+                      <a:noFill/>
+                    </a:lnT>
+                    <a:lnB>
+                      <a:noFill/>
+                    </a:lnB>
+                  </a:tcPr>
+                </a:tc>
+                <a:tc>
+                  <a:txBody>
+                    <a:bodyPr/>
+                    <a:lstStyle/>
+                    <a:p>
+                      <a:pPr algn="ctr" fontAlgn="ctr"/>
+                      <a:r>
+                        <a:rPr lang="en-US" sz="1100" b="0" i="0" u="none" strike="noStrike" dirty="0">
+                          <a:solidFill>
+                            <a:srgbClr val="000000"/>
+                          </a:solidFill>
+                          <a:effectLst/>
+                          <a:latin typeface="Calibri" panose="020F0502020204030204" pitchFamily="34" charset="0"/>
+                        </a:rPr>
+                        <a:t>Box plot</a:t>
+                      </a:r>
+                    </a:p>
+                  </a:txBody>
+                  <a:tcPr marL="9525" marR="9525" marT="9525" marB="0" anchor="ctr">
+                    <a:lnL>
+                      <a:noFill/>
+                    </a:lnL>
+                    <a:lnR>
+                      <a:noFill/>
+                    </a:lnR>
+                    <a:lnT>
+                      <a:noFill/>
+                    </a:lnT>
+                    <a:lnB>
+                      <a:noFill/>
+                    </a:lnB>
+                  </a:tcPr>
+                </a:tc>
+                <a:tc>
+                  <a:txBody>
+                    <a:bodyPr/>
+                    <a:lstStyle/>
+                    <a:p>
+                      <a:pPr algn="ctr" fontAlgn="ctr"/>
+                      <a:r>
+                        <a:rPr lang="en-US" sz="1100" b="0" i="0" u="none" strike="noStrike" dirty="0">
+                          <a:solidFill>
+                            <a:srgbClr val="000000"/>
+                          </a:solidFill>
+                          <a:effectLst/>
+                          <a:latin typeface="Calibri" panose="020F0502020204030204" pitchFamily="34" charset="0"/>
+                        </a:rPr>
+                        <a:t>No</a:t>
+                      </a:r>
+                    </a:p>
+                  </a:txBody>
+                  <a:tcPr marL="9525" marR="9525" marT="9525" marB="0" anchor="ctr">
+                    <a:lnL>
+                      <a:noFill/>
+                    </a:lnL>
+                    <a:lnR>
+                      <a:noFill/>
+                    </a:lnR>
+                    <a:lnT>
+                      <a:noFill/>
+                    </a:lnT>
+                    <a:lnB>
+                      <a:noFill/>
+                    </a:lnB>
+                  </a:tcPr>
+                </a:tc>
+                <a:tc>
+                  <a:txBody>
+                    <a:bodyPr/>
+                    <a:lstStyle/>
+                    <a:p>
+                      <a:pPr algn="ctr" fontAlgn="ctr"/>
+                      <a:r>
+                        <a:rPr lang="en-US" sz="1100" b="0" i="0" u="none" strike="noStrike" dirty="0" smtClean="0">
+                          <a:solidFill>
+                            <a:srgbClr val="000000"/>
+                          </a:solidFill>
+                          <a:effectLst/>
+                          <a:latin typeface="Calibri" panose="020F0502020204030204" pitchFamily="34" charset="0"/>
+                        </a:rPr>
+                        <a:t>/Length </a:t>
+                      </a:r>
+                      <a:r>
+                        <a:rPr lang="en-US" sz="1100" b="0" i="0" u="none" strike="noStrike" dirty="0">
+                          <a:solidFill>
+                            <a:srgbClr val="000000"/>
+                          </a:solidFill>
+                          <a:effectLst/>
+                          <a:latin typeface="Calibri" panose="020F0502020204030204" pitchFamily="34" charset="0"/>
+                        </a:rPr>
+                        <a:t>of case</a:t>
                       </a:r>
                     </a:p>
                   </a:txBody>
@@ -5813,7 +6306,7 @@
                 </a:tc>
                 <a:extLst>
                   <a:ext uri="{0D108BD9-81ED-4DB2-BD59-A6C34878D82A}">
-                    <a16:rowId xmlns:a16="http://schemas.microsoft.com/office/drawing/2014/main" val="70753800"/>
+                    <a16:rowId xmlns:a16="http://schemas.microsoft.com/office/drawing/2014/main" xmlns="" val="70753800"/>
                   </a:ext>
                 </a:extLst>
               </a:tr>
@@ -5825,7 +6318,7 @@
                     <a:p>
                       <a:pPr algn="ctr" fontAlgn="ctr"/>
                       <a:r>
-                        <a:rPr lang="en-US" sz="1100" b="0" i="0" u="none" strike="noStrike">
+                        <a:rPr lang="en-US" sz="1100" b="0" i="0" u="none" strike="noStrike" dirty="0">
                           <a:solidFill>
                             <a:srgbClr val="000000"/>
                           </a:solidFill>
@@ -5867,15 +6360,22 @@
                     <a:p>
                       <a:pPr algn="ctr" fontAlgn="ctr"/>
                       <a:r>
-                        <a:rPr lang="en-US" sz="1100" b="0" i="0" u="none" strike="noStrike">
-                          <a:solidFill>
-                            <a:srgbClr val="000000"/>
-                          </a:solidFill>
-                          <a:effectLst/>
-                          <a:latin typeface="Calibri" panose="020F0502020204030204" pitchFamily="34" charset="0"/>
-                        </a:rPr>
-                        <a:t>COMMITMENT_TYPE</a:t>
-                      </a:r>
+                        <a:rPr lang="en-US" sz="1100" b="0" i="0" u="none" strike="noStrike" dirty="0" smtClean="0">
+                          <a:solidFill>
+                            <a:srgbClr val="000000"/>
+                          </a:solidFill>
+                          <a:effectLst/>
+                          <a:latin typeface="Calibri" panose="020F0502020204030204" pitchFamily="34" charset="0"/>
+                        </a:rPr>
+                        <a:t>SENTENCE_TYPE(count)</a:t>
+                      </a:r>
+                      <a:endParaRPr lang="en-US" sz="1100" b="0" i="0" u="none" strike="noStrike" dirty="0">
+                        <a:solidFill>
+                          <a:srgbClr val="000000"/>
+                        </a:solidFill>
+                        <a:effectLst/>
+                        <a:latin typeface="Calibri" panose="020F0502020204030204" pitchFamily="34" charset="0"/>
+                      </a:endParaRPr>
                     </a:p>
                   </a:txBody>
                   <a:tcPr marL="9525" marR="9525" marT="9525" marB="0" anchor="ctr">
@@ -5903,15 +6403,22 @@
                     <a:p>
                       <a:pPr algn="ctr" fontAlgn="ctr"/>
                       <a:r>
-                        <a:rPr lang="en-US" sz="1100" b="0" i="0" u="none" strike="noStrike">
-                          <a:solidFill>
-                            <a:srgbClr val="000000"/>
-                          </a:solidFill>
-                          <a:effectLst/>
-                          <a:latin typeface="Calibri" panose="020F0502020204030204" pitchFamily="34" charset="0"/>
-                        </a:rPr>
-                        <a:t>Commitment term/unit (filter)</a:t>
-                      </a:r>
+                        <a:rPr lang="en-US" sz="1100" b="0" i="0" u="none" strike="noStrike" dirty="0" err="1" smtClean="0">
+                          <a:solidFill>
+                            <a:srgbClr val="000000"/>
+                          </a:solidFill>
+                          <a:effectLst/>
+                          <a:latin typeface="Calibri" panose="020F0502020204030204" pitchFamily="34" charset="0"/>
+                        </a:rPr>
+                        <a:t>Offense_category</a:t>
+                      </a:r>
+                      <a:endParaRPr lang="en-US" sz="1100" b="0" i="0" u="none" strike="noStrike" dirty="0">
+                        <a:solidFill>
+                          <a:srgbClr val="000000"/>
+                        </a:solidFill>
+                        <a:effectLst/>
+                        <a:latin typeface="Calibri" panose="020F0502020204030204" pitchFamily="34" charset="0"/>
+                      </a:endParaRPr>
                     </a:p>
                   </a:txBody>
                   <a:tcPr marL="9525" marR="9525" marT="9525" marB="0" anchor="ctr">
@@ -5938,16 +6445,13 @@
                     <a:lstStyle/>
                     <a:p>
                       <a:pPr algn="ctr" fontAlgn="ctr"/>
-                      <a:r>
-                        <a:rPr lang="en-US" sz="1100" b="0" i="0" u="none" strike="noStrike">
-                          <a:solidFill>
-                            <a:srgbClr val="000000"/>
-                          </a:solidFill>
-                          <a:effectLst/>
-                          <a:latin typeface="Calibri" panose="020F0502020204030204" pitchFamily="34" charset="0"/>
-                        </a:rPr>
-                        <a:t>Offense (filter)</a:t>
-                      </a:r>
+                      <a:endParaRPr lang="en-US" sz="1100" b="0" i="0" u="none" strike="noStrike" dirty="0">
+                        <a:solidFill>
+                          <a:srgbClr val="000000"/>
+                        </a:solidFill>
+                        <a:effectLst/>
+                        <a:latin typeface="Calibri" panose="020F0502020204030204" pitchFamily="34" charset="0"/>
+                      </a:endParaRPr>
                     </a:p>
                   </a:txBody>
                   <a:tcPr marL="9525" marR="9525" marT="9525" marB="0" anchor="ctr">
@@ -6047,7 +6551,7 @@
                     <a:p>
                       <a:pPr algn="ctr" fontAlgn="ctr"/>
                       <a:r>
-                        <a:rPr lang="en-US" sz="1100" b="0" i="0" u="none" strike="noStrike">
+                        <a:rPr lang="en-US" sz="1100" b="0" i="0" u="none" strike="noStrike" dirty="0">
                           <a:solidFill>
                             <a:srgbClr val="000000"/>
                           </a:solidFill>
@@ -6081,17 +6585,53 @@
                     <a:bodyPr/>
                     <a:lstStyle/>
                     <a:p>
+                      <a:pPr marL="0" marR="0" indent="0" algn="ctr" defTabSz="914400" rtl="0" eaLnBrk="1" fontAlgn="ctr" latinLnBrk="0" hangingPunct="1">
+                        <a:lnSpc>
+                          <a:spcPct val="100000"/>
+                        </a:lnSpc>
+                        <a:spcBef>
+                          <a:spcPts val="0"/>
+                        </a:spcBef>
+                        <a:spcAft>
+                          <a:spcPts val="0"/>
+                        </a:spcAft>
+                        <a:buClrTx/>
+                        <a:buSzTx/>
+                        <a:buFontTx/>
+                        <a:buNone/>
+                        <a:tabLst/>
+                        <a:defRPr/>
+                      </a:pPr>
+                      <a:r>
+                        <a:rPr lang="en-US" sz="1100" b="0" i="0" u="none" strike="noStrike" dirty="0" smtClean="0">
+                          <a:solidFill>
+                            <a:srgbClr val="000000"/>
+                          </a:solidFill>
+                          <a:effectLst/>
+                          <a:latin typeface="Calibri" panose="020F0502020204030204" pitchFamily="34" charset="0"/>
+                        </a:rPr>
+                        <a:t>/index</a:t>
+                      </a:r>
+                    </a:p>
+                    <a:p>
                       <a:pPr algn="ctr" fontAlgn="ctr"/>
                       <a:r>
-                        <a:rPr lang="en-US" sz="1100" b="0" i="0" u="none" strike="noStrike">
-                          <a:solidFill>
-                            <a:srgbClr val="000000"/>
-                          </a:solidFill>
-                          <a:effectLst/>
-                          <a:latin typeface="Calibri" panose="020F0502020204030204" pitchFamily="34" charset="0"/>
-                        </a:rPr>
-                        <a:t>Courts</a:t>
-                      </a:r>
+                        <a:rPr lang="en-US" sz="1100" b="0" i="0" u="none" strike="noStrike" dirty="0" smtClean="0">
+                          <a:solidFill>
+                            <a:srgbClr val="000000"/>
+                          </a:solidFill>
+                          <a:effectLst/>
+                          <a:latin typeface="Calibri" panose="020F0502020204030204" pitchFamily="34" charset="0"/>
+                        </a:rPr>
+                        <a:t>/Courts</a:t>
+                      </a:r>
+                      <a:endParaRPr lang="en-US" sz="1100" b="0" i="0" u="none" strike="noStrike" dirty="0">
+                        <a:solidFill>
+                          <a:srgbClr val="000000"/>
+                        </a:solidFill>
+                        <a:effectLst/>
+                        <a:latin typeface="Calibri" panose="020F0502020204030204" pitchFamily="34" charset="0"/>
+                      </a:endParaRPr>
                     </a:p>
                   </a:txBody>
                   <a:tcPr marL="9525" marR="9525" marT="9525" marB="0" anchor="ctr">
@@ -6120,7 +6660,7 @@
                 </a:tc>
                 <a:extLst>
                   <a:ext uri="{0D108BD9-81ED-4DB2-BD59-A6C34878D82A}">
-                    <a16:rowId xmlns:a16="http://schemas.microsoft.com/office/drawing/2014/main" val="1079243955"/>
+                    <a16:rowId xmlns:a16="http://schemas.microsoft.com/office/drawing/2014/main" xmlns="" val="1079243955"/>
                   </a:ext>
                 </a:extLst>
               </a:tr>
@@ -6132,7 +6672,7 @@
                     <a:p>
                       <a:pPr algn="ctr" fontAlgn="ctr"/>
                       <a:r>
-                        <a:rPr lang="en-US" sz="1100" b="0" i="0" u="none" strike="noStrike">
+                        <a:rPr lang="en-US" sz="1100" b="0" i="0" u="none" strike="noStrike" dirty="0">
                           <a:solidFill>
                             <a:srgbClr val="000000"/>
                           </a:solidFill>
@@ -6169,16 +6709,32 @@
                     <a:bodyPr/>
                     <a:lstStyle/>
                     <a:p>
-                      <a:pPr algn="ctr" fontAlgn="ctr"/>
-                      <a:r>
-                        <a:rPr lang="en-US" sz="1100" b="0" i="0" u="none" strike="noStrike">
-                          <a:solidFill>
-                            <a:srgbClr val="000000"/>
-                          </a:solidFill>
-                          <a:effectLst/>
-                          <a:latin typeface="Calibri" panose="020F0502020204030204" pitchFamily="34" charset="0"/>
-                        </a:rPr>
-                        <a:t>COMMITMENT_TYPE</a:t>
+                      <a:pPr marL="0" marR="0" indent="0" algn="ctr" defTabSz="914400" rtl="0" eaLnBrk="1" fontAlgn="ctr" latinLnBrk="0" hangingPunct="1">
+                        <a:lnSpc>
+                          <a:spcPct val="100000"/>
+                        </a:lnSpc>
+                        <a:spcBef>
+                          <a:spcPts val="0"/>
+                        </a:spcBef>
+                        <a:spcAft>
+                          <a:spcPts val="0"/>
+                        </a:spcAft>
+                        <a:buClrTx/>
+                        <a:buSzTx/>
+                        <a:buFontTx/>
+                        <a:buNone/>
+                        <a:tabLst/>
+                        <a:defRPr/>
+                      </a:pPr>
+                      <a:r>
+                        <a:rPr lang="en-US" sz="1100" b="0" i="0" u="none" strike="noStrike" dirty="0" smtClean="0">
+                          <a:solidFill>
+                            <a:srgbClr val="000000"/>
+                          </a:solidFill>
+                          <a:effectLst/>
+                          <a:latin typeface="Calibri" panose="020F0502020204030204" pitchFamily="34" charset="0"/>
+                        </a:rPr>
+                        <a:t>Commitment term/unit </a:t>
                       </a:r>
                     </a:p>
                   </a:txBody>
@@ -6202,16 +6758,32 @@
                     <a:bodyPr/>
                     <a:lstStyle/>
                     <a:p>
-                      <a:pPr algn="ctr" fontAlgn="ctr"/>
-                      <a:r>
-                        <a:rPr lang="en-US" sz="1100" b="0" i="0" u="none" strike="noStrike">
-                          <a:solidFill>
-                            <a:srgbClr val="000000"/>
-                          </a:solidFill>
-                          <a:effectLst/>
-                          <a:latin typeface="Calibri" panose="020F0502020204030204" pitchFamily="34" charset="0"/>
-                        </a:rPr>
-                        <a:t>Commitment term/unit (filter)</a:t>
+                      <a:pPr marL="0" marR="0" indent="0" algn="ctr" defTabSz="914400" rtl="0" eaLnBrk="1" fontAlgn="ctr" latinLnBrk="0" hangingPunct="1">
+                        <a:lnSpc>
+                          <a:spcPct val="100000"/>
+                        </a:lnSpc>
+                        <a:spcBef>
+                          <a:spcPts val="0"/>
+                        </a:spcBef>
+                        <a:spcAft>
+                          <a:spcPts val="0"/>
+                        </a:spcAft>
+                        <a:buClrTx/>
+                        <a:buSzTx/>
+                        <a:buFontTx/>
+                        <a:buNone/>
+                        <a:tabLst/>
+                        <a:defRPr/>
+                      </a:pPr>
+                      <a:r>
+                        <a:rPr lang="en-US" sz="1100" b="0" i="0" u="none" strike="noStrike" dirty="0" smtClean="0">
+                          <a:solidFill>
+                            <a:srgbClr val="000000"/>
+                          </a:solidFill>
+                          <a:effectLst/>
+                          <a:latin typeface="Calibri" panose="020F0502020204030204" pitchFamily="34" charset="0"/>
+                        </a:rPr>
+                        <a:t>SENTENCE_TYPE(filter)</a:t>
                       </a:r>
                     </a:p>
                   </a:txBody>
@@ -6237,7 +6809,7 @@
                     <a:p>
                       <a:pPr algn="ctr" fontAlgn="ctr"/>
                       <a:r>
-                        <a:rPr lang="en-US" sz="1100" b="0" i="0" u="none" strike="noStrike">
+                        <a:rPr lang="en-US" sz="1100" b="0" i="0" u="none" strike="noStrike" dirty="0">
                           <a:solidFill>
                             <a:srgbClr val="000000"/>
                           </a:solidFill>
@@ -6303,14 +6875,24 @@
                     <a:p>
                       <a:pPr algn="ctr" fontAlgn="ctr"/>
                       <a:r>
-                        <a:rPr lang="en-US" sz="1100" b="0" i="0" u="none" strike="noStrike">
-                          <a:solidFill>
-                            <a:srgbClr val="000000"/>
-                          </a:solidFill>
-                          <a:effectLst/>
-                          <a:latin typeface="Calibri" panose="020F0502020204030204" pitchFamily="34" charset="0"/>
-                        </a:rPr>
-                        <a:t>Line/scatter graph</a:t>
+                        <a:rPr lang="en-US" sz="1100" b="0" i="0" u="none" strike="noStrike" dirty="0" smtClean="0">
+                          <a:solidFill>
+                            <a:srgbClr val="000000"/>
+                          </a:solidFill>
+                          <a:effectLst/>
+                          <a:latin typeface="Calibri" panose="020F0502020204030204" pitchFamily="34" charset="0"/>
+                        </a:rPr>
+                        <a:t>scatter </a:t>
+                      </a:r>
+                      <a:r>
+                        <a:rPr lang="en-US" sz="1100" b="0" i="0" u="none" strike="noStrike" dirty="0">
+                          <a:solidFill>
+                            <a:srgbClr val="000000"/>
+                          </a:solidFill>
+                          <a:effectLst/>
+                          <a:latin typeface="Calibri" panose="020F0502020204030204" pitchFamily="34" charset="0"/>
+                        </a:rPr>
+                        <a:t>graph</a:t>
                       </a:r>
                     </a:p>
                   </a:txBody>
@@ -6336,7 +6918,7 @@
                     <a:p>
                       <a:pPr algn="ctr" fontAlgn="ctr"/>
                       <a:r>
-                        <a:rPr lang="en-US" sz="1100" b="0" i="0" u="none" strike="noStrike">
+                        <a:rPr lang="en-US" sz="1100" b="0" i="0" u="none" strike="noStrike" dirty="0">
                           <a:solidFill>
                             <a:srgbClr val="000000"/>
                           </a:solidFill>
@@ -6367,17 +6949,53 @@
                     <a:bodyPr/>
                     <a:lstStyle/>
                     <a:p>
+                      <a:pPr marL="0" marR="0" indent="0" algn="ctr" defTabSz="914400" rtl="0" eaLnBrk="1" fontAlgn="ctr" latinLnBrk="0" hangingPunct="1">
+                        <a:lnSpc>
+                          <a:spcPct val="100000"/>
+                        </a:lnSpc>
+                        <a:spcBef>
+                          <a:spcPts val="0"/>
+                        </a:spcBef>
+                        <a:spcAft>
+                          <a:spcPts val="0"/>
+                        </a:spcAft>
+                        <a:buClrTx/>
+                        <a:buSzTx/>
+                        <a:buFontTx/>
+                        <a:buNone/>
+                        <a:tabLst/>
+                        <a:defRPr/>
+                      </a:pPr>
+                      <a:r>
+                        <a:rPr lang="en-US" sz="1100" b="0" i="0" u="none" strike="noStrike" dirty="0" smtClean="0">
+                          <a:solidFill>
+                            <a:srgbClr val="000000"/>
+                          </a:solidFill>
+                          <a:effectLst/>
+                          <a:latin typeface="Calibri" panose="020F0502020204030204" pitchFamily="34" charset="0"/>
+                        </a:rPr>
+                        <a:t>/index</a:t>
+                      </a:r>
+                    </a:p>
+                    <a:p>
                       <a:pPr algn="ctr" fontAlgn="ctr"/>
                       <a:r>
-                        <a:rPr lang="en-US" sz="1100" b="0" i="0" u="none" strike="noStrike">
-                          <a:solidFill>
-                            <a:srgbClr val="000000"/>
-                          </a:solidFill>
-                          <a:effectLst/>
-                          <a:latin typeface="Calibri" panose="020F0502020204030204" pitchFamily="34" charset="0"/>
-                        </a:rPr>
-                        <a:t>Courts</a:t>
-                      </a:r>
+                        <a:rPr lang="en-US" sz="1100" b="0" i="0" u="none" strike="noStrike" dirty="0" smtClean="0">
+                          <a:solidFill>
+                            <a:srgbClr val="000000"/>
+                          </a:solidFill>
+                          <a:effectLst/>
+                          <a:latin typeface="Calibri" panose="020F0502020204030204" pitchFamily="34" charset="0"/>
+                        </a:rPr>
+                        <a:t>/Courts</a:t>
+                      </a:r>
+                      <a:endParaRPr lang="en-US" sz="1100" b="0" i="0" u="none" strike="noStrike" dirty="0">
+                        <a:solidFill>
+                          <a:srgbClr val="000000"/>
+                        </a:solidFill>
+                        <a:effectLst/>
+                        <a:latin typeface="Calibri" panose="020F0502020204030204" pitchFamily="34" charset="0"/>
+                      </a:endParaRPr>
                     </a:p>
                   </a:txBody>
                   <a:tcPr marL="9525" marR="9525" marT="9525" marB="0" anchor="ctr">
@@ -6403,7 +7021,7 @@
                 </a:tc>
                 <a:extLst>
                   <a:ext uri="{0D108BD9-81ED-4DB2-BD59-A6C34878D82A}">
-                    <a16:rowId xmlns:a16="http://schemas.microsoft.com/office/drawing/2014/main" val="1004133604"/>
+                    <a16:rowId xmlns:a16="http://schemas.microsoft.com/office/drawing/2014/main" xmlns="" val="1004133604"/>
                   </a:ext>
                 </a:extLst>
               </a:tr>
@@ -6415,15 +7033,32 @@
                     <a:p>
                       <a:pPr algn="ctr" fontAlgn="ctr"/>
                       <a:r>
-                        <a:rPr lang="en-US" sz="1100" b="0" i="0" u="none" strike="noStrike">
-                          <a:solidFill>
-                            <a:srgbClr val="000000"/>
-                          </a:solidFill>
-                          <a:effectLst/>
-                          <a:latin typeface="Calibri" panose="020F0502020204030204" pitchFamily="34" charset="0"/>
-                        </a:rPr>
-                        <a:t>OFFENSE_CATEGORY</a:t>
-                      </a:r>
+                        <a:rPr lang="en-US" sz="1100" b="0" i="0" u="none" strike="noStrike" dirty="0" smtClean="0">
+                          <a:solidFill>
+                            <a:srgbClr val="000000"/>
+                          </a:solidFill>
+                          <a:effectLst/>
+                          <a:latin typeface="Calibri" panose="020F0502020204030204" pitchFamily="34" charset="0"/>
+                        </a:rPr>
+                        <a:t>ID(ALL</a:t>
+                      </a:r>
+                      <a:r>
+                        <a:rPr lang="en-US" sz="1100" b="0" i="0" u="none" strike="noStrike" baseline="0" dirty="0" smtClean="0">
+                          <a:solidFill>
+                            <a:srgbClr val="000000"/>
+                          </a:solidFill>
+                          <a:effectLst/>
+                          <a:latin typeface="Calibri" panose="020F0502020204030204" pitchFamily="34" charset="0"/>
+                        </a:rPr>
+                        <a:t> CASES</a:t>
+                      </a:r>
+                      <a:endParaRPr lang="en-US" sz="1100" b="0" i="0" u="none" strike="noStrike" dirty="0">
+                        <a:solidFill>
+                          <a:srgbClr val="000000"/>
+                        </a:solidFill>
+                        <a:effectLst/>
+                        <a:latin typeface="Calibri" panose="020F0502020204030204" pitchFamily="34" charset="0"/>
+                      </a:endParaRPr>
                     </a:p>
                   </a:txBody>
                   <a:tcPr marL="9525" marR="9525" marT="9525" marB="0" anchor="ctr">
@@ -6455,116 +7090,37 @@
                     <a:bodyPr/>
                     <a:lstStyle/>
                     <a:p>
+                      <a:pPr marL="0" marR="0" indent="0" algn="ctr" defTabSz="914400" rtl="0" eaLnBrk="1" fontAlgn="ctr" latinLnBrk="0" hangingPunct="1">
+                        <a:lnSpc>
+                          <a:spcPct val="100000"/>
+                        </a:lnSpc>
+                        <a:spcBef>
+                          <a:spcPts val="0"/>
+                        </a:spcBef>
+                        <a:spcAft>
+                          <a:spcPts val="0"/>
+                        </a:spcAft>
+                        <a:buClrTx/>
+                        <a:buSzTx/>
+                        <a:buFontTx/>
+                        <a:buNone/>
+                        <a:tabLst/>
+                        <a:defRPr/>
+                      </a:pPr>
+                      <a:r>
+                        <a:rPr lang="en-US" sz="1100" b="0" i="0" u="none" strike="noStrike" dirty="0" smtClean="0">
+                          <a:solidFill>
+                            <a:srgbClr val="000000"/>
+                          </a:solidFill>
+                          <a:effectLst/>
+                          <a:latin typeface="Calibri" panose="020F0502020204030204" pitchFamily="34" charset="0"/>
+                        </a:rPr>
+                        <a:t>OFFENSE_CATEGORY</a:t>
+                      </a:r>
+                    </a:p>
+                    <a:p>
                       <a:pPr algn="ctr" fontAlgn="ctr"/>
-                      <a:r>
-                        <a:rPr lang="en-US" sz="1100" b="0" i="0" u="none" strike="noStrike">
-                          <a:solidFill>
-                            <a:srgbClr val="000000"/>
-                          </a:solidFill>
-                          <a:effectLst/>
-                          <a:latin typeface="Calibri" panose="020F0502020204030204" pitchFamily="34" charset="0"/>
-                        </a:rPr>
-                        <a:t>COMMITMENT_TYPE</a:t>
-                      </a:r>
-                    </a:p>
-                  </a:txBody>
-                  <a:tcPr marL="9525" marR="9525" marT="9525" marB="0" anchor="ctr">
-                    <a:lnL>
-                      <a:noFill/>
-                    </a:lnL>
-                    <a:lnR>
-                      <a:noFill/>
-                    </a:lnR>
-                    <a:lnT>
-                      <a:noFill/>
-                    </a:lnT>
-                    <a:lnB>
-                      <a:noFill/>
-                    </a:lnB>
-                    <a:solidFill>
-                      <a:srgbClr val="D9D9D9"/>
-                    </a:solidFill>
-                  </a:tcPr>
-                </a:tc>
-                <a:tc>
-                  <a:txBody>
-                    <a:bodyPr/>
-                    <a:lstStyle/>
-                    <a:p>
-                      <a:pPr algn="ctr" fontAlgn="ctr"/>
-                      <a:r>
-                        <a:rPr lang="en-US" sz="1100" b="0" i="0" u="none" strike="noStrike">
-                          <a:solidFill>
-                            <a:srgbClr val="000000"/>
-                          </a:solidFill>
-                          <a:effectLst/>
-                          <a:latin typeface="Calibri" panose="020F0502020204030204" pitchFamily="34" charset="0"/>
-                        </a:rPr>
-                        <a:t>COMMITMENT_UNIT</a:t>
-                      </a:r>
-                    </a:p>
-                  </a:txBody>
-                  <a:tcPr marL="9525" marR="9525" marT="9525" marB="0" anchor="ctr">
-                    <a:lnL>
-                      <a:noFill/>
-                    </a:lnL>
-                    <a:lnR>
-                      <a:noFill/>
-                    </a:lnR>
-                    <a:lnT>
-                      <a:noFill/>
-                    </a:lnT>
-                    <a:lnB>
-                      <a:noFill/>
-                    </a:lnB>
-                    <a:solidFill>
-                      <a:srgbClr val="D9D9D9"/>
-                    </a:solidFill>
-                  </a:tcPr>
-                </a:tc>
-                <a:tc>
-                  <a:txBody>
-                    <a:bodyPr/>
-                    <a:lstStyle/>
-                    <a:p>
-                      <a:pPr algn="ctr" fontAlgn="ctr"/>
-                      <a:r>
-                        <a:rPr lang="en-US" sz="1100" b="0" i="0" u="none" strike="noStrike">
-                          <a:solidFill>
-                            <a:srgbClr val="000000"/>
-                          </a:solidFill>
-                          <a:effectLst/>
-                          <a:latin typeface="Calibri" panose="020F0502020204030204" pitchFamily="34" charset="0"/>
-                        </a:rPr>
-                        <a:t>COMMITMENT_TERM</a:t>
-                      </a:r>
-                    </a:p>
-                  </a:txBody>
-                  <a:tcPr marL="9525" marR="9525" marT="9525" marB="0" anchor="ctr">
-                    <a:lnL>
-                      <a:noFill/>
-                    </a:lnL>
-                    <a:lnR>
-                      <a:noFill/>
-                    </a:lnR>
-                    <a:lnT>
-                      <a:noFill/>
-                    </a:lnT>
-                    <a:lnB>
-                      <a:noFill/>
-                    </a:lnB>
-                    <a:solidFill>
-                      <a:srgbClr val="D9D9D9"/>
-                    </a:solidFill>
-                  </a:tcPr>
-                </a:tc>
-                <a:tc>
-                  <a:txBody>
-                    <a:bodyPr/>
-                    <a:lstStyle/>
-                    <a:p>
-                      <a:pPr algn="ctr" fontAlgn="ctr"/>
-                      <a:endParaRPr lang="en-US" sz="1100" b="0" i="0" u="none" strike="noStrike">
+                      <a:endParaRPr lang="en-US" sz="1100" b="0" i="0" u="none" strike="noStrike" dirty="0">
                         <a:solidFill>
                           <a:srgbClr val="000000"/>
                         </a:solidFill>
@@ -6596,17 +7152,43 @@
                     <a:bodyPr/>
                     <a:lstStyle/>
                     <a:p>
+                      <a:pPr marL="0" marR="0" indent="0" algn="ctr" defTabSz="914400" rtl="0" eaLnBrk="1" fontAlgn="ctr" latinLnBrk="0" hangingPunct="1">
+                        <a:lnSpc>
+                          <a:spcPct val="100000"/>
+                        </a:lnSpc>
+                        <a:spcBef>
+                          <a:spcPts val="0"/>
+                        </a:spcBef>
+                        <a:spcAft>
+                          <a:spcPts val="0"/>
+                        </a:spcAft>
+                        <a:buClrTx/>
+                        <a:buSzTx/>
+                        <a:buFontTx/>
+                        <a:buNone/>
+                        <a:tabLst/>
+                        <a:defRPr/>
+                      </a:pPr>
+                      <a:r>
+                        <a:rPr lang="en-US" sz="1100" b="0" i="0" u="none" strike="noStrike" dirty="0" smtClean="0">
+                          <a:solidFill>
+                            <a:srgbClr val="000000"/>
+                          </a:solidFill>
+                          <a:effectLst/>
+                          <a:latin typeface="Calibri" panose="020F0502020204030204" pitchFamily="34" charset="0"/>
+                        </a:rPr>
+                        <a:t>SENTENCE_TYPE</a:t>
+                      </a:r>
+                    </a:p>
+                    <a:p>
                       <a:pPr algn="ctr" fontAlgn="ctr"/>
-                      <a:r>
-                        <a:rPr lang="en-US" sz="1100" b="0" i="0" u="none" strike="noStrike">
-                          <a:solidFill>
-                            <a:srgbClr val="000000"/>
-                          </a:solidFill>
-                          <a:effectLst/>
-                          <a:latin typeface="Calibri" panose="020F0502020204030204" pitchFamily="34" charset="0"/>
-                        </a:rPr>
-                        <a:t>Multilevel pie chart</a:t>
-                      </a:r>
+                      <a:endParaRPr lang="en-US" sz="1100" b="0" i="0" u="none" strike="noStrike" dirty="0">
+                        <a:solidFill>
+                          <a:srgbClr val="000000"/>
+                        </a:solidFill>
+                        <a:effectLst/>
+                        <a:latin typeface="Calibri" panose="020F0502020204030204" pitchFamily="34" charset="0"/>
+                      </a:endParaRPr>
                     </a:p>
                   </a:txBody>
                   <a:tcPr marL="9525" marR="9525" marT="9525" marB="0" anchor="ctr">
@@ -6634,15 +7216,22 @@
                     <a:p>
                       <a:pPr algn="ctr" fontAlgn="ctr"/>
                       <a:r>
-                        <a:rPr lang="en-US" sz="1100" b="0" i="0" u="none" strike="noStrike">
-                          <a:solidFill>
-                            <a:srgbClr val="000000"/>
-                          </a:solidFill>
-                          <a:effectLst/>
-                          <a:latin typeface="Calibri" panose="020F0502020204030204" pitchFamily="34" charset="0"/>
-                        </a:rPr>
-                        <a:t>Yes</a:t>
-                      </a:r>
+                        <a:rPr lang="en-US" sz="1100" b="0" i="0" u="none" strike="noStrike" dirty="0" smtClean="0">
+                          <a:solidFill>
+                            <a:srgbClr val="000000"/>
+                          </a:solidFill>
+                          <a:effectLst/>
+                          <a:latin typeface="Calibri" panose="020F0502020204030204" pitchFamily="34" charset="0"/>
+                        </a:rPr>
+                        <a:t>COURT_NAME(filter only in /O_C)</a:t>
+                      </a:r>
+                      <a:endParaRPr lang="en-US" sz="1100" b="0" i="0" u="none" strike="noStrike" dirty="0">
+                        <a:solidFill>
+                          <a:srgbClr val="000000"/>
+                        </a:solidFill>
+                        <a:effectLst/>
+                        <a:latin typeface="Calibri" panose="020F0502020204030204" pitchFamily="34" charset="0"/>
+                      </a:endParaRPr>
                     </a:p>
                   </a:txBody>
                   <a:tcPr marL="9525" marR="9525" marT="9525" marB="0" anchor="ctr">
@@ -6669,16 +7258,167 @@
                     <a:lstStyle/>
                     <a:p>
                       <a:pPr algn="ctr" fontAlgn="ctr"/>
-                      <a:r>
-                        <a:rPr lang="en-US" sz="1100" b="0" i="0" u="none" strike="noStrike">
-                          <a:solidFill>
-                            <a:srgbClr val="000000"/>
-                          </a:solidFill>
-                          <a:effectLst/>
-                          <a:latin typeface="Calibri" panose="020F0502020204030204" pitchFamily="34" charset="0"/>
-                        </a:rPr>
-                        <a:t>Offense Category</a:t>
-                      </a:r>
+                      <a:endParaRPr lang="en-US" sz="1100" b="0" i="0" u="none" strike="noStrike" dirty="0">
+                        <a:solidFill>
+                          <a:srgbClr val="000000"/>
+                        </a:solidFill>
+                        <a:effectLst/>
+                        <a:latin typeface="Calibri" panose="020F0502020204030204" pitchFamily="34" charset="0"/>
+                      </a:endParaRPr>
+                    </a:p>
+                  </a:txBody>
+                  <a:tcPr marL="9525" marR="9525" marT="9525" marB="0" anchor="ctr">
+                    <a:lnL>
+                      <a:noFill/>
+                    </a:lnL>
+                    <a:lnR>
+                      <a:noFill/>
+                    </a:lnR>
+                    <a:lnT>
+                      <a:noFill/>
+                    </a:lnT>
+                    <a:lnB>
+                      <a:noFill/>
+                    </a:lnB>
+                    <a:solidFill>
+                      <a:srgbClr val="D9D9D9"/>
+                    </a:solidFill>
+                  </a:tcPr>
+                </a:tc>
+                <a:tc>
+                  <a:txBody>
+                    <a:bodyPr/>
+                    <a:lstStyle/>
+                    <a:p>
+                      <a:pPr algn="ctr" fontAlgn="ctr"/>
+                      <a:r>
+                        <a:rPr lang="en-US" sz="1100" b="0" i="0" u="none" strike="noStrike" dirty="0">
+                          <a:solidFill>
+                            <a:srgbClr val="000000"/>
+                          </a:solidFill>
+                          <a:effectLst/>
+                          <a:latin typeface="Calibri" panose="020F0502020204030204" pitchFamily="34" charset="0"/>
+                        </a:rPr>
+                        <a:t>Multilevel pie chart</a:t>
+                      </a:r>
+                    </a:p>
+                  </a:txBody>
+                  <a:tcPr marL="9525" marR="9525" marT="9525" marB="0" anchor="ctr">
+                    <a:lnL>
+                      <a:noFill/>
+                    </a:lnL>
+                    <a:lnR>
+                      <a:noFill/>
+                    </a:lnR>
+                    <a:lnT>
+                      <a:noFill/>
+                    </a:lnT>
+                    <a:lnB>
+                      <a:noFill/>
+                    </a:lnB>
+                    <a:solidFill>
+                      <a:srgbClr val="D9D9D9"/>
+                    </a:solidFill>
+                  </a:tcPr>
+                </a:tc>
+                <a:tc>
+                  <a:txBody>
+                    <a:bodyPr/>
+                    <a:lstStyle/>
+                    <a:p>
+                      <a:pPr algn="ctr" fontAlgn="ctr"/>
+                      <a:r>
+                        <a:rPr lang="en-US" sz="1100" b="0" i="0" u="none" strike="noStrike" dirty="0">
+                          <a:solidFill>
+                            <a:srgbClr val="000000"/>
+                          </a:solidFill>
+                          <a:effectLst/>
+                          <a:latin typeface="Calibri" panose="020F0502020204030204" pitchFamily="34" charset="0"/>
+                        </a:rPr>
+                        <a:t>Yes</a:t>
+                      </a:r>
+                    </a:p>
+                  </a:txBody>
+                  <a:tcPr marL="9525" marR="9525" marT="9525" marB="0" anchor="ctr">
+                    <a:lnL>
+                      <a:noFill/>
+                    </a:lnL>
+                    <a:lnR>
+                      <a:noFill/>
+                    </a:lnR>
+                    <a:lnT>
+                      <a:noFill/>
+                    </a:lnT>
+                    <a:lnB>
+                      <a:noFill/>
+                    </a:lnB>
+                    <a:solidFill>
+                      <a:srgbClr val="D9D9D9"/>
+                    </a:solidFill>
+                  </a:tcPr>
+                </a:tc>
+                <a:tc>
+                  <a:txBody>
+                    <a:bodyPr/>
+                    <a:lstStyle/>
+                    <a:p>
+                      <a:pPr marL="0" marR="0" indent="0" algn="ctr" defTabSz="914400" rtl="0" eaLnBrk="1" fontAlgn="ctr" latinLnBrk="0" hangingPunct="1">
+                        <a:lnSpc>
+                          <a:spcPct val="100000"/>
+                        </a:lnSpc>
+                        <a:spcBef>
+                          <a:spcPts val="0"/>
+                        </a:spcBef>
+                        <a:spcAft>
+                          <a:spcPts val="0"/>
+                        </a:spcAft>
+                        <a:buClrTx/>
+                        <a:buSzTx/>
+                        <a:buFontTx/>
+                        <a:buNone/>
+                        <a:tabLst/>
+                        <a:defRPr/>
+                      </a:pPr>
+                      <a:r>
+                        <a:rPr lang="en-US" sz="1100" b="0" i="0" u="none" strike="noStrike" dirty="0" smtClean="0">
+                          <a:solidFill>
+                            <a:srgbClr val="000000"/>
+                          </a:solidFill>
+                          <a:effectLst/>
+                          <a:latin typeface="Calibri" panose="020F0502020204030204" pitchFamily="34" charset="0"/>
+                        </a:rPr>
+                        <a:t>/index(general)</a:t>
+                      </a:r>
+                    </a:p>
+                    <a:p>
+                      <a:pPr algn="ctr" fontAlgn="ctr"/>
+                      <a:r>
+                        <a:rPr lang="en-US" sz="1100" b="0" i="0" u="none" strike="noStrike" dirty="0" smtClean="0">
+                          <a:solidFill>
+                            <a:srgbClr val="000000"/>
+                          </a:solidFill>
+                          <a:effectLst/>
+                          <a:latin typeface="Calibri" panose="020F0502020204030204" pitchFamily="34" charset="0"/>
+                        </a:rPr>
+                        <a:t>/</a:t>
+                      </a:r>
+                      <a:r>
+                        <a:rPr lang="en-US" sz="1100" b="0" i="0" u="none" strike="noStrike" dirty="0" err="1" smtClean="0">
+                          <a:solidFill>
+                            <a:srgbClr val="000000"/>
+                          </a:solidFill>
+                          <a:effectLst/>
+                          <a:latin typeface="Calibri" panose="020F0502020204030204" pitchFamily="34" charset="0"/>
+                        </a:rPr>
+                        <a:t>Offense_Category</a:t>
+                      </a:r>
+                      <a:endParaRPr lang="en-US" sz="1100" b="0" i="0" u="none" strike="noStrike" dirty="0">
+                        <a:solidFill>
+                          <a:srgbClr val="000000"/>
+                        </a:solidFill>
+                        <a:effectLst/>
+                        <a:latin typeface="Calibri" panose="020F0502020204030204" pitchFamily="34" charset="0"/>
+                      </a:endParaRPr>
                     </a:p>
                   </a:txBody>
                   <a:tcPr marL="9525" marR="9525" marT="9525" marB="0" anchor="ctr">
@@ -6707,7 +7447,7 @@
                 </a:tc>
                 <a:extLst>
                   <a:ext uri="{0D108BD9-81ED-4DB2-BD59-A6C34878D82A}">
-                    <a16:rowId xmlns:a16="http://schemas.microsoft.com/office/drawing/2014/main" val="1569504245"/>
+                    <a16:rowId xmlns:a16="http://schemas.microsoft.com/office/drawing/2014/main" xmlns="" val="1569504245"/>
                   </a:ext>
                 </a:extLst>
               </a:tr>
@@ -6719,7 +7459,7 @@
                     <a:p>
                       <a:pPr algn="ctr" fontAlgn="ctr"/>
                       <a:r>
-                        <a:rPr lang="en-US" sz="1100" b="0" i="0" u="none" strike="noStrike">
+                        <a:rPr lang="en-US" sz="1100" b="0" i="0" u="none" strike="noStrike" dirty="0">
                           <a:solidFill>
                             <a:srgbClr val="000000"/>
                           </a:solidFill>
@@ -6764,7 +7504,7 @@
                     <a:p>
                       <a:pPr algn="ctr" fontAlgn="ctr"/>
                       <a:r>
-                        <a:rPr lang="en-US" sz="1100" b="0" i="0" u="none" strike="noStrike">
+                        <a:rPr lang="en-US" sz="1100" b="0" i="0" u="none" strike="noStrike" dirty="0">
                           <a:solidFill>
                             <a:srgbClr val="000000"/>
                           </a:solidFill>
@@ -6803,7 +7543,7 @@
                     <a:p>
                       <a:pPr algn="ctr" fontAlgn="ctr"/>
                       <a:r>
-                        <a:rPr lang="en-US" sz="1100" b="0" i="0" u="none" strike="noStrike">
+                        <a:rPr lang="en-US" sz="1100" b="0" i="0" u="none" strike="noStrike" dirty="0">
                           <a:solidFill>
                             <a:srgbClr val="000000"/>
                           </a:solidFill>
@@ -6841,7 +7581,7 @@
                     <a:lstStyle/>
                     <a:p>
                       <a:pPr algn="ctr" fontAlgn="ctr"/>
-                      <a:endParaRPr lang="en-US" sz="1100" b="0" i="0" u="none" strike="noStrike">
+                      <a:endParaRPr lang="en-US" sz="1100" b="0" i="0" u="none" strike="noStrike" dirty="0">
                         <a:solidFill>
                           <a:srgbClr val="000000"/>
                         </a:solidFill>
@@ -6877,7 +7617,7 @@
                     <a:lstStyle/>
                     <a:p>
                       <a:pPr algn="ctr" fontAlgn="ctr"/>
-                      <a:endParaRPr lang="en-US" sz="1100" b="0" i="0" u="none" strike="noStrike">
+                      <a:endParaRPr lang="en-US" sz="1100" b="0" i="0" u="none" strike="noStrike" dirty="0">
                         <a:solidFill>
                           <a:srgbClr val="000000"/>
                         </a:solidFill>
@@ -6914,7 +7654,7 @@
                     <a:p>
                       <a:pPr algn="ctr" fontAlgn="ctr"/>
                       <a:r>
-                        <a:rPr lang="en-US" sz="1100" b="0" i="0" u="none" strike="noStrike">
+                        <a:rPr lang="en-US" sz="1100" b="0" i="0" u="none" strike="noStrike" dirty="0">
                           <a:solidFill>
                             <a:srgbClr val="000000"/>
                           </a:solidFill>
@@ -6953,7 +7693,7 @@
                     <a:p>
                       <a:pPr algn="ctr" fontAlgn="ctr"/>
                       <a:r>
-                        <a:rPr lang="en-US" sz="1100" b="0" i="0" u="none" strike="noStrike">
+                        <a:rPr lang="en-US" sz="1100" b="0" i="0" u="none" strike="noStrike" dirty="0">
                           <a:solidFill>
                             <a:srgbClr val="000000"/>
                           </a:solidFill>
@@ -6990,17 +7730,53 @@
                     <a:bodyPr/>
                     <a:lstStyle/>
                     <a:p>
+                      <a:pPr marL="0" marR="0" indent="0" algn="ctr" defTabSz="914400" rtl="0" eaLnBrk="1" fontAlgn="ctr" latinLnBrk="0" hangingPunct="1">
+                        <a:lnSpc>
+                          <a:spcPct val="100000"/>
+                        </a:lnSpc>
+                        <a:spcBef>
+                          <a:spcPts val="0"/>
+                        </a:spcBef>
+                        <a:spcAft>
+                          <a:spcPts val="0"/>
+                        </a:spcAft>
+                        <a:buClrTx/>
+                        <a:buSzTx/>
+                        <a:buFontTx/>
+                        <a:buNone/>
+                        <a:tabLst/>
+                        <a:defRPr/>
+                      </a:pPr>
+                      <a:r>
+                        <a:rPr lang="en-US" sz="1100" b="0" i="0" u="none" strike="noStrike" dirty="0" smtClean="0">
+                          <a:solidFill>
+                            <a:srgbClr val="000000"/>
+                          </a:solidFill>
+                          <a:effectLst/>
+                          <a:latin typeface="Calibri" panose="020F0502020204030204" pitchFamily="34" charset="0"/>
+                        </a:rPr>
+                        <a:t>/index(general</a:t>
+                      </a:r>
+                    </a:p>
+                    <a:p>
                       <a:pPr algn="ctr" fontAlgn="ctr"/>
                       <a:r>
-                        <a:rPr lang="en-US" sz="1100" b="0" i="0" u="none" strike="noStrike" dirty="0">
-                          <a:solidFill>
-                            <a:srgbClr val="000000"/>
-                          </a:solidFill>
-                          <a:effectLst/>
-                          <a:latin typeface="Calibri" panose="020F0502020204030204" pitchFamily="34" charset="0"/>
-                        </a:rPr>
-                        <a:t>Demographic</a:t>
-                      </a:r>
+                        <a:rPr lang="en-US" sz="1100" b="0" i="0" u="none" strike="noStrike" dirty="0" smtClean="0">
+                          <a:solidFill>
+                            <a:srgbClr val="000000"/>
+                          </a:solidFill>
+                          <a:effectLst/>
+                          <a:latin typeface="Calibri" panose="020F0502020204030204" pitchFamily="34" charset="0"/>
+                        </a:rPr>
+                        <a:t>/Demographic</a:t>
+                      </a:r>
+                      <a:endParaRPr lang="en-US" sz="1100" b="0" i="0" u="none" strike="noStrike" dirty="0">
+                        <a:solidFill>
+                          <a:srgbClr val="000000"/>
+                        </a:solidFill>
+                        <a:effectLst/>
+                        <a:latin typeface="Calibri" panose="020F0502020204030204" pitchFamily="34" charset="0"/>
+                      </a:endParaRPr>
                     </a:p>
                   </a:txBody>
                   <a:tcPr marL="9525" marR="9525" marT="9525" marB="0" anchor="ctr">
@@ -7032,7 +7808,7 @@
                 </a:tc>
                 <a:extLst>
                   <a:ext uri="{0D108BD9-81ED-4DB2-BD59-A6C34878D82A}">
-                    <a16:rowId xmlns:a16="http://schemas.microsoft.com/office/drawing/2014/main" val="4170347301"/>
+                    <a16:rowId xmlns:a16="http://schemas.microsoft.com/office/drawing/2014/main" xmlns="" val="4170347301"/>
                   </a:ext>
                 </a:extLst>
               </a:tr>
@@ -7075,7 +7851,7 @@
           <p:cNvPr id="4" name="Picture 3">
             <a:extLst>
               <a:ext uri="{FF2B5EF4-FFF2-40B4-BE49-F238E27FC236}">
-                <a16:creationId xmlns:a16="http://schemas.microsoft.com/office/drawing/2014/main" id="{A55033D6-F8B4-4EF0-898E-92DFE9BF17BD}"/>
+                <a16:creationId xmlns:a16="http://schemas.microsoft.com/office/drawing/2014/main" xmlns="" id="{A55033D6-F8B4-4EF0-898E-92DFE9BF17BD}"/>
               </a:ext>
             </a:extLst>
           </p:cNvPr>
@@ -7105,7 +7881,7 @@
           <p:cNvPr id="13" name="Picture 12">
             <a:extLst>
               <a:ext uri="{FF2B5EF4-FFF2-40B4-BE49-F238E27FC236}">
-                <a16:creationId xmlns:a16="http://schemas.microsoft.com/office/drawing/2014/main" id="{96C7753B-9384-4C05-9D59-2BCB883A2247}"/>
+                <a16:creationId xmlns:a16="http://schemas.microsoft.com/office/drawing/2014/main" xmlns="" id="{96C7753B-9384-4C05-9D59-2BCB883A2247}"/>
               </a:ext>
             </a:extLst>
           </p:cNvPr>
@@ -7134,7 +7910,7 @@
           <p:cNvPr id="15" name="TextBox 14">
             <a:extLst>
               <a:ext uri="{FF2B5EF4-FFF2-40B4-BE49-F238E27FC236}">
-                <a16:creationId xmlns:a16="http://schemas.microsoft.com/office/drawing/2014/main" id="{94228215-16EE-4D5D-B9CF-755B234C7F4D}"/>
+                <a16:creationId xmlns:a16="http://schemas.microsoft.com/office/drawing/2014/main" xmlns="" id="{94228215-16EE-4D5D-B9CF-755B234C7F4D}"/>
               </a:ext>
             </a:extLst>
           </p:cNvPr>
@@ -7175,7 +7951,7 @@
           <p:cNvPr id="16" name="TextBox 15">
             <a:extLst>
               <a:ext uri="{FF2B5EF4-FFF2-40B4-BE49-F238E27FC236}">
-                <a16:creationId xmlns:a16="http://schemas.microsoft.com/office/drawing/2014/main" id="{61636041-070A-4FBA-9F8D-8EFB33C89267}"/>
+                <a16:creationId xmlns:a16="http://schemas.microsoft.com/office/drawing/2014/main" xmlns="" id="{61636041-070A-4FBA-9F8D-8EFB33C89267}"/>
               </a:ext>
             </a:extLst>
           </p:cNvPr>
@@ -7216,7 +7992,7 @@
           <p:cNvPr id="17" name="TextBox 16">
             <a:extLst>
               <a:ext uri="{FF2B5EF4-FFF2-40B4-BE49-F238E27FC236}">
-                <a16:creationId xmlns:a16="http://schemas.microsoft.com/office/drawing/2014/main" id="{A94CCE65-356F-4931-8F19-72E0A96B15AC}"/>
+                <a16:creationId xmlns:a16="http://schemas.microsoft.com/office/drawing/2014/main" xmlns="" id="{A94CCE65-356F-4931-8F19-72E0A96B15AC}"/>
               </a:ext>
             </a:extLst>
           </p:cNvPr>
@@ -7257,7 +8033,7 @@
           <p:cNvPr id="18" name="TextBox 17">
             <a:extLst>
               <a:ext uri="{FF2B5EF4-FFF2-40B4-BE49-F238E27FC236}">
-                <a16:creationId xmlns:a16="http://schemas.microsoft.com/office/drawing/2014/main" id="{CCF375E3-0B10-4B53-BFA0-AE652782973E}"/>
+                <a16:creationId xmlns:a16="http://schemas.microsoft.com/office/drawing/2014/main" xmlns="" id="{CCF375E3-0B10-4B53-BFA0-AE652782973E}"/>
               </a:ext>
             </a:extLst>
           </p:cNvPr>
@@ -7298,7 +8074,7 @@
           <p:cNvPr id="19" name="TextBox 18">
             <a:extLst>
               <a:ext uri="{FF2B5EF4-FFF2-40B4-BE49-F238E27FC236}">
-                <a16:creationId xmlns:a16="http://schemas.microsoft.com/office/drawing/2014/main" id="{75838CBE-A170-489C-A63F-D0C7BD0AC427}"/>
+                <a16:creationId xmlns:a16="http://schemas.microsoft.com/office/drawing/2014/main" xmlns="" id="{75838CBE-A170-489C-A63F-D0C7BD0AC427}"/>
               </a:ext>
             </a:extLst>
           </p:cNvPr>
@@ -7339,7 +8115,7 @@
           <p:cNvPr id="20" name="TextBox 19">
             <a:extLst>
               <a:ext uri="{FF2B5EF4-FFF2-40B4-BE49-F238E27FC236}">
-                <a16:creationId xmlns:a16="http://schemas.microsoft.com/office/drawing/2014/main" id="{A6C35433-F97B-4AC2-8CAF-07EAFAB9172E}"/>
+                <a16:creationId xmlns:a16="http://schemas.microsoft.com/office/drawing/2014/main" xmlns="" id="{A6C35433-F97B-4AC2-8CAF-07EAFAB9172E}"/>
               </a:ext>
             </a:extLst>
           </p:cNvPr>
@@ -7380,7 +8156,7 @@
           <p:cNvPr id="2" name="Picture 1">
             <a:extLst>
               <a:ext uri="{FF2B5EF4-FFF2-40B4-BE49-F238E27FC236}">
-                <a16:creationId xmlns:a16="http://schemas.microsoft.com/office/drawing/2014/main" id="{4FA699D5-0547-4A43-ADBC-E690424CEE34}"/>
+                <a16:creationId xmlns:a16="http://schemas.microsoft.com/office/drawing/2014/main" xmlns="" id="{4FA699D5-0547-4A43-ADBC-E690424CEE34}"/>
               </a:ext>
             </a:extLst>
           </p:cNvPr>
@@ -7410,7 +8186,7 @@
           <p:cNvPr id="21" name="TextBox 20">
             <a:extLst>
               <a:ext uri="{FF2B5EF4-FFF2-40B4-BE49-F238E27FC236}">
-                <a16:creationId xmlns:a16="http://schemas.microsoft.com/office/drawing/2014/main" id="{F645991A-71F1-4859-8CC3-C4E8B35B18C0}"/>
+                <a16:creationId xmlns:a16="http://schemas.microsoft.com/office/drawing/2014/main" xmlns="" id="{F645991A-71F1-4859-8CC3-C4E8B35B18C0}"/>
               </a:ext>
             </a:extLst>
           </p:cNvPr>
@@ -7488,7 +8264,7 @@
           <p:cNvPr id="2" name="Picture 1">
             <a:extLst>
               <a:ext uri="{FF2B5EF4-FFF2-40B4-BE49-F238E27FC236}">
-                <a16:creationId xmlns:a16="http://schemas.microsoft.com/office/drawing/2014/main" id="{869AF85B-EA9E-4A34-9D16-19C99BD660D1}"/>
+                <a16:creationId xmlns:a16="http://schemas.microsoft.com/office/drawing/2014/main" xmlns="" id="{869AF85B-EA9E-4A34-9D16-19C99BD660D1}"/>
               </a:ext>
             </a:extLst>
           </p:cNvPr>
@@ -7518,7 +8294,7 @@
           <p:cNvPr id="3" name="TextBox 2">
             <a:extLst>
               <a:ext uri="{FF2B5EF4-FFF2-40B4-BE49-F238E27FC236}">
-                <a16:creationId xmlns:a16="http://schemas.microsoft.com/office/drawing/2014/main" id="{A79FADA1-030D-435C-BECB-624BAB1BD0D2}"/>
+                <a16:creationId xmlns:a16="http://schemas.microsoft.com/office/drawing/2014/main" xmlns="" id="{A79FADA1-030D-435C-BECB-624BAB1BD0D2}"/>
               </a:ext>
             </a:extLst>
           </p:cNvPr>
@@ -7559,7 +8335,7 @@
           <p:cNvPr id="4" name="TextBox 3">
             <a:extLst>
               <a:ext uri="{FF2B5EF4-FFF2-40B4-BE49-F238E27FC236}">
-                <a16:creationId xmlns:a16="http://schemas.microsoft.com/office/drawing/2014/main" id="{EF65AC2F-B049-4C96-A0C7-59D9CC5C55D5}"/>
+                <a16:creationId xmlns:a16="http://schemas.microsoft.com/office/drawing/2014/main" xmlns="" id="{EF65AC2F-B049-4C96-A0C7-59D9CC5C55D5}"/>
               </a:ext>
             </a:extLst>
           </p:cNvPr>
@@ -7600,7 +8376,7 @@
           <p:cNvPr id="5" name="TextBox 4">
             <a:extLst>
               <a:ext uri="{FF2B5EF4-FFF2-40B4-BE49-F238E27FC236}">
-                <a16:creationId xmlns:a16="http://schemas.microsoft.com/office/drawing/2014/main" id="{364530E4-DAFA-461E-80C4-F9740865A958}"/>
+                <a16:creationId xmlns:a16="http://schemas.microsoft.com/office/drawing/2014/main" xmlns="" id="{364530E4-DAFA-461E-80C4-F9740865A958}"/>
               </a:ext>
             </a:extLst>
           </p:cNvPr>
@@ -7641,7 +8417,7 @@
           <p:cNvPr id="6" name="TextBox 5">
             <a:extLst>
               <a:ext uri="{FF2B5EF4-FFF2-40B4-BE49-F238E27FC236}">
-                <a16:creationId xmlns:a16="http://schemas.microsoft.com/office/drawing/2014/main" id="{A364160E-8E0A-4863-9AFE-1B1FC54A9C4B}"/>
+                <a16:creationId xmlns:a16="http://schemas.microsoft.com/office/drawing/2014/main" xmlns="" id="{A364160E-8E0A-4863-9AFE-1B1FC54A9C4B}"/>
               </a:ext>
             </a:extLst>
           </p:cNvPr>
@@ -7682,7 +8458,7 @@
           <p:cNvPr id="7" name="TextBox 6">
             <a:extLst>
               <a:ext uri="{FF2B5EF4-FFF2-40B4-BE49-F238E27FC236}">
-                <a16:creationId xmlns:a16="http://schemas.microsoft.com/office/drawing/2014/main" id="{9F31CE06-1B91-4F1A-953D-AA12C72E3C4C}"/>
+                <a16:creationId xmlns:a16="http://schemas.microsoft.com/office/drawing/2014/main" xmlns="" id="{9F31CE06-1B91-4F1A-953D-AA12C72E3C4C}"/>
               </a:ext>
             </a:extLst>
           </p:cNvPr>
@@ -7753,7 +8529,7 @@
           <p:cNvPr id="4" name="Picture 3">
             <a:extLst>
               <a:ext uri="{FF2B5EF4-FFF2-40B4-BE49-F238E27FC236}">
-                <a16:creationId xmlns:a16="http://schemas.microsoft.com/office/drawing/2014/main" id="{A55033D6-F8B4-4EF0-898E-92DFE9BF17BD}"/>
+                <a16:creationId xmlns:a16="http://schemas.microsoft.com/office/drawing/2014/main" xmlns="" id="{A55033D6-F8B4-4EF0-898E-92DFE9BF17BD}"/>
               </a:ext>
             </a:extLst>
           </p:cNvPr>
@@ -7783,7 +8559,7 @@
           <p:cNvPr id="5" name="TextBox 4">
             <a:extLst>
               <a:ext uri="{FF2B5EF4-FFF2-40B4-BE49-F238E27FC236}">
-                <a16:creationId xmlns:a16="http://schemas.microsoft.com/office/drawing/2014/main" id="{E1865019-75DE-4D7A-BF4F-60367FB03C20}"/>
+                <a16:creationId xmlns:a16="http://schemas.microsoft.com/office/drawing/2014/main" xmlns="" id="{E1865019-75DE-4D7A-BF4F-60367FB03C20}"/>
               </a:ext>
             </a:extLst>
           </p:cNvPr>
@@ -7822,7 +8598,7 @@
           <p:cNvPr id="6" name="Oval 5">
             <a:extLst>
               <a:ext uri="{FF2B5EF4-FFF2-40B4-BE49-F238E27FC236}">
-                <a16:creationId xmlns:a16="http://schemas.microsoft.com/office/drawing/2014/main" id="{F709F106-70F8-40CB-BB61-97EFDA077607}"/>
+                <a16:creationId xmlns:a16="http://schemas.microsoft.com/office/drawing/2014/main" xmlns="" id="{F709F106-70F8-40CB-BB61-97EFDA077607}"/>
               </a:ext>
             </a:extLst>
           </p:cNvPr>
@@ -7868,7 +8644,7 @@
           <p:cNvPr id="7" name="TextBox 6">
             <a:extLst>
               <a:ext uri="{FF2B5EF4-FFF2-40B4-BE49-F238E27FC236}">
-                <a16:creationId xmlns:a16="http://schemas.microsoft.com/office/drawing/2014/main" id="{87C6A90F-7EA4-4B27-8903-CB2F588B0426}"/>
+                <a16:creationId xmlns:a16="http://schemas.microsoft.com/office/drawing/2014/main" xmlns="" id="{87C6A90F-7EA4-4B27-8903-CB2F588B0426}"/>
               </a:ext>
             </a:extLst>
           </p:cNvPr>
@@ -7919,7 +8695,7 @@
           <p:cNvPr id="8" name="TextBox 7">
             <a:extLst>
               <a:ext uri="{FF2B5EF4-FFF2-40B4-BE49-F238E27FC236}">
-                <a16:creationId xmlns:a16="http://schemas.microsoft.com/office/drawing/2014/main" id="{FB329139-9F3E-4763-99F3-59678D62E734}"/>
+                <a16:creationId xmlns:a16="http://schemas.microsoft.com/office/drawing/2014/main" xmlns="" id="{FB329139-9F3E-4763-99F3-59678D62E734}"/>
               </a:ext>
             </a:extLst>
           </p:cNvPr>
@@ -7958,7 +8734,7 @@
           <p:cNvPr id="9" name="TextBox 8">
             <a:extLst>
               <a:ext uri="{FF2B5EF4-FFF2-40B4-BE49-F238E27FC236}">
-                <a16:creationId xmlns:a16="http://schemas.microsoft.com/office/drawing/2014/main" id="{56A90416-2D65-4992-9A83-81180543299E}"/>
+                <a16:creationId xmlns:a16="http://schemas.microsoft.com/office/drawing/2014/main" xmlns="" id="{56A90416-2D65-4992-9A83-81180543299E}"/>
               </a:ext>
             </a:extLst>
           </p:cNvPr>
@@ -7997,7 +8773,7 @@
           <p:cNvPr id="10" name="TextBox 9">
             <a:extLst>
               <a:ext uri="{FF2B5EF4-FFF2-40B4-BE49-F238E27FC236}">
-                <a16:creationId xmlns:a16="http://schemas.microsoft.com/office/drawing/2014/main" id="{D90CC7FA-A98B-4B69-8C60-BA784B726E74}"/>
+                <a16:creationId xmlns:a16="http://schemas.microsoft.com/office/drawing/2014/main" xmlns="" id="{D90CC7FA-A98B-4B69-8C60-BA784B726E74}"/>
               </a:ext>
             </a:extLst>
           </p:cNvPr>
@@ -8036,7 +8812,7 @@
           <p:cNvPr id="11" name="Oval 10">
             <a:extLst>
               <a:ext uri="{FF2B5EF4-FFF2-40B4-BE49-F238E27FC236}">
-                <a16:creationId xmlns:a16="http://schemas.microsoft.com/office/drawing/2014/main" id="{F5A185B3-0119-4687-9187-3683FA94C77F}"/>
+                <a16:creationId xmlns:a16="http://schemas.microsoft.com/office/drawing/2014/main" xmlns="" id="{F5A185B3-0119-4687-9187-3683FA94C77F}"/>
               </a:ext>
             </a:extLst>
           </p:cNvPr>
@@ -8082,7 +8858,7 @@
           <p:cNvPr id="12" name="TextBox 11">
             <a:extLst>
               <a:ext uri="{FF2B5EF4-FFF2-40B4-BE49-F238E27FC236}">
-                <a16:creationId xmlns:a16="http://schemas.microsoft.com/office/drawing/2014/main" id="{77A9E3E2-B863-47A0-BF06-07CB47A50CBC}"/>
+                <a16:creationId xmlns:a16="http://schemas.microsoft.com/office/drawing/2014/main" xmlns="" id="{77A9E3E2-B863-47A0-BF06-07CB47A50CBC}"/>
               </a:ext>
             </a:extLst>
           </p:cNvPr>
@@ -8133,7 +8909,7 @@
           <p:cNvPr id="14" name="TextBox 13">
             <a:extLst>
               <a:ext uri="{FF2B5EF4-FFF2-40B4-BE49-F238E27FC236}">
-                <a16:creationId xmlns:a16="http://schemas.microsoft.com/office/drawing/2014/main" id="{DDDBD8D2-C849-4B6C-90F2-67B997DB5602}"/>
+                <a16:creationId xmlns:a16="http://schemas.microsoft.com/office/drawing/2014/main" xmlns="" id="{DDDBD8D2-C849-4B6C-90F2-67B997DB5602}"/>
               </a:ext>
             </a:extLst>
           </p:cNvPr>
@@ -8204,7 +8980,7 @@
           <p:cNvPr id="2" name="Table 1">
             <a:extLst>
               <a:ext uri="{FF2B5EF4-FFF2-40B4-BE49-F238E27FC236}">
-                <a16:creationId xmlns:a16="http://schemas.microsoft.com/office/drawing/2014/main" id="{D85EF2F4-ACF4-45BD-8C20-C32021D2345F}"/>
+                <a16:creationId xmlns:a16="http://schemas.microsoft.com/office/drawing/2014/main" xmlns="" id="{D85EF2F4-ACF4-45BD-8C20-C32021D2345F}"/>
               </a:ext>
             </a:extLst>
           </p:cNvPr>
@@ -8233,14 +9009,14 @@
                 <a:gridCol w="2464659">
                   <a:extLst>
                     <a:ext uri="{9D8B030D-6E8A-4147-A177-3AD203B41FA5}">
-                      <a16:colId xmlns:a16="http://schemas.microsoft.com/office/drawing/2014/main" val="2949619691"/>
+                      <a16:colId xmlns:a16="http://schemas.microsoft.com/office/drawing/2014/main" xmlns="" val="2949619691"/>
                     </a:ext>
                   </a:extLst>
                 </a:gridCol>
                 <a:gridCol w="913541">
                   <a:extLst>
                     <a:ext uri="{9D8B030D-6E8A-4147-A177-3AD203B41FA5}">
-                      <a16:colId xmlns:a16="http://schemas.microsoft.com/office/drawing/2014/main" val="604774021"/>
+                      <a16:colId xmlns:a16="http://schemas.microsoft.com/office/drawing/2014/main" xmlns="" val="604774021"/>
                     </a:ext>
                   </a:extLst>
                 </a:gridCol>
@@ -8294,7 +9070,7 @@
                 </a:tc>
                 <a:extLst>
                   <a:ext uri="{0D108BD9-81ED-4DB2-BD59-A6C34878D82A}">
-                    <a16:rowId xmlns:a16="http://schemas.microsoft.com/office/drawing/2014/main" val="713225754"/>
+                    <a16:rowId xmlns:a16="http://schemas.microsoft.com/office/drawing/2014/main" xmlns="" val="713225754"/>
                   </a:ext>
                 </a:extLst>
               </a:tr>
@@ -8347,7 +9123,7 @@
                 </a:tc>
                 <a:extLst>
                   <a:ext uri="{0D108BD9-81ED-4DB2-BD59-A6C34878D82A}">
-                    <a16:rowId xmlns:a16="http://schemas.microsoft.com/office/drawing/2014/main" val="959027876"/>
+                    <a16:rowId xmlns:a16="http://schemas.microsoft.com/office/drawing/2014/main" xmlns="" val="959027876"/>
                   </a:ext>
                 </a:extLst>
               </a:tr>
@@ -8400,7 +9176,7 @@
                 </a:tc>
                 <a:extLst>
                   <a:ext uri="{0D108BD9-81ED-4DB2-BD59-A6C34878D82A}">
-                    <a16:rowId xmlns:a16="http://schemas.microsoft.com/office/drawing/2014/main" val="1677285584"/>
+                    <a16:rowId xmlns:a16="http://schemas.microsoft.com/office/drawing/2014/main" xmlns="" val="1677285584"/>
                   </a:ext>
                 </a:extLst>
               </a:tr>
@@ -8453,7 +9229,7 @@
                 </a:tc>
                 <a:extLst>
                   <a:ext uri="{0D108BD9-81ED-4DB2-BD59-A6C34878D82A}">
-                    <a16:rowId xmlns:a16="http://schemas.microsoft.com/office/drawing/2014/main" val="2803085019"/>
+                    <a16:rowId xmlns:a16="http://schemas.microsoft.com/office/drawing/2014/main" xmlns="" val="2803085019"/>
                   </a:ext>
                 </a:extLst>
               </a:tr>
@@ -8506,7 +9282,7 @@
                 </a:tc>
                 <a:extLst>
                   <a:ext uri="{0D108BD9-81ED-4DB2-BD59-A6C34878D82A}">
-                    <a16:rowId xmlns:a16="http://schemas.microsoft.com/office/drawing/2014/main" val="923224158"/>
+                    <a16:rowId xmlns:a16="http://schemas.microsoft.com/office/drawing/2014/main" xmlns="" val="923224158"/>
                   </a:ext>
                 </a:extLst>
               </a:tr>
@@ -8559,7 +9335,7 @@
                 </a:tc>
                 <a:extLst>
                   <a:ext uri="{0D108BD9-81ED-4DB2-BD59-A6C34878D82A}">
-                    <a16:rowId xmlns:a16="http://schemas.microsoft.com/office/drawing/2014/main" val="43392279"/>
+                    <a16:rowId xmlns:a16="http://schemas.microsoft.com/office/drawing/2014/main" xmlns="" val="43392279"/>
                   </a:ext>
                 </a:extLst>
               </a:tr>
@@ -8612,7 +9388,7 @@
                 </a:tc>
                 <a:extLst>
                   <a:ext uri="{0D108BD9-81ED-4DB2-BD59-A6C34878D82A}">
-                    <a16:rowId xmlns:a16="http://schemas.microsoft.com/office/drawing/2014/main" val="3716098942"/>
+                    <a16:rowId xmlns:a16="http://schemas.microsoft.com/office/drawing/2014/main" xmlns="" val="3716098942"/>
                   </a:ext>
                 </a:extLst>
               </a:tr>
@@ -8665,7 +9441,7 @@
                 </a:tc>
                 <a:extLst>
                   <a:ext uri="{0D108BD9-81ED-4DB2-BD59-A6C34878D82A}">
-                    <a16:rowId xmlns:a16="http://schemas.microsoft.com/office/drawing/2014/main" val="1351026217"/>
+                    <a16:rowId xmlns:a16="http://schemas.microsoft.com/office/drawing/2014/main" xmlns="" val="1351026217"/>
                   </a:ext>
                 </a:extLst>
               </a:tr>
@@ -8718,7 +9494,7 @@
                 </a:tc>
                 <a:extLst>
                   <a:ext uri="{0D108BD9-81ED-4DB2-BD59-A6C34878D82A}">
-                    <a16:rowId xmlns:a16="http://schemas.microsoft.com/office/drawing/2014/main" val="1182668082"/>
+                    <a16:rowId xmlns:a16="http://schemas.microsoft.com/office/drawing/2014/main" xmlns="" val="1182668082"/>
                   </a:ext>
                 </a:extLst>
               </a:tr>
@@ -8771,7 +9547,7 @@
                 </a:tc>
                 <a:extLst>
                   <a:ext uri="{0D108BD9-81ED-4DB2-BD59-A6C34878D82A}">
-                    <a16:rowId xmlns:a16="http://schemas.microsoft.com/office/drawing/2014/main" val="4048025060"/>
+                    <a16:rowId xmlns:a16="http://schemas.microsoft.com/office/drawing/2014/main" xmlns="" val="4048025060"/>
                   </a:ext>
                 </a:extLst>
               </a:tr>
@@ -8824,7 +9600,7 @@
                 </a:tc>
                 <a:extLst>
                   <a:ext uri="{0D108BD9-81ED-4DB2-BD59-A6C34878D82A}">
-                    <a16:rowId xmlns:a16="http://schemas.microsoft.com/office/drawing/2014/main" val="1715939075"/>
+                    <a16:rowId xmlns:a16="http://schemas.microsoft.com/office/drawing/2014/main" xmlns="" val="1715939075"/>
                   </a:ext>
                 </a:extLst>
               </a:tr>
@@ -8877,7 +9653,7 @@
                 </a:tc>
                 <a:extLst>
                   <a:ext uri="{0D108BD9-81ED-4DB2-BD59-A6C34878D82A}">
-                    <a16:rowId xmlns:a16="http://schemas.microsoft.com/office/drawing/2014/main" val="1341766513"/>
+                    <a16:rowId xmlns:a16="http://schemas.microsoft.com/office/drawing/2014/main" xmlns="" val="1341766513"/>
                   </a:ext>
                 </a:extLst>
               </a:tr>
@@ -8930,7 +9706,7 @@
                 </a:tc>
                 <a:extLst>
                   <a:ext uri="{0D108BD9-81ED-4DB2-BD59-A6C34878D82A}">
-                    <a16:rowId xmlns:a16="http://schemas.microsoft.com/office/drawing/2014/main" val="3468686992"/>
+                    <a16:rowId xmlns:a16="http://schemas.microsoft.com/office/drawing/2014/main" xmlns="" val="3468686992"/>
                   </a:ext>
                 </a:extLst>
               </a:tr>
@@ -8983,7 +9759,7 @@
                 </a:tc>
                 <a:extLst>
                   <a:ext uri="{0D108BD9-81ED-4DB2-BD59-A6C34878D82A}">
-                    <a16:rowId xmlns:a16="http://schemas.microsoft.com/office/drawing/2014/main" val="938833329"/>
+                    <a16:rowId xmlns:a16="http://schemas.microsoft.com/office/drawing/2014/main" xmlns="" val="938833329"/>
                   </a:ext>
                 </a:extLst>
               </a:tr>
@@ -9036,7 +9812,7 @@
                 </a:tc>
                 <a:extLst>
                   <a:ext uri="{0D108BD9-81ED-4DB2-BD59-A6C34878D82A}">
-                    <a16:rowId xmlns:a16="http://schemas.microsoft.com/office/drawing/2014/main" val="2468822781"/>
+                    <a16:rowId xmlns:a16="http://schemas.microsoft.com/office/drawing/2014/main" xmlns="" val="2468822781"/>
                   </a:ext>
                 </a:extLst>
               </a:tr>
@@ -9089,7 +9865,7 @@
                 </a:tc>
                 <a:extLst>
                   <a:ext uri="{0D108BD9-81ED-4DB2-BD59-A6C34878D82A}">
-                    <a16:rowId xmlns:a16="http://schemas.microsoft.com/office/drawing/2014/main" val="1103337781"/>
+                    <a16:rowId xmlns:a16="http://schemas.microsoft.com/office/drawing/2014/main" xmlns="" val="1103337781"/>
                   </a:ext>
                 </a:extLst>
               </a:tr>
@@ -9142,7 +9918,7 @@
                 </a:tc>
                 <a:extLst>
                   <a:ext uri="{0D108BD9-81ED-4DB2-BD59-A6C34878D82A}">
-                    <a16:rowId xmlns:a16="http://schemas.microsoft.com/office/drawing/2014/main" val="4147272330"/>
+                    <a16:rowId xmlns:a16="http://schemas.microsoft.com/office/drawing/2014/main" xmlns="" val="4147272330"/>
                   </a:ext>
                 </a:extLst>
               </a:tr>
@@ -9195,7 +9971,7 @@
                 </a:tc>
                 <a:extLst>
                   <a:ext uri="{0D108BD9-81ED-4DB2-BD59-A6C34878D82A}">
-                    <a16:rowId xmlns:a16="http://schemas.microsoft.com/office/drawing/2014/main" val="206391269"/>
+                    <a16:rowId xmlns:a16="http://schemas.microsoft.com/office/drawing/2014/main" xmlns="" val="206391269"/>
                   </a:ext>
                 </a:extLst>
               </a:tr>
@@ -9248,7 +10024,7 @@
                 </a:tc>
                 <a:extLst>
                   <a:ext uri="{0D108BD9-81ED-4DB2-BD59-A6C34878D82A}">
-                    <a16:rowId xmlns:a16="http://schemas.microsoft.com/office/drawing/2014/main" val="1126938013"/>
+                    <a16:rowId xmlns:a16="http://schemas.microsoft.com/office/drawing/2014/main" xmlns="" val="1126938013"/>
                   </a:ext>
                 </a:extLst>
               </a:tr>
@@ -9301,7 +10077,7 @@
                 </a:tc>
                 <a:extLst>
                   <a:ext uri="{0D108BD9-81ED-4DB2-BD59-A6C34878D82A}">
-                    <a16:rowId xmlns:a16="http://schemas.microsoft.com/office/drawing/2014/main" val="2352634924"/>
+                    <a16:rowId xmlns:a16="http://schemas.microsoft.com/office/drawing/2014/main" xmlns="" val="2352634924"/>
                   </a:ext>
                 </a:extLst>
               </a:tr>
@@ -9354,7 +10130,7 @@
                 </a:tc>
                 <a:extLst>
                   <a:ext uri="{0D108BD9-81ED-4DB2-BD59-A6C34878D82A}">
-                    <a16:rowId xmlns:a16="http://schemas.microsoft.com/office/drawing/2014/main" val="3859273979"/>
+                    <a16:rowId xmlns:a16="http://schemas.microsoft.com/office/drawing/2014/main" xmlns="" val="3859273979"/>
                   </a:ext>
                 </a:extLst>
               </a:tr>

</xml_diff>